<commit_message>
added presentation for module 6 (functions) updated module 3 + 5
</commit_message>
<xml_diff>
--- a/Modul_3_Ressources/Ressources.pptx
+++ b/Modul_3_Ressources/Ressources.pptx
@@ -2596,7 +2596,7 @@
           <a:p>
             <a:fld id="{E9DAB8B5-B9A3-426D-91D9-D7966B0F2B79}" type="datetimeFigureOut">
               <a:rPr lang="de-DE" smtClean="0"/>
-              <a:t>25.06.2021</a:t>
+              <a:t>13.11.2021</a:t>
             </a:fld>
             <a:endParaRPr lang="de-DE"/>
           </a:p>
@@ -4550,7 +4550,7 @@
           <a:p>
             <a:fld id="{6CBA03CC-73C5-46A8-8DFB-B5DC4577D8E2}" type="datetimeFigureOut">
               <a:rPr lang="de-DE" smtClean="0"/>
-              <a:t>25.06.2021</a:t>
+              <a:t>13.11.2021</a:t>
             </a:fld>
             <a:endParaRPr lang="de-DE"/>
           </a:p>
@@ -4720,7 +4720,7 @@
           <a:p>
             <a:fld id="{6CBA03CC-73C5-46A8-8DFB-B5DC4577D8E2}" type="datetimeFigureOut">
               <a:rPr lang="de-DE" smtClean="0"/>
-              <a:t>25.06.2021</a:t>
+              <a:t>13.11.2021</a:t>
             </a:fld>
             <a:endParaRPr lang="de-DE"/>
           </a:p>
@@ -4900,7 +4900,7 @@
           <a:p>
             <a:fld id="{6CBA03CC-73C5-46A8-8DFB-B5DC4577D8E2}" type="datetimeFigureOut">
               <a:rPr lang="de-DE" smtClean="0"/>
-              <a:t>25.06.2021</a:t>
+              <a:t>13.11.2021</a:t>
             </a:fld>
             <a:endParaRPr lang="de-DE"/>
           </a:p>
@@ -5070,7 +5070,7 @@
           <a:p>
             <a:fld id="{6CBA03CC-73C5-46A8-8DFB-B5DC4577D8E2}" type="datetimeFigureOut">
               <a:rPr lang="de-DE" smtClean="0"/>
-              <a:t>25.06.2021</a:t>
+              <a:t>13.11.2021</a:t>
             </a:fld>
             <a:endParaRPr lang="de-DE"/>
           </a:p>
@@ -5316,7 +5316,7 @@
           <a:p>
             <a:fld id="{6CBA03CC-73C5-46A8-8DFB-B5DC4577D8E2}" type="datetimeFigureOut">
               <a:rPr lang="de-DE" smtClean="0"/>
-              <a:t>25.06.2021</a:t>
+              <a:t>13.11.2021</a:t>
             </a:fld>
             <a:endParaRPr lang="de-DE"/>
           </a:p>
@@ -5548,7 +5548,7 @@
           <a:p>
             <a:fld id="{6CBA03CC-73C5-46A8-8DFB-B5DC4577D8E2}" type="datetimeFigureOut">
               <a:rPr lang="de-DE" smtClean="0"/>
-              <a:t>25.06.2021</a:t>
+              <a:t>13.11.2021</a:t>
             </a:fld>
             <a:endParaRPr lang="de-DE"/>
           </a:p>
@@ -5915,7 +5915,7 @@
           <a:p>
             <a:fld id="{6CBA03CC-73C5-46A8-8DFB-B5DC4577D8E2}" type="datetimeFigureOut">
               <a:rPr lang="de-DE" smtClean="0"/>
-              <a:t>25.06.2021</a:t>
+              <a:t>13.11.2021</a:t>
             </a:fld>
             <a:endParaRPr lang="de-DE"/>
           </a:p>
@@ -6033,7 +6033,7 @@
           <a:p>
             <a:fld id="{6CBA03CC-73C5-46A8-8DFB-B5DC4577D8E2}" type="datetimeFigureOut">
               <a:rPr lang="de-DE" smtClean="0"/>
-              <a:t>25.06.2021</a:t>
+              <a:t>13.11.2021</a:t>
             </a:fld>
             <a:endParaRPr lang="de-DE"/>
           </a:p>
@@ -6128,7 +6128,7 @@
           <a:p>
             <a:fld id="{6CBA03CC-73C5-46A8-8DFB-B5DC4577D8E2}" type="datetimeFigureOut">
               <a:rPr lang="de-DE" smtClean="0"/>
-              <a:t>25.06.2021</a:t>
+              <a:t>13.11.2021</a:t>
             </a:fld>
             <a:endParaRPr lang="de-DE"/>
           </a:p>
@@ -6405,7 +6405,7 @@
           <a:p>
             <a:fld id="{6CBA03CC-73C5-46A8-8DFB-B5DC4577D8E2}" type="datetimeFigureOut">
               <a:rPr lang="de-DE" smtClean="0"/>
-              <a:t>25.06.2021</a:t>
+              <a:t>13.11.2021</a:t>
             </a:fld>
             <a:endParaRPr lang="de-DE"/>
           </a:p>
@@ -6658,7 +6658,7 @@
           <a:p>
             <a:fld id="{6CBA03CC-73C5-46A8-8DFB-B5DC4577D8E2}" type="datetimeFigureOut">
               <a:rPr lang="de-DE" smtClean="0"/>
-              <a:t>25.06.2021</a:t>
+              <a:t>13.11.2021</a:t>
             </a:fld>
             <a:endParaRPr lang="de-DE"/>
           </a:p>
@@ -6871,7 +6871,7 @@
           <a:p>
             <a:fld id="{6CBA03CC-73C5-46A8-8DFB-B5DC4577D8E2}" type="datetimeFigureOut">
               <a:rPr lang="de-DE" smtClean="0"/>
-              <a:t>25.06.2021</a:t>
+              <a:t>13.11.2021</a:t>
             </a:fld>
             <a:endParaRPr lang="de-DE"/>
           </a:p>
@@ -14378,7 +14378,7 @@
         <p:spPr>
           <a:xfrm>
             <a:off x="9619463" y="3720261"/>
-            <a:ext cx="1791452" cy="830997"/>
+            <a:ext cx="1462195" cy="461665"/>
           </a:xfrm>
           <a:prstGeom prst="rect">
             <a:avLst/>
@@ -14390,12 +14390,6 @@
             <a:spAutoFit/>
           </a:bodyPr>
           <a:lstStyle/>
-          <a:p>
-            <a:r>
-              <a:rPr lang="de-DE" sz="2400" b="1" dirty="0" smtClean="0"/>
-              <a:t>Parameter / </a:t>
-            </a:r>
-          </a:p>
           <a:p>
             <a:r>
               <a:rPr lang="de-DE" sz="2400" b="1" dirty="0" smtClean="0"/>
@@ -16229,7 +16223,7 @@
       </p:sp>
       <p:sp>
         <p:nvSpPr>
-          <p:cNvPr id="6" name="Rectangle 2"/>
+          <p:cNvPr id="4" name="Rectangle 2"/>
           <p:cNvSpPr>
             <a:spLocks noChangeArrowheads="1"/>
           </p:cNvSpPr>
@@ -16237,8 +16231,8 @@
         </p:nvSpPr>
         <p:spPr bwMode="auto">
           <a:xfrm>
-            <a:off x="1778001" y="1432513"/>
-            <a:ext cx="8161866" cy="5262979"/>
+            <a:off x="1715912" y="2294975"/>
+            <a:ext cx="8974666" cy="3046988"/>
           </a:xfrm>
           <a:prstGeom prst="rect">
             <a:avLst/>
@@ -16527,7 +16521,7 @@
                 <a:effectLst/>
                 <a:latin typeface="JetBrains Mono"/>
               </a:rPr>
-              <a:t>4711 </a:t>
+              <a:t>"4711" </a:t>
             </a:r>
             <a:r>
               <a:rPr kumimoji="0" lang="de-DE" altLang="de-DE" sz="2400" b="0" i="0" u="none" strike="noStrike" cap="none" normalizeH="0" baseline="0" dirty="0" smtClean="0">
@@ -16542,6 +16536,162 @@
               </a:rPr>
               <a:t>= {</a:t>
             </a:r>
+            <a:r>
+              <a:rPr kumimoji="0" lang="de-DE" altLang="de-DE" sz="2400" b="0" i="0" u="none" strike="noStrike" cap="none" normalizeH="0" baseline="0" dirty="0" err="1" smtClean="0">
+                <a:ln>
+                  <a:noFill/>
+                </a:ln>
+                <a:solidFill>
+                  <a:srgbClr val="EF596F"/>
+                </a:solidFill>
+                <a:effectLst/>
+                <a:latin typeface="JetBrains Mono"/>
+              </a:rPr>
+              <a:t>name</a:t>
+            </a:r>
+            <a:r>
+              <a:rPr kumimoji="0" lang="de-DE" altLang="de-DE" sz="2400" b="0" i="0" u="none" strike="noStrike" cap="none" normalizeH="0" baseline="0" dirty="0" smtClean="0">
+                <a:ln>
+                  <a:noFill/>
+                </a:ln>
+                <a:solidFill>
+                  <a:srgbClr val="EF596F"/>
+                </a:solidFill>
+                <a:effectLst/>
+                <a:latin typeface="JetBrains Mono"/>
+              </a:rPr>
+              <a:t> </a:t>
+            </a:r>
+            <a:r>
+              <a:rPr kumimoji="0" lang="de-DE" altLang="de-DE" sz="2400" b="0" i="0" u="none" strike="noStrike" cap="none" normalizeH="0" baseline="0" dirty="0" smtClean="0">
+                <a:ln>
+                  <a:noFill/>
+                </a:ln>
+                <a:solidFill>
+                  <a:srgbClr val="BBBBBB"/>
+                </a:solidFill>
+                <a:effectLst/>
+                <a:latin typeface="JetBrains Mono"/>
+              </a:rPr>
+              <a:t>= </a:t>
+            </a:r>
+            <a:r>
+              <a:rPr kumimoji="0" lang="de-DE" altLang="de-DE" sz="2400" b="0" i="0" u="none" strike="noStrike" cap="none" normalizeH="0" baseline="0" dirty="0" smtClean="0">
+                <a:ln>
+                  <a:noFill/>
+                </a:ln>
+                <a:solidFill>
+                  <a:srgbClr val="89CA78"/>
+                </a:solidFill>
+                <a:effectLst/>
+                <a:latin typeface="JetBrains Mono"/>
+              </a:rPr>
+              <a:t>"</a:t>
+            </a:r>
+            <a:r>
+              <a:rPr kumimoji="0" lang="de-DE" altLang="de-DE" sz="2400" b="0" i="0" u="none" strike="noStrike" cap="none" normalizeH="0" baseline="0" dirty="0" err="1" smtClean="0">
+                <a:ln>
+                  <a:noFill/>
+                </a:ln>
+                <a:solidFill>
+                  <a:srgbClr val="89CA78"/>
+                </a:solidFill>
+                <a:effectLst/>
+                <a:latin typeface="JetBrains Mono"/>
+              </a:rPr>
+              <a:t>mustermann</a:t>
+            </a:r>
+            <a:r>
+              <a:rPr kumimoji="0" lang="de-DE" altLang="de-DE" sz="2400" b="0" i="0" u="none" strike="noStrike" cap="none" normalizeH="0" baseline="0" dirty="0" smtClean="0">
+                <a:ln>
+                  <a:noFill/>
+                </a:ln>
+                <a:solidFill>
+                  <a:srgbClr val="89CA78"/>
+                </a:solidFill>
+                <a:effectLst/>
+                <a:latin typeface="JetBrains Mono"/>
+              </a:rPr>
+              <a:t>"</a:t>
+            </a:r>
+            <a:r>
+              <a:rPr kumimoji="0" lang="de-DE" altLang="de-DE" sz="2400" b="0" i="0" u="none" strike="noStrike" cap="none" normalizeH="0" baseline="0" dirty="0" smtClean="0">
+                <a:ln>
+                  <a:noFill/>
+                </a:ln>
+                <a:solidFill>
+                  <a:srgbClr val="BBBBBB"/>
+                </a:solidFill>
+                <a:effectLst/>
+                <a:latin typeface="JetBrains Mono"/>
+              </a:rPr>
+              <a:t>,</a:t>
+            </a:r>
+            <a:r>
+              <a:rPr kumimoji="0" lang="de-DE" altLang="de-DE" sz="2400" b="0" i="0" u="none" strike="noStrike" cap="none" normalizeH="0" baseline="0" dirty="0" err="1" smtClean="0">
+                <a:ln>
+                  <a:noFill/>
+                </a:ln>
+                <a:solidFill>
+                  <a:srgbClr val="EF596F"/>
+                </a:solidFill>
+                <a:effectLst/>
+                <a:latin typeface="JetBrains Mono"/>
+              </a:rPr>
+              <a:t>department</a:t>
+            </a:r>
+            <a:r>
+              <a:rPr kumimoji="0" lang="de-DE" altLang="de-DE" sz="2400" b="0" i="0" u="none" strike="noStrike" cap="none" normalizeH="0" baseline="0" dirty="0" smtClean="0">
+                <a:ln>
+                  <a:noFill/>
+                </a:ln>
+                <a:solidFill>
+                  <a:srgbClr val="EF596F"/>
+                </a:solidFill>
+                <a:effectLst/>
+                <a:latin typeface="JetBrains Mono"/>
+              </a:rPr>
+              <a:t> </a:t>
+            </a:r>
+            <a:r>
+              <a:rPr kumimoji="0" lang="de-DE" altLang="de-DE" sz="2400" b="0" i="0" u="none" strike="noStrike" cap="none" normalizeH="0" baseline="0" dirty="0" smtClean="0">
+                <a:ln>
+                  <a:noFill/>
+                </a:ln>
+                <a:solidFill>
+                  <a:srgbClr val="BBBBBB"/>
+                </a:solidFill>
+                <a:effectLst/>
+                <a:latin typeface="JetBrains Mono"/>
+              </a:rPr>
+              <a:t>= </a:t>
+            </a:r>
+            <a:r>
+              <a:rPr kumimoji="0" lang="de-DE" altLang="de-DE" sz="2400" b="0" i="0" u="none" strike="noStrike" cap="none" normalizeH="0" baseline="0" dirty="0" smtClean="0">
+                <a:ln>
+                  <a:noFill/>
+                </a:ln>
+                <a:solidFill>
+                  <a:srgbClr val="89CA78"/>
+                </a:solidFill>
+                <a:effectLst/>
+                <a:latin typeface="JetBrains Mono"/>
+              </a:rPr>
+              <a:t>"demo1"</a:t>
+            </a:r>
+            <a:r>
+              <a:rPr kumimoji="0" lang="de-DE" altLang="de-DE" sz="2400" b="0" i="0" u="none" strike="noStrike" cap="none" normalizeH="0" baseline="0" dirty="0" smtClean="0">
+                <a:ln>
+                  <a:noFill/>
+                </a:ln>
+                <a:solidFill>
+                  <a:srgbClr val="BBBBBB"/>
+                </a:solidFill>
+                <a:effectLst/>
+                <a:latin typeface="JetBrains Mono"/>
+              </a:rPr>
+              <a:t>},</a:t>
+            </a:r>
             <a:br>
               <a:rPr kumimoji="0" lang="de-DE" altLang="de-DE" sz="2400" b="0" i="0" u="none" strike="noStrike" cap="none" normalizeH="0" baseline="0" dirty="0" smtClean="0">
                 <a:ln>
@@ -16565,7 +16715,33 @@
                 <a:effectLst/>
                 <a:latin typeface="JetBrains Mono"/>
               </a:rPr>
-              <a:t>      </a:t>
+              <a:t>    </a:t>
+            </a:r>
+            <a:r>
+              <a:rPr kumimoji="0" lang="de-DE" altLang="de-DE" sz="2400" b="0" i="0" u="none" strike="noStrike" cap="none" normalizeH="0" baseline="0" dirty="0" smtClean="0">
+                <a:ln>
+                  <a:noFill/>
+                </a:ln>
+                <a:solidFill>
+                  <a:srgbClr val="EF596F"/>
+                </a:solidFill>
+                <a:effectLst/>
+                <a:latin typeface="JetBrains Mono"/>
+              </a:rPr>
+              <a:t>"0815" </a:t>
+            </a:r>
+            <a:r>
+              <a:rPr kumimoji="0" lang="de-DE" altLang="de-DE" sz="2400" b="0" i="0" u="none" strike="noStrike" cap="none" normalizeH="0" baseline="0" dirty="0" smtClean="0">
+                <a:ln>
+                  <a:noFill/>
+                </a:ln>
+                <a:solidFill>
+                  <a:srgbClr val="BBBBBB"/>
+                </a:solidFill>
+                <a:effectLst/>
+                <a:latin typeface="JetBrains Mono"/>
+              </a:rPr>
+              <a:t>= {</a:t>
             </a:r>
             <a:r>
               <a:rPr kumimoji="0" lang="de-DE" altLang="de-DE" sz="2400" b="0" i="0" u="none" strike="noStrike" cap="none" normalizeH="0" baseline="0" dirty="0" err="1" smtClean="0">
@@ -16630,7 +16806,7 @@
                 <a:effectLst/>
                 <a:latin typeface="JetBrains Mono"/>
               </a:rPr>
-              <a:t>mustermann</a:t>
+              <a:t>doe</a:t>
             </a:r>
             <a:r>
               <a:rPr kumimoji="0" lang="de-DE" altLang="de-DE" sz="2400" b="0" i="0" u="none" strike="noStrike" cap="none" normalizeH="0" baseline="0" dirty="0" smtClean="0">
@@ -16645,17 +16821,442 @@
               </a:rPr>
               <a:t>"</a:t>
             </a:r>
+            <a:r>
+              <a:rPr kumimoji="0" lang="de-DE" altLang="de-DE" sz="2400" b="0" i="0" u="none" strike="noStrike" cap="none" normalizeH="0" baseline="0" dirty="0" smtClean="0">
+                <a:ln>
+                  <a:noFill/>
+                </a:ln>
+                <a:solidFill>
+                  <a:srgbClr val="BBBBBB"/>
+                </a:solidFill>
+                <a:effectLst/>
+                <a:latin typeface="JetBrains Mono"/>
+              </a:rPr>
+              <a:t>,</a:t>
+            </a:r>
+            <a:r>
+              <a:rPr kumimoji="0" lang="de-DE" altLang="de-DE" sz="2400" b="0" i="0" u="none" strike="noStrike" cap="none" normalizeH="0" baseline="0" dirty="0" err="1" smtClean="0">
+                <a:ln>
+                  <a:noFill/>
+                </a:ln>
+                <a:solidFill>
+                  <a:srgbClr val="EF596F"/>
+                </a:solidFill>
+                <a:effectLst/>
+                <a:latin typeface="JetBrains Mono"/>
+              </a:rPr>
+              <a:t>department</a:t>
+            </a:r>
+            <a:r>
+              <a:rPr kumimoji="0" lang="de-DE" altLang="de-DE" sz="2400" b="0" i="0" u="none" strike="noStrike" cap="none" normalizeH="0" baseline="0" dirty="0" smtClean="0">
+                <a:ln>
+                  <a:noFill/>
+                </a:ln>
+                <a:solidFill>
+                  <a:srgbClr val="EF596F"/>
+                </a:solidFill>
+                <a:effectLst/>
+                <a:latin typeface="JetBrains Mono"/>
+              </a:rPr>
+              <a:t> </a:t>
+            </a:r>
+            <a:r>
+              <a:rPr kumimoji="0" lang="de-DE" altLang="de-DE" sz="2400" b="0" i="0" u="none" strike="noStrike" cap="none" normalizeH="0" baseline="0" dirty="0" smtClean="0">
+                <a:ln>
+                  <a:noFill/>
+                </a:ln>
+                <a:solidFill>
+                  <a:srgbClr val="BBBBBB"/>
+                </a:solidFill>
+                <a:effectLst/>
+                <a:latin typeface="JetBrains Mono"/>
+              </a:rPr>
+              <a:t>= </a:t>
+            </a:r>
+            <a:r>
+              <a:rPr kumimoji="0" lang="de-DE" altLang="de-DE" sz="2400" b="0" i="0" u="none" strike="noStrike" cap="none" normalizeH="0" baseline="0" dirty="0" smtClean="0">
+                <a:ln>
+                  <a:noFill/>
+                </a:ln>
+                <a:solidFill>
+                  <a:srgbClr val="89CA78"/>
+                </a:solidFill>
+                <a:effectLst/>
+                <a:latin typeface="JetBrains Mono"/>
+              </a:rPr>
+              <a:t>"demo2"</a:t>
+            </a:r>
+            <a:r>
+              <a:rPr kumimoji="0" lang="de-DE" altLang="de-DE" sz="2400" b="0" i="0" u="none" strike="noStrike" cap="none" normalizeH="0" baseline="0" dirty="0" smtClean="0">
+                <a:ln>
+                  <a:noFill/>
+                </a:ln>
+                <a:solidFill>
+                  <a:srgbClr val="BBBBBB"/>
+                </a:solidFill>
+                <a:effectLst/>
+                <a:latin typeface="JetBrains Mono"/>
+              </a:rPr>
+              <a:t>}</a:t>
+            </a:r>
+          </a:p>
+          <a:p>
+            <a:pPr marL="0" marR="0" lvl="0" indent="0" algn="l" defTabSz="914400" rtl="0" eaLnBrk="0" fontAlgn="base" latinLnBrk="0" hangingPunct="0">
+              <a:lnSpc>
+                <a:spcPct val="100000"/>
+              </a:lnSpc>
+              <a:spcBef>
+                <a:spcPct val="0"/>
+              </a:spcBef>
+              <a:spcAft>
+                <a:spcPct val="0"/>
+              </a:spcAft>
+              <a:buClrTx/>
+              <a:buSzTx/>
+              <a:buFontTx/>
+              <a:buNone/>
+              <a:tabLst/>
+            </a:pPr>
+            <a:r>
+              <a:rPr lang="de-DE" altLang="de-DE" sz="2400" dirty="0">
+                <a:solidFill>
+                  <a:srgbClr val="BBBBBB"/>
+                </a:solidFill>
+                <a:latin typeface="JetBrains Mono"/>
+              </a:rPr>
+              <a:t> </a:t>
+            </a:r>
+            <a:r>
+              <a:rPr lang="de-DE" altLang="de-DE" sz="2400" dirty="0" smtClean="0">
+                <a:solidFill>
+                  <a:srgbClr val="BBBBBB"/>
+                </a:solidFill>
+                <a:latin typeface="JetBrains Mono"/>
+              </a:rPr>
+              <a:t> </a:t>
+            </a:r>
+            <a:r>
+              <a:rPr kumimoji="0" lang="de-DE" altLang="de-DE" sz="2400" b="0" i="0" u="none" strike="noStrike" cap="none" normalizeH="0" baseline="0" dirty="0" smtClean="0">
+                <a:ln>
+                  <a:noFill/>
+                </a:ln>
+                <a:solidFill>
+                  <a:srgbClr val="BBBBBB"/>
+                </a:solidFill>
+                <a:effectLst/>
+                <a:latin typeface="JetBrains Mono"/>
+              </a:rPr>
+              <a:t>})</a:t>
+            </a:r>
             <a:br>
               <a:rPr kumimoji="0" lang="de-DE" altLang="de-DE" sz="2400" b="0" i="0" u="none" strike="noStrike" cap="none" normalizeH="0" baseline="0" dirty="0" smtClean="0">
                 <a:ln>
                   <a:noFill/>
                 </a:ln>
                 <a:solidFill>
+                  <a:srgbClr val="BBBBBB"/>
+                </a:solidFill>
+                <a:effectLst/>
+                <a:latin typeface="JetBrains Mono"/>
+              </a:rPr>
+            </a:br>
+            <a:r>
+              <a:rPr kumimoji="0" lang="de-DE" altLang="de-DE" sz="2400" b="0" i="0" u="none" strike="noStrike" cap="none" normalizeH="0" baseline="0" dirty="0" smtClean="0">
+                <a:ln>
+                  <a:noFill/>
+                </a:ln>
+                <a:solidFill>
+                  <a:srgbClr val="BBBBBB"/>
+                </a:solidFill>
+                <a:effectLst/>
+                <a:latin typeface="JetBrains Mono"/>
+              </a:rPr>
+              <a:t>  </a:t>
+            </a:r>
+            <a:r>
+              <a:rPr kumimoji="0" lang="de-DE" altLang="de-DE" sz="2400" b="0" i="0" u="none" strike="noStrike" cap="none" normalizeH="0" baseline="0" dirty="0" err="1" smtClean="0">
+                <a:ln>
+                  <a:noFill/>
+                </a:ln>
+                <a:solidFill>
+                  <a:srgbClr val="EF596F"/>
+                </a:solidFill>
+                <a:effectLst/>
+                <a:latin typeface="JetBrains Mono"/>
+              </a:rPr>
+              <a:t>name</a:t>
+            </a:r>
+            <a:r>
+              <a:rPr kumimoji="0" lang="de-DE" altLang="de-DE" sz="2400" b="0" i="0" u="none" strike="noStrike" cap="none" normalizeH="0" baseline="0" dirty="0" smtClean="0">
+                <a:ln>
+                  <a:noFill/>
+                </a:ln>
+                <a:solidFill>
+                  <a:srgbClr val="EF596F"/>
+                </a:solidFill>
+                <a:effectLst/>
+                <a:latin typeface="JetBrains Mono"/>
+              </a:rPr>
+              <a:t> </a:t>
+            </a:r>
+            <a:r>
+              <a:rPr kumimoji="0" lang="de-DE" altLang="de-DE" sz="2400" b="0" i="0" u="none" strike="noStrike" cap="none" normalizeH="0" baseline="0" dirty="0" smtClean="0">
+                <a:ln>
+                  <a:noFill/>
+                </a:ln>
+                <a:solidFill>
+                  <a:srgbClr val="BBBBBB"/>
+                </a:solidFill>
+                <a:effectLst/>
+                <a:latin typeface="JetBrains Mono"/>
+              </a:rPr>
+              <a:t>= </a:t>
+            </a:r>
+            <a:r>
+              <a:rPr kumimoji="0" lang="de-DE" altLang="de-DE" sz="2400" b="0" i="0" u="none" strike="noStrike" cap="none" normalizeH="0" baseline="0" dirty="0" err="1" smtClean="0">
+                <a:ln>
+                  <a:noFill/>
+                </a:ln>
+                <a:solidFill>
+                  <a:srgbClr val="BBBBBB"/>
+                </a:solidFill>
+                <a:effectLst/>
+                <a:latin typeface="JetBrains Mono"/>
+              </a:rPr>
+              <a:t>join</a:t>
+            </a:r>
+            <a:r>
+              <a:rPr kumimoji="0" lang="de-DE" altLang="de-DE" sz="2400" b="0" i="0" u="none" strike="noStrike" cap="none" normalizeH="0" baseline="0" dirty="0" smtClean="0">
+                <a:ln>
+                  <a:noFill/>
+                </a:ln>
+                <a:solidFill>
+                  <a:srgbClr val="BBBBBB"/>
+                </a:solidFill>
+                <a:effectLst/>
+                <a:latin typeface="JetBrains Mono"/>
+              </a:rPr>
+              <a:t>(</a:t>
+            </a:r>
+            <a:r>
+              <a:rPr kumimoji="0" lang="de-DE" altLang="de-DE" sz="2400" b="0" i="0" u="none" strike="noStrike" cap="none" normalizeH="0" baseline="0" dirty="0" smtClean="0">
+                <a:ln>
+                  <a:noFill/>
+                </a:ln>
+                <a:solidFill>
                   <a:srgbClr val="89CA78"/>
                 </a:solidFill>
                 <a:effectLst/>
                 <a:latin typeface="JetBrains Mono"/>
               </a:rPr>
+              <a:t>"_"</a:t>
+            </a:r>
+            <a:r>
+              <a:rPr kumimoji="0" lang="de-DE" altLang="de-DE" sz="2400" b="0" i="0" u="none" strike="noStrike" cap="none" normalizeH="0" baseline="0" dirty="0" smtClean="0">
+                <a:ln>
+                  <a:noFill/>
+                </a:ln>
+                <a:solidFill>
+                  <a:srgbClr val="BBBBBB"/>
+                </a:solidFill>
+                <a:effectLst/>
+                <a:latin typeface="JetBrains Mono"/>
+              </a:rPr>
+              <a:t>, </a:t>
+            </a:r>
+            <a:r>
+              <a:rPr kumimoji="0" lang="de-DE" altLang="de-DE" sz="2400" b="0" i="0" u="none" strike="noStrike" cap="none" normalizeH="0" baseline="0" dirty="0" err="1" smtClean="0">
+                <a:ln>
+                  <a:noFill/>
+                </a:ln>
+                <a:solidFill>
+                  <a:srgbClr val="BBBBBB"/>
+                </a:solidFill>
+                <a:effectLst/>
+                <a:latin typeface="JetBrains Mono"/>
+              </a:rPr>
+              <a:t>tolist</a:t>
+            </a:r>
+            <a:r>
+              <a:rPr kumimoji="0" lang="de-DE" altLang="de-DE" sz="2400" b="0" i="0" u="none" strike="noStrike" cap="none" normalizeH="0" baseline="0" dirty="0" smtClean="0">
+                <a:ln>
+                  <a:noFill/>
+                </a:ln>
+                <a:solidFill>
+                  <a:srgbClr val="BBBBBB"/>
+                </a:solidFill>
+                <a:effectLst/>
+                <a:latin typeface="JetBrains Mono"/>
+              </a:rPr>
+              <a:t>([</a:t>
+            </a:r>
+            <a:r>
+              <a:rPr kumimoji="0" lang="de-DE" altLang="de-DE" sz="2400" b="0" i="0" u="none" strike="noStrike" cap="none" normalizeH="0" baseline="0" dirty="0" err="1" smtClean="0">
+                <a:ln>
+                  <a:noFill/>
+                </a:ln>
+                <a:solidFill>
+                  <a:srgbClr val="E5C07B"/>
+                </a:solidFill>
+                <a:effectLst/>
+                <a:latin typeface="JetBrains Mono"/>
+              </a:rPr>
+              <a:t>each</a:t>
+            </a:r>
+            <a:r>
+              <a:rPr kumimoji="0" lang="de-DE" altLang="de-DE" sz="2400" b="0" i="0" u="none" strike="noStrike" cap="none" normalizeH="0" baseline="0" dirty="0" err="1" smtClean="0">
+                <a:ln>
+                  <a:noFill/>
+                </a:ln>
+                <a:solidFill>
+                  <a:srgbClr val="BBBBBB"/>
+                </a:solidFill>
+                <a:effectLst/>
+                <a:latin typeface="JetBrains Mono"/>
+              </a:rPr>
+              <a:t>.</a:t>
+            </a:r>
+            <a:r>
+              <a:rPr kumimoji="0" lang="de-DE" altLang="de-DE" sz="2400" b="0" i="0" u="none" strike="noStrike" cap="none" normalizeH="0" baseline="0" dirty="0" err="1" smtClean="0">
+                <a:ln>
+                  <a:noFill/>
+                </a:ln>
+                <a:solidFill>
+                  <a:srgbClr val="E5C07B"/>
+                </a:solidFill>
+                <a:effectLst/>
+                <a:latin typeface="JetBrains Mono"/>
+              </a:rPr>
+              <a:t>key</a:t>
+            </a:r>
+            <a:r>
+              <a:rPr kumimoji="0" lang="de-DE" altLang="de-DE" sz="2400" b="0" i="0" u="none" strike="noStrike" cap="none" normalizeH="0" baseline="0" dirty="0" smtClean="0">
+                <a:ln>
+                  <a:noFill/>
+                </a:ln>
+                <a:solidFill>
+                  <a:srgbClr val="BBBBBB"/>
+                </a:solidFill>
+                <a:effectLst/>
+                <a:latin typeface="JetBrains Mono"/>
+              </a:rPr>
+              <a:t>, </a:t>
+            </a:r>
+            <a:r>
+              <a:rPr kumimoji="0" lang="de-DE" altLang="de-DE" sz="2400" b="0" i="0" u="none" strike="noStrike" cap="none" normalizeH="0" baseline="0" dirty="0" err="1" smtClean="0">
+                <a:ln>
+                  <a:noFill/>
+                </a:ln>
+                <a:solidFill>
+                  <a:srgbClr val="E5C07B"/>
+                </a:solidFill>
+                <a:effectLst/>
+                <a:latin typeface="JetBrains Mono"/>
+              </a:rPr>
+              <a:t>each</a:t>
+            </a:r>
+            <a:r>
+              <a:rPr kumimoji="0" lang="de-DE" altLang="de-DE" sz="2400" b="0" i="0" u="none" strike="noStrike" cap="none" normalizeH="0" baseline="0" dirty="0" err="1" smtClean="0">
+                <a:ln>
+                  <a:noFill/>
+                </a:ln>
+                <a:solidFill>
+                  <a:srgbClr val="BBBBBB"/>
+                </a:solidFill>
+                <a:effectLst/>
+                <a:latin typeface="JetBrains Mono"/>
+              </a:rPr>
+              <a:t>.</a:t>
+            </a:r>
+            <a:r>
+              <a:rPr kumimoji="0" lang="de-DE" altLang="de-DE" sz="2400" b="0" i="0" u="none" strike="noStrike" cap="none" normalizeH="0" baseline="0" dirty="0" err="1" smtClean="0">
+                <a:ln>
+                  <a:noFill/>
+                </a:ln>
+                <a:solidFill>
+                  <a:srgbClr val="E5C07B"/>
+                </a:solidFill>
+                <a:effectLst/>
+                <a:latin typeface="JetBrains Mono"/>
+              </a:rPr>
+              <a:t>value</a:t>
+            </a:r>
+            <a:r>
+              <a:rPr kumimoji="0" lang="de-DE" altLang="de-DE" sz="2400" b="0" i="0" u="none" strike="noStrike" cap="none" normalizeH="0" baseline="0" dirty="0" smtClean="0">
+                <a:ln>
+                  <a:noFill/>
+                </a:ln>
+                <a:solidFill>
+                  <a:srgbClr val="BBBBBB"/>
+                </a:solidFill>
+                <a:effectLst/>
+                <a:latin typeface="JetBrains Mono"/>
+              </a:rPr>
+              <a:t>[</a:t>
+            </a:r>
+            <a:r>
+              <a:rPr kumimoji="0" lang="de-DE" altLang="de-DE" sz="2400" b="0" i="0" u="none" strike="noStrike" cap="none" normalizeH="0" baseline="0" dirty="0" smtClean="0">
+                <a:ln>
+                  <a:noFill/>
+                </a:ln>
+                <a:solidFill>
+                  <a:srgbClr val="89CA78"/>
+                </a:solidFill>
+                <a:effectLst/>
+                <a:latin typeface="JetBrains Mono"/>
+              </a:rPr>
+              <a:t>"</a:t>
+            </a:r>
+            <a:r>
+              <a:rPr kumimoji="0" lang="de-DE" altLang="de-DE" sz="2400" b="0" i="0" u="none" strike="noStrike" cap="none" normalizeH="0" baseline="0" dirty="0" err="1" smtClean="0">
+                <a:ln>
+                  <a:noFill/>
+                </a:ln>
+                <a:solidFill>
+                  <a:srgbClr val="89CA78"/>
+                </a:solidFill>
+                <a:effectLst/>
+                <a:latin typeface="JetBrains Mono"/>
+              </a:rPr>
+              <a:t>name</a:t>
+            </a:r>
+            <a:r>
+              <a:rPr kumimoji="0" lang="de-DE" altLang="de-DE" sz="2400" b="0" i="0" u="none" strike="noStrike" cap="none" normalizeH="0" baseline="0" dirty="0" smtClean="0">
+                <a:ln>
+                  <a:noFill/>
+                </a:ln>
+                <a:solidFill>
+                  <a:srgbClr val="89CA78"/>
+                </a:solidFill>
+                <a:effectLst/>
+                <a:latin typeface="JetBrains Mono"/>
+              </a:rPr>
+              <a:t>"</a:t>
+            </a:r>
+            <a:r>
+              <a:rPr kumimoji="0" lang="de-DE" altLang="de-DE" sz="2400" b="0" i="0" u="none" strike="noStrike" cap="none" normalizeH="0" baseline="0" dirty="0" smtClean="0">
+                <a:ln>
+                  <a:noFill/>
+                </a:ln>
+                <a:solidFill>
+                  <a:srgbClr val="BBBBBB"/>
+                </a:solidFill>
+                <a:effectLst/>
+                <a:latin typeface="JetBrains Mono"/>
+              </a:rPr>
+              <a:t>]]))</a:t>
+            </a:r>
+            <a:br>
+              <a:rPr kumimoji="0" lang="de-DE" altLang="de-DE" sz="2400" b="0" i="0" u="none" strike="noStrike" cap="none" normalizeH="0" baseline="0" dirty="0" smtClean="0">
+                <a:ln>
+                  <a:noFill/>
+                </a:ln>
+                <a:solidFill>
+                  <a:srgbClr val="BBBBBB"/>
+                </a:solidFill>
+                <a:effectLst/>
+                <a:latin typeface="JetBrains Mono"/>
+              </a:rPr>
             </a:br>
             <a:r>
               <a:rPr kumimoji="0" lang="de-DE" altLang="de-DE" sz="2400" b="0" i="0" u="none" strike="noStrike" cap="none" normalizeH="0" baseline="0" dirty="0" smtClean="0">
@@ -16663,623 +17264,7 @@
                   <a:noFill/>
                 </a:ln>
                 <a:solidFill>
-                  <a:srgbClr val="89CA78"/>
-                </a:solidFill>
-                <a:effectLst/>
-                <a:latin typeface="JetBrains Mono"/>
-              </a:rPr>
-              <a:t>      </a:t>
-            </a:r>
-            <a:r>
-              <a:rPr kumimoji="0" lang="de-DE" altLang="de-DE" sz="2400" b="0" i="0" u="none" strike="noStrike" cap="none" normalizeH="0" baseline="0" dirty="0" err="1" smtClean="0">
-                <a:ln>
-                  <a:noFill/>
-                </a:ln>
-                <a:solidFill>
-                  <a:srgbClr val="EF596F"/>
-                </a:solidFill>
-                <a:effectLst/>
-                <a:latin typeface="JetBrains Mono"/>
-              </a:rPr>
-              <a:t>department</a:t>
-            </a:r>
-            <a:r>
-              <a:rPr kumimoji="0" lang="de-DE" altLang="de-DE" sz="2400" b="0" i="0" u="none" strike="noStrike" cap="none" normalizeH="0" baseline="0" dirty="0" smtClean="0">
-                <a:ln>
-                  <a:noFill/>
-                </a:ln>
-                <a:solidFill>
-                  <a:srgbClr val="EF596F"/>
-                </a:solidFill>
-                <a:effectLst/>
-                <a:latin typeface="JetBrains Mono"/>
-              </a:rPr>
-              <a:t> </a:t>
-            </a:r>
-            <a:r>
-              <a:rPr kumimoji="0" lang="de-DE" altLang="de-DE" sz="2400" b="0" i="0" u="none" strike="noStrike" cap="none" normalizeH="0" baseline="0" dirty="0" smtClean="0">
-                <a:ln>
-                  <a:noFill/>
-                </a:ln>
-                <a:solidFill>
-                  <a:srgbClr val="BBBBBB"/>
-                </a:solidFill>
-                <a:effectLst/>
-                <a:latin typeface="JetBrains Mono"/>
-              </a:rPr>
-              <a:t>= </a:t>
-            </a:r>
-            <a:r>
-              <a:rPr kumimoji="0" lang="de-DE" altLang="de-DE" sz="2400" b="0" i="0" u="none" strike="noStrike" cap="none" normalizeH="0" baseline="0" dirty="0" smtClean="0">
-                <a:ln>
-                  <a:noFill/>
-                </a:ln>
-                <a:solidFill>
-                  <a:srgbClr val="89CA78"/>
-                </a:solidFill>
-                <a:effectLst/>
-                <a:latin typeface="JetBrains Mono"/>
-              </a:rPr>
-              <a:t>"demo1"</a:t>
-            </a:r>
-            <a:br>
-              <a:rPr kumimoji="0" lang="de-DE" altLang="de-DE" sz="2400" b="0" i="0" u="none" strike="noStrike" cap="none" normalizeH="0" baseline="0" dirty="0" smtClean="0">
-                <a:ln>
-                  <a:noFill/>
-                </a:ln>
-                <a:solidFill>
-                  <a:srgbClr val="89CA78"/>
-                </a:solidFill>
-                <a:effectLst/>
-                <a:latin typeface="JetBrains Mono"/>
-              </a:rPr>
-            </a:br>
-            <a:r>
-              <a:rPr kumimoji="0" lang="de-DE" altLang="de-DE" sz="2400" b="0" i="0" u="none" strike="noStrike" cap="none" normalizeH="0" baseline="0" dirty="0" smtClean="0">
-                <a:ln>
-                  <a:noFill/>
-                </a:ln>
-                <a:solidFill>
-                  <a:srgbClr val="89CA78"/>
-                </a:solidFill>
-                <a:effectLst/>
-                <a:latin typeface="JetBrains Mono"/>
-              </a:rPr>
-              <a:t>    </a:t>
-            </a:r>
-            <a:r>
-              <a:rPr kumimoji="0" lang="de-DE" altLang="de-DE" sz="2400" b="0" i="0" u="none" strike="noStrike" cap="none" normalizeH="0" baseline="0" dirty="0" smtClean="0">
-                <a:ln>
-                  <a:noFill/>
-                </a:ln>
-                <a:solidFill>
-                  <a:srgbClr val="BBBBBB"/>
-                </a:solidFill>
-                <a:effectLst/>
-                <a:latin typeface="JetBrains Mono"/>
-              </a:rPr>
-              <a:t>}</a:t>
-            </a:r>
-            <a:br>
-              <a:rPr kumimoji="0" lang="de-DE" altLang="de-DE" sz="2400" b="0" i="0" u="none" strike="noStrike" cap="none" normalizeH="0" baseline="0" dirty="0" smtClean="0">
-                <a:ln>
-                  <a:noFill/>
-                </a:ln>
-                <a:solidFill>
-                  <a:srgbClr val="BBBBBB"/>
-                </a:solidFill>
-                <a:effectLst/>
-                <a:latin typeface="JetBrains Mono"/>
-              </a:rPr>
-            </a:br>
-            <a:r>
-              <a:rPr kumimoji="0" lang="de-DE" altLang="de-DE" sz="2400" b="0" i="0" u="none" strike="noStrike" cap="none" normalizeH="0" baseline="0" dirty="0" smtClean="0">
-                <a:ln>
-                  <a:noFill/>
-                </a:ln>
-                <a:solidFill>
-                  <a:srgbClr val="BBBBBB"/>
-                </a:solidFill>
-                <a:effectLst/>
-                <a:latin typeface="JetBrains Mono"/>
-              </a:rPr>
-              <a:t>    </a:t>
-            </a:r>
-            <a:r>
-              <a:rPr kumimoji="0" lang="de-DE" altLang="de-DE" sz="2400" b="0" i="0" u="none" strike="noStrike" cap="none" normalizeH="0" baseline="0" dirty="0" smtClean="0">
-                <a:ln>
-                  <a:noFill/>
-                </a:ln>
-                <a:solidFill>
-                  <a:srgbClr val="EF596F"/>
-                </a:solidFill>
-                <a:effectLst/>
-                <a:latin typeface="JetBrains Mono"/>
-              </a:rPr>
-              <a:t>0815 </a:t>
-            </a:r>
-            <a:r>
-              <a:rPr kumimoji="0" lang="de-DE" altLang="de-DE" sz="2400" b="0" i="0" u="none" strike="noStrike" cap="none" normalizeH="0" baseline="0" dirty="0" smtClean="0">
-                <a:ln>
-                  <a:noFill/>
-                </a:ln>
-                <a:solidFill>
-                  <a:srgbClr val="BBBBBB"/>
-                </a:solidFill>
-                <a:effectLst/>
-                <a:latin typeface="JetBrains Mono"/>
-              </a:rPr>
-              <a:t>= {</a:t>
-            </a:r>
-            <a:br>
-              <a:rPr kumimoji="0" lang="de-DE" altLang="de-DE" sz="2400" b="0" i="0" u="none" strike="noStrike" cap="none" normalizeH="0" baseline="0" dirty="0" smtClean="0">
-                <a:ln>
-                  <a:noFill/>
-                </a:ln>
-                <a:solidFill>
-                  <a:srgbClr val="BBBBBB"/>
-                </a:solidFill>
-                <a:effectLst/>
-                <a:latin typeface="JetBrains Mono"/>
-              </a:rPr>
-            </a:br>
-            <a:r>
-              <a:rPr kumimoji="0" lang="de-DE" altLang="de-DE" sz="2400" b="0" i="0" u="none" strike="noStrike" cap="none" normalizeH="0" baseline="0" dirty="0" smtClean="0">
-                <a:ln>
-                  <a:noFill/>
-                </a:ln>
-                <a:solidFill>
-                  <a:srgbClr val="BBBBBB"/>
-                </a:solidFill>
-                <a:effectLst/>
-                <a:latin typeface="JetBrains Mono"/>
-              </a:rPr>
-              <a:t>      </a:t>
-            </a:r>
-            <a:r>
-              <a:rPr kumimoji="0" lang="de-DE" altLang="de-DE" sz="2400" b="0" i="0" u="none" strike="noStrike" cap="none" normalizeH="0" baseline="0" dirty="0" err="1" smtClean="0">
-                <a:ln>
-                  <a:noFill/>
-                </a:ln>
-                <a:solidFill>
-                  <a:srgbClr val="EF596F"/>
-                </a:solidFill>
-                <a:effectLst/>
-                <a:latin typeface="JetBrains Mono"/>
-              </a:rPr>
-              <a:t>name</a:t>
-            </a:r>
-            <a:r>
-              <a:rPr kumimoji="0" lang="de-DE" altLang="de-DE" sz="2400" b="0" i="0" u="none" strike="noStrike" cap="none" normalizeH="0" baseline="0" dirty="0" smtClean="0">
-                <a:ln>
-                  <a:noFill/>
-                </a:ln>
-                <a:solidFill>
-                  <a:srgbClr val="EF596F"/>
-                </a:solidFill>
-                <a:effectLst/>
-                <a:latin typeface="JetBrains Mono"/>
-              </a:rPr>
-              <a:t> </a:t>
-            </a:r>
-            <a:r>
-              <a:rPr kumimoji="0" lang="de-DE" altLang="de-DE" sz="2400" b="0" i="0" u="none" strike="noStrike" cap="none" normalizeH="0" baseline="0" dirty="0" smtClean="0">
-                <a:ln>
-                  <a:noFill/>
-                </a:ln>
-                <a:solidFill>
-                  <a:srgbClr val="BBBBBB"/>
-                </a:solidFill>
-                <a:effectLst/>
-                <a:latin typeface="JetBrains Mono"/>
-              </a:rPr>
-              <a:t>= </a:t>
-            </a:r>
-            <a:r>
-              <a:rPr kumimoji="0" lang="de-DE" altLang="de-DE" sz="2400" b="0" i="0" u="none" strike="noStrike" cap="none" normalizeH="0" baseline="0" dirty="0" smtClean="0">
-                <a:ln>
-                  <a:noFill/>
-                </a:ln>
-                <a:solidFill>
-                  <a:srgbClr val="89CA78"/>
-                </a:solidFill>
-                <a:effectLst/>
-                <a:latin typeface="JetBrains Mono"/>
-              </a:rPr>
-              <a:t>"</a:t>
-            </a:r>
-            <a:r>
-              <a:rPr kumimoji="0" lang="de-DE" altLang="de-DE" sz="2400" b="0" i="0" u="none" strike="noStrike" cap="none" normalizeH="0" baseline="0" dirty="0" err="1" smtClean="0">
-                <a:ln>
-                  <a:noFill/>
-                </a:ln>
-                <a:solidFill>
-                  <a:srgbClr val="89CA78"/>
-                </a:solidFill>
-                <a:effectLst/>
-                <a:latin typeface="JetBrains Mono"/>
-              </a:rPr>
-              <a:t>doe</a:t>
-            </a:r>
-            <a:r>
-              <a:rPr kumimoji="0" lang="de-DE" altLang="de-DE" sz="2400" b="0" i="0" u="none" strike="noStrike" cap="none" normalizeH="0" baseline="0" dirty="0" smtClean="0">
-                <a:ln>
-                  <a:noFill/>
-                </a:ln>
-                <a:solidFill>
-                  <a:srgbClr val="89CA78"/>
-                </a:solidFill>
-                <a:effectLst/>
-                <a:latin typeface="JetBrains Mono"/>
-              </a:rPr>
-              <a:t>"</a:t>
-            </a:r>
-            <a:br>
-              <a:rPr kumimoji="0" lang="de-DE" altLang="de-DE" sz="2400" b="0" i="0" u="none" strike="noStrike" cap="none" normalizeH="0" baseline="0" dirty="0" smtClean="0">
-                <a:ln>
-                  <a:noFill/>
-                </a:ln>
-                <a:solidFill>
-                  <a:srgbClr val="89CA78"/>
-                </a:solidFill>
-                <a:effectLst/>
-                <a:latin typeface="JetBrains Mono"/>
-              </a:rPr>
-            </a:br>
-            <a:r>
-              <a:rPr kumimoji="0" lang="de-DE" altLang="de-DE" sz="2400" b="0" i="0" u="none" strike="noStrike" cap="none" normalizeH="0" baseline="0" dirty="0" smtClean="0">
-                <a:ln>
-                  <a:noFill/>
-                </a:ln>
-                <a:solidFill>
-                  <a:srgbClr val="89CA78"/>
-                </a:solidFill>
-                <a:effectLst/>
-                <a:latin typeface="JetBrains Mono"/>
-              </a:rPr>
-              <a:t>      </a:t>
-            </a:r>
-            <a:r>
-              <a:rPr kumimoji="0" lang="de-DE" altLang="de-DE" sz="2400" b="0" i="0" u="none" strike="noStrike" cap="none" normalizeH="0" baseline="0" dirty="0" err="1" smtClean="0">
-                <a:ln>
-                  <a:noFill/>
-                </a:ln>
-                <a:solidFill>
-                  <a:srgbClr val="EF596F"/>
-                </a:solidFill>
-                <a:effectLst/>
-                <a:latin typeface="JetBrains Mono"/>
-              </a:rPr>
-              <a:t>department</a:t>
-            </a:r>
-            <a:r>
-              <a:rPr kumimoji="0" lang="de-DE" altLang="de-DE" sz="2400" b="0" i="0" u="none" strike="noStrike" cap="none" normalizeH="0" baseline="0" dirty="0" smtClean="0">
-                <a:ln>
-                  <a:noFill/>
-                </a:ln>
-                <a:solidFill>
-                  <a:srgbClr val="EF596F"/>
-                </a:solidFill>
-                <a:effectLst/>
-                <a:latin typeface="JetBrains Mono"/>
-              </a:rPr>
-              <a:t> </a:t>
-            </a:r>
-            <a:r>
-              <a:rPr kumimoji="0" lang="de-DE" altLang="de-DE" sz="2400" b="0" i="0" u="none" strike="noStrike" cap="none" normalizeH="0" baseline="0" dirty="0" smtClean="0">
-                <a:ln>
-                  <a:noFill/>
-                </a:ln>
-                <a:solidFill>
-                  <a:srgbClr val="BBBBBB"/>
-                </a:solidFill>
-                <a:effectLst/>
-                <a:latin typeface="JetBrains Mono"/>
-              </a:rPr>
-              <a:t>= </a:t>
-            </a:r>
-            <a:r>
-              <a:rPr kumimoji="0" lang="de-DE" altLang="de-DE" sz="2400" b="0" i="0" u="none" strike="noStrike" cap="none" normalizeH="0" baseline="0" dirty="0" smtClean="0">
-                <a:ln>
-                  <a:noFill/>
-                </a:ln>
-                <a:solidFill>
-                  <a:srgbClr val="89CA78"/>
-                </a:solidFill>
-                <a:effectLst/>
-                <a:latin typeface="JetBrains Mono"/>
-              </a:rPr>
-              <a:t>"demo2"</a:t>
-            </a:r>
-            <a:br>
-              <a:rPr kumimoji="0" lang="de-DE" altLang="de-DE" sz="2400" b="0" i="0" u="none" strike="noStrike" cap="none" normalizeH="0" baseline="0" dirty="0" smtClean="0">
-                <a:ln>
-                  <a:noFill/>
-                </a:ln>
-                <a:solidFill>
-                  <a:srgbClr val="89CA78"/>
-                </a:solidFill>
-                <a:effectLst/>
-                <a:latin typeface="JetBrains Mono"/>
-              </a:rPr>
-            </a:br>
-            <a:r>
-              <a:rPr kumimoji="0" lang="de-DE" altLang="de-DE" sz="2400" b="0" i="0" u="none" strike="noStrike" cap="none" normalizeH="0" baseline="0" dirty="0" smtClean="0">
-                <a:ln>
-                  <a:noFill/>
-                </a:ln>
-                <a:solidFill>
-                  <a:srgbClr val="89CA78"/>
-                </a:solidFill>
-                <a:effectLst/>
-                <a:latin typeface="JetBrains Mono"/>
-              </a:rPr>
-              <a:t>    </a:t>
-            </a:r>
-            <a:r>
-              <a:rPr kumimoji="0" lang="de-DE" altLang="de-DE" sz="2400" b="0" i="0" u="none" strike="noStrike" cap="none" normalizeH="0" baseline="0" dirty="0" smtClean="0">
-                <a:ln>
-                  <a:noFill/>
-                </a:ln>
-                <a:solidFill>
-                  <a:srgbClr val="BBBBBB"/>
-                </a:solidFill>
-                <a:effectLst/>
-                <a:latin typeface="JetBrains Mono"/>
-              </a:rPr>
-              <a:t>}</a:t>
-            </a:r>
-            <a:br>
-              <a:rPr kumimoji="0" lang="de-DE" altLang="de-DE" sz="2400" b="0" i="0" u="none" strike="noStrike" cap="none" normalizeH="0" baseline="0" dirty="0" smtClean="0">
-                <a:ln>
-                  <a:noFill/>
-                </a:ln>
-                <a:solidFill>
-                  <a:srgbClr val="BBBBBB"/>
-                </a:solidFill>
-                <a:effectLst/>
-                <a:latin typeface="JetBrains Mono"/>
-              </a:rPr>
-            </a:br>
-            <a:r>
-              <a:rPr kumimoji="0" lang="de-DE" altLang="de-DE" sz="2400" b="0" i="0" u="none" strike="noStrike" cap="none" normalizeH="0" baseline="0" dirty="0" smtClean="0">
-                <a:ln>
-                  <a:noFill/>
-                </a:ln>
-                <a:solidFill>
-                  <a:srgbClr val="BBBBBB"/>
-                </a:solidFill>
-                <a:effectLst/>
-                <a:latin typeface="JetBrains Mono"/>
-              </a:rPr>
-              <a:t>  })</a:t>
-            </a:r>
-            <a:br>
-              <a:rPr kumimoji="0" lang="de-DE" altLang="de-DE" sz="2400" b="0" i="0" u="none" strike="noStrike" cap="none" normalizeH="0" baseline="0" dirty="0" smtClean="0">
-                <a:ln>
-                  <a:noFill/>
-                </a:ln>
-                <a:solidFill>
-                  <a:srgbClr val="BBBBBB"/>
-                </a:solidFill>
-                <a:effectLst/>
-                <a:latin typeface="JetBrains Mono"/>
-              </a:rPr>
-            </a:br>
-            <a:r>
-              <a:rPr kumimoji="0" lang="de-DE" altLang="de-DE" sz="2400" b="0" i="0" u="none" strike="noStrike" cap="none" normalizeH="0" baseline="0" dirty="0" smtClean="0">
-                <a:ln>
-                  <a:noFill/>
-                </a:ln>
-                <a:solidFill>
-                  <a:srgbClr val="BBBBBB"/>
-                </a:solidFill>
-                <a:effectLst/>
-                <a:latin typeface="JetBrains Mono"/>
-              </a:rPr>
-              <a:t>  </a:t>
-            </a:r>
-            <a:r>
-              <a:rPr kumimoji="0" lang="de-DE" altLang="de-DE" sz="2400" b="0" i="0" u="none" strike="noStrike" cap="none" normalizeH="0" baseline="0" dirty="0" err="1" smtClean="0">
-                <a:ln>
-                  <a:noFill/>
-                </a:ln>
-                <a:solidFill>
-                  <a:srgbClr val="EF596F"/>
-                </a:solidFill>
-                <a:effectLst/>
-                <a:latin typeface="JetBrains Mono"/>
-              </a:rPr>
-              <a:t>name</a:t>
-            </a:r>
-            <a:r>
-              <a:rPr kumimoji="0" lang="de-DE" altLang="de-DE" sz="2400" b="0" i="0" u="none" strike="noStrike" cap="none" normalizeH="0" baseline="0" dirty="0" smtClean="0">
-                <a:ln>
-                  <a:noFill/>
-                </a:ln>
-                <a:solidFill>
-                  <a:srgbClr val="EF596F"/>
-                </a:solidFill>
-                <a:effectLst/>
-                <a:latin typeface="JetBrains Mono"/>
-              </a:rPr>
-              <a:t>     </a:t>
-            </a:r>
-            <a:r>
-              <a:rPr kumimoji="0" lang="de-DE" altLang="de-DE" sz="2400" b="0" i="0" u="none" strike="noStrike" cap="none" normalizeH="0" baseline="0" dirty="0" smtClean="0">
-                <a:ln>
-                  <a:noFill/>
-                </a:ln>
-                <a:solidFill>
-                  <a:srgbClr val="BBBBBB"/>
-                </a:solidFill>
-                <a:effectLst/>
-                <a:latin typeface="JetBrains Mono"/>
-              </a:rPr>
-              <a:t>= </a:t>
-            </a:r>
-            <a:r>
-              <a:rPr kumimoji="0" lang="de-DE" altLang="de-DE" sz="2400" b="0" i="0" u="none" strike="noStrike" cap="none" normalizeH="0" baseline="0" dirty="0" smtClean="0">
-                <a:ln>
-                  <a:noFill/>
-                </a:ln>
-                <a:solidFill>
-                  <a:srgbClr val="89CA78"/>
-                </a:solidFill>
-                <a:effectLst/>
-                <a:latin typeface="JetBrains Mono"/>
-              </a:rPr>
-              <a:t>"${</a:t>
-            </a:r>
-            <a:r>
-              <a:rPr kumimoji="0" lang="de-DE" altLang="de-DE" sz="2400" b="0" i="0" u="none" strike="noStrike" cap="none" normalizeH="0" baseline="0" dirty="0" err="1" smtClean="0">
-                <a:ln>
-                  <a:noFill/>
-                </a:ln>
-                <a:solidFill>
-                  <a:srgbClr val="E5C07B"/>
-                </a:solidFill>
-                <a:effectLst/>
-                <a:latin typeface="JetBrains Mono"/>
-              </a:rPr>
-              <a:t>each</a:t>
-            </a:r>
-            <a:r>
-              <a:rPr kumimoji="0" lang="de-DE" altLang="de-DE" sz="2400" b="0" i="0" u="none" strike="noStrike" cap="none" normalizeH="0" baseline="0" dirty="0" err="1" smtClean="0">
-                <a:ln>
-                  <a:noFill/>
-                </a:ln>
-                <a:solidFill>
-                  <a:srgbClr val="89CA78"/>
-                </a:solidFill>
-                <a:effectLst/>
-                <a:latin typeface="JetBrains Mono"/>
-              </a:rPr>
-              <a:t>.</a:t>
-            </a:r>
-            <a:r>
-              <a:rPr kumimoji="0" lang="de-DE" altLang="de-DE" sz="2400" b="0" i="0" u="none" strike="noStrike" cap="none" normalizeH="0" baseline="0" dirty="0" err="1" smtClean="0">
-                <a:ln>
-                  <a:noFill/>
-                </a:ln>
-                <a:solidFill>
-                  <a:srgbClr val="E5C07B"/>
-                </a:solidFill>
-                <a:effectLst/>
-                <a:latin typeface="JetBrains Mono"/>
-              </a:rPr>
-              <a:t>key</a:t>
-            </a:r>
-            <a:r>
-              <a:rPr kumimoji="0" lang="de-DE" altLang="de-DE" sz="2400" b="0" i="0" u="none" strike="noStrike" cap="none" normalizeH="0" baseline="0" dirty="0" smtClean="0">
-                <a:ln>
-                  <a:noFill/>
-                </a:ln>
-                <a:solidFill>
-                  <a:srgbClr val="89CA78"/>
-                </a:solidFill>
-                <a:effectLst/>
-                <a:latin typeface="JetBrains Mono"/>
-              </a:rPr>
-              <a:t>}-${</a:t>
-            </a:r>
-            <a:r>
-              <a:rPr kumimoji="0" lang="de-DE" altLang="de-DE" sz="2400" b="0" i="0" u="none" strike="noStrike" cap="none" normalizeH="0" baseline="0" dirty="0" err="1" smtClean="0">
-                <a:ln>
-                  <a:noFill/>
-                </a:ln>
-                <a:solidFill>
-                  <a:srgbClr val="E5C07B"/>
-                </a:solidFill>
-                <a:effectLst/>
-                <a:latin typeface="JetBrains Mono"/>
-              </a:rPr>
-              <a:t>each</a:t>
-            </a:r>
-            <a:r>
-              <a:rPr kumimoji="0" lang="de-DE" altLang="de-DE" sz="2400" b="0" i="0" u="none" strike="noStrike" cap="none" normalizeH="0" baseline="0" dirty="0" err="1" smtClean="0">
-                <a:ln>
-                  <a:noFill/>
-                </a:ln>
-                <a:solidFill>
-                  <a:srgbClr val="89CA78"/>
-                </a:solidFill>
-                <a:effectLst/>
-                <a:latin typeface="JetBrains Mono"/>
-              </a:rPr>
-              <a:t>.</a:t>
-            </a:r>
-            <a:r>
-              <a:rPr kumimoji="0" lang="de-DE" altLang="de-DE" sz="2400" b="0" i="0" u="none" strike="noStrike" cap="none" normalizeH="0" baseline="0" dirty="0" err="1" smtClean="0">
-                <a:ln>
-                  <a:noFill/>
-                </a:ln>
-                <a:solidFill>
-                  <a:srgbClr val="E5C07B"/>
-                </a:solidFill>
-                <a:effectLst/>
-                <a:latin typeface="JetBrains Mono"/>
-              </a:rPr>
-              <a:t>value</a:t>
-            </a:r>
-            <a:r>
-              <a:rPr kumimoji="0" lang="de-DE" altLang="de-DE" sz="2400" b="0" i="0" u="none" strike="noStrike" cap="none" normalizeH="0" baseline="0" dirty="0" smtClean="0">
-                <a:ln>
-                  <a:noFill/>
-                </a:ln>
-                <a:solidFill>
-                  <a:srgbClr val="89CA78"/>
-                </a:solidFill>
-                <a:effectLst/>
-                <a:latin typeface="JetBrains Mono"/>
-              </a:rPr>
-              <a:t>[</a:t>
-            </a:r>
-            <a:r>
-              <a:rPr kumimoji="0" lang="de-DE" altLang="de-DE" sz="2400" b="0" i="0" u="none" strike="noStrike" cap="none" normalizeH="0" baseline="0" dirty="0" err="1" smtClean="0">
-                <a:ln>
-                  <a:noFill/>
-                </a:ln>
-                <a:solidFill>
-                  <a:srgbClr val="89CA78"/>
-                </a:solidFill>
-                <a:effectLst/>
-                <a:latin typeface="JetBrains Mono"/>
-              </a:rPr>
-              <a:t>name</a:t>
-            </a:r>
-            <a:r>
-              <a:rPr kumimoji="0" lang="de-DE" altLang="de-DE" sz="2400" b="0" i="0" u="none" strike="noStrike" cap="none" normalizeH="0" baseline="0" dirty="0" smtClean="0">
-                <a:ln>
-                  <a:noFill/>
-                </a:ln>
-                <a:solidFill>
-                  <a:srgbClr val="89CA78"/>
-                </a:solidFill>
-                <a:effectLst/>
-                <a:latin typeface="JetBrains Mono"/>
-              </a:rPr>
-              <a:t>]}"</a:t>
-            </a:r>
-            <a:br>
-              <a:rPr kumimoji="0" lang="de-DE" altLang="de-DE" sz="2400" b="0" i="0" u="none" strike="noStrike" cap="none" normalizeH="0" baseline="0" dirty="0" smtClean="0">
-                <a:ln>
-                  <a:noFill/>
-                </a:ln>
-                <a:solidFill>
-                  <a:srgbClr val="89CA78"/>
-                </a:solidFill>
-                <a:effectLst/>
-                <a:latin typeface="JetBrains Mono"/>
-              </a:rPr>
-            </a:br>
-            <a:r>
-              <a:rPr kumimoji="0" lang="de-DE" altLang="de-DE" sz="2400" b="0" i="0" u="none" strike="noStrike" cap="none" normalizeH="0" baseline="0" dirty="0" smtClean="0">
-                <a:ln>
-                  <a:noFill/>
-                </a:ln>
-                <a:solidFill>
-                  <a:srgbClr val="89CA78"/>
+                  <a:srgbClr val="BBBBBB"/>
                 </a:solidFill>
                 <a:effectLst/>
                 <a:latin typeface="JetBrains Mono"/>
@@ -17643,8 +17628,8 @@
         </p:nvSpPr>
         <p:spPr bwMode="auto">
           <a:xfrm>
-            <a:off x="361244" y="3273065"/>
-            <a:ext cx="11638845" cy="3416320"/>
+            <a:off x="1068211" y="3329509"/>
+            <a:ext cx="10055578" cy="3416320"/>
           </a:xfrm>
           <a:prstGeom prst="rect">
             <a:avLst/>
@@ -17687,23 +17672,611 @@
           </a:bodyPr>
           <a:lstStyle/>
           <a:p>
-            <a:pPr marL="0" marR="0" lvl="0" indent="0" algn="l" defTabSz="914400" rtl="0" eaLnBrk="0" fontAlgn="base" latinLnBrk="0" hangingPunct="0">
-              <a:lnSpc>
-                <a:spcPct val="100000"/>
-              </a:lnSpc>
+            <a:pPr eaLnBrk="0" fontAlgn="base" hangingPunct="0">
               <a:spcBef>
                 <a:spcPct val="0"/>
               </a:spcBef>
               <a:spcAft>
                 <a:spcPct val="0"/>
               </a:spcAft>
-              <a:buClrTx/>
-              <a:buSzTx/>
-              <a:buFontTx/>
-              <a:buNone/>
-              <a:tabLst/>
             </a:pPr>
             <a:r>
+              <a:rPr lang="de-DE" altLang="de-DE" sz="2400" i="1" dirty="0" err="1">
+                <a:solidFill>
+                  <a:srgbClr val="D55FDE"/>
+                </a:solidFill>
+                <a:latin typeface="JetBrains Mono"/>
+              </a:rPr>
+              <a:t>resource</a:t>
+            </a:r>
+            <a:r>
+              <a:rPr lang="de-DE" altLang="de-DE" sz="2400" i="1" dirty="0">
+                <a:solidFill>
+                  <a:srgbClr val="D55FDE"/>
+                </a:solidFill>
+                <a:latin typeface="JetBrains Mono"/>
+              </a:rPr>
+              <a:t> </a:t>
+            </a:r>
+            <a:r>
+              <a:rPr lang="de-DE" altLang="de-DE" sz="2400" dirty="0">
+                <a:solidFill>
+                  <a:srgbClr val="E5C07B"/>
+                </a:solidFill>
+                <a:latin typeface="JetBrains Mono"/>
+              </a:rPr>
+              <a:t>"</a:t>
+            </a:r>
+            <a:r>
+              <a:rPr lang="de-DE" altLang="de-DE" sz="2400" dirty="0" err="1">
+                <a:solidFill>
+                  <a:srgbClr val="E5C07B"/>
+                </a:solidFill>
+                <a:latin typeface="JetBrains Mono"/>
+              </a:rPr>
+              <a:t>aws_iam_user</a:t>
+            </a:r>
+            <a:r>
+              <a:rPr lang="de-DE" altLang="de-DE" sz="2400" dirty="0">
+                <a:solidFill>
+                  <a:srgbClr val="E5C07B"/>
+                </a:solidFill>
+                <a:latin typeface="JetBrains Mono"/>
+              </a:rPr>
+              <a:t>" "</a:t>
+            </a:r>
+            <a:r>
+              <a:rPr lang="de-DE" altLang="de-DE" sz="2400" dirty="0" err="1">
+                <a:solidFill>
+                  <a:srgbClr val="E5C07B"/>
+                </a:solidFill>
+                <a:latin typeface="JetBrains Mono"/>
+              </a:rPr>
+              <a:t>demo_user</a:t>
+            </a:r>
+            <a:r>
+              <a:rPr lang="de-DE" altLang="de-DE" sz="2400" dirty="0">
+                <a:solidFill>
+                  <a:srgbClr val="E5C07B"/>
+                </a:solidFill>
+                <a:latin typeface="JetBrains Mono"/>
+              </a:rPr>
+              <a:t>" </a:t>
+            </a:r>
+            <a:r>
+              <a:rPr lang="de-DE" altLang="de-DE" sz="2400" dirty="0">
+                <a:solidFill>
+                  <a:srgbClr val="BBBBBB"/>
+                </a:solidFill>
+                <a:latin typeface="JetBrains Mono"/>
+              </a:rPr>
+              <a:t>{</a:t>
+            </a:r>
+            <a:br>
+              <a:rPr lang="de-DE" altLang="de-DE" sz="2400" dirty="0">
+                <a:solidFill>
+                  <a:srgbClr val="BBBBBB"/>
+                </a:solidFill>
+                <a:latin typeface="JetBrains Mono"/>
+              </a:rPr>
+            </a:br>
+            <a:r>
+              <a:rPr lang="de-DE" altLang="de-DE" sz="2400" dirty="0">
+                <a:solidFill>
+                  <a:srgbClr val="BBBBBB"/>
+                </a:solidFill>
+                <a:latin typeface="JetBrains Mono"/>
+              </a:rPr>
+              <a:t>  </a:t>
+            </a:r>
+            <a:r>
+              <a:rPr lang="de-DE" altLang="de-DE" sz="2400" dirty="0" err="1">
+                <a:solidFill>
+                  <a:srgbClr val="EF596F"/>
+                </a:solidFill>
+                <a:latin typeface="JetBrains Mono"/>
+              </a:rPr>
+              <a:t>for_each</a:t>
+            </a:r>
+            <a:r>
+              <a:rPr lang="de-DE" altLang="de-DE" sz="2400" dirty="0">
+                <a:solidFill>
+                  <a:srgbClr val="EF596F"/>
+                </a:solidFill>
+                <a:latin typeface="JetBrains Mono"/>
+              </a:rPr>
+              <a:t> </a:t>
+            </a:r>
+            <a:r>
+              <a:rPr lang="de-DE" altLang="de-DE" sz="2400" dirty="0">
+                <a:solidFill>
+                  <a:srgbClr val="BBBBBB"/>
+                </a:solidFill>
+                <a:latin typeface="JetBrains Mono"/>
+              </a:rPr>
+              <a:t>= </a:t>
+            </a:r>
+            <a:r>
+              <a:rPr lang="de-DE" altLang="de-DE" sz="2400" dirty="0" err="1">
+                <a:solidFill>
+                  <a:srgbClr val="BBBBBB"/>
+                </a:solidFill>
+                <a:latin typeface="JetBrains Mono"/>
+              </a:rPr>
+              <a:t>tomap</a:t>
+            </a:r>
+            <a:r>
+              <a:rPr lang="de-DE" altLang="de-DE" sz="2400" dirty="0">
+                <a:solidFill>
+                  <a:srgbClr val="BBBBBB"/>
+                </a:solidFill>
+                <a:latin typeface="JetBrains Mono"/>
+              </a:rPr>
+              <a:t>({</a:t>
+            </a:r>
+            <a:br>
+              <a:rPr lang="de-DE" altLang="de-DE" sz="2400" dirty="0">
+                <a:solidFill>
+                  <a:srgbClr val="BBBBBB"/>
+                </a:solidFill>
+                <a:latin typeface="JetBrains Mono"/>
+              </a:rPr>
+            </a:br>
+            <a:r>
+              <a:rPr lang="de-DE" altLang="de-DE" sz="2400" dirty="0">
+                <a:solidFill>
+                  <a:srgbClr val="BBBBBB"/>
+                </a:solidFill>
+                <a:latin typeface="JetBrains Mono"/>
+              </a:rPr>
+              <a:t>    </a:t>
+            </a:r>
+            <a:r>
+              <a:rPr lang="de-DE" altLang="de-DE" sz="2400" dirty="0">
+                <a:solidFill>
+                  <a:srgbClr val="EF596F"/>
+                </a:solidFill>
+                <a:latin typeface="JetBrains Mono"/>
+              </a:rPr>
+              <a:t>"4711" </a:t>
+            </a:r>
+            <a:r>
+              <a:rPr lang="de-DE" altLang="de-DE" sz="2400" dirty="0">
+                <a:solidFill>
+                  <a:srgbClr val="BBBBBB"/>
+                </a:solidFill>
+                <a:latin typeface="JetBrains Mono"/>
+              </a:rPr>
+              <a:t>= {</a:t>
+            </a:r>
+            <a:r>
+              <a:rPr lang="de-DE" altLang="de-DE" sz="2400" dirty="0" err="1">
+                <a:solidFill>
+                  <a:srgbClr val="EF596F"/>
+                </a:solidFill>
+                <a:latin typeface="JetBrains Mono"/>
+              </a:rPr>
+              <a:t>name</a:t>
+            </a:r>
+            <a:r>
+              <a:rPr lang="de-DE" altLang="de-DE" sz="2400" dirty="0">
+                <a:solidFill>
+                  <a:srgbClr val="EF596F"/>
+                </a:solidFill>
+                <a:latin typeface="JetBrains Mono"/>
+              </a:rPr>
+              <a:t> </a:t>
+            </a:r>
+            <a:r>
+              <a:rPr lang="de-DE" altLang="de-DE" sz="2400" dirty="0">
+                <a:solidFill>
+                  <a:srgbClr val="BBBBBB"/>
+                </a:solidFill>
+                <a:latin typeface="JetBrains Mono"/>
+              </a:rPr>
+              <a:t>= </a:t>
+            </a:r>
+            <a:r>
+              <a:rPr lang="de-DE" altLang="de-DE" sz="2400" dirty="0">
+                <a:solidFill>
+                  <a:srgbClr val="89CA78"/>
+                </a:solidFill>
+                <a:latin typeface="JetBrains Mono"/>
+              </a:rPr>
+              <a:t>"</a:t>
+            </a:r>
+            <a:r>
+              <a:rPr lang="de-DE" altLang="de-DE" sz="2400" dirty="0" err="1">
+                <a:solidFill>
+                  <a:srgbClr val="89CA78"/>
+                </a:solidFill>
+                <a:latin typeface="JetBrains Mono"/>
+              </a:rPr>
+              <a:t>mustermann</a:t>
+            </a:r>
+            <a:r>
+              <a:rPr lang="de-DE" altLang="de-DE" sz="2400" dirty="0">
+                <a:solidFill>
+                  <a:srgbClr val="89CA78"/>
+                </a:solidFill>
+                <a:latin typeface="JetBrains Mono"/>
+              </a:rPr>
+              <a:t>"</a:t>
+            </a:r>
+            <a:r>
+              <a:rPr lang="de-DE" altLang="de-DE" sz="2400" dirty="0">
+                <a:solidFill>
+                  <a:srgbClr val="BBBBBB"/>
+                </a:solidFill>
+                <a:latin typeface="JetBrains Mono"/>
+              </a:rPr>
+              <a:t>,</a:t>
+            </a:r>
+            <a:r>
+              <a:rPr lang="de-DE" altLang="de-DE" sz="2400" dirty="0" err="1">
+                <a:solidFill>
+                  <a:srgbClr val="EF596F"/>
+                </a:solidFill>
+                <a:latin typeface="JetBrains Mono"/>
+              </a:rPr>
+              <a:t>department</a:t>
+            </a:r>
+            <a:r>
+              <a:rPr lang="de-DE" altLang="de-DE" sz="2400" dirty="0">
+                <a:solidFill>
+                  <a:srgbClr val="EF596F"/>
+                </a:solidFill>
+                <a:latin typeface="JetBrains Mono"/>
+              </a:rPr>
+              <a:t> </a:t>
+            </a:r>
+            <a:r>
+              <a:rPr lang="de-DE" altLang="de-DE" sz="2400" dirty="0">
+                <a:solidFill>
+                  <a:srgbClr val="BBBBBB"/>
+                </a:solidFill>
+                <a:latin typeface="JetBrains Mono"/>
+              </a:rPr>
+              <a:t>= </a:t>
+            </a:r>
+            <a:r>
+              <a:rPr lang="de-DE" altLang="de-DE" sz="2400" dirty="0">
+                <a:solidFill>
+                  <a:srgbClr val="89CA78"/>
+                </a:solidFill>
+                <a:latin typeface="JetBrains Mono"/>
+              </a:rPr>
+              <a:t>"demo1"</a:t>
+            </a:r>
+            <a:r>
+              <a:rPr lang="de-DE" altLang="de-DE" sz="2400" dirty="0">
+                <a:solidFill>
+                  <a:srgbClr val="BBBBBB"/>
+                </a:solidFill>
+                <a:latin typeface="JetBrains Mono"/>
+              </a:rPr>
+              <a:t>},</a:t>
+            </a:r>
+            <a:br>
+              <a:rPr lang="de-DE" altLang="de-DE" sz="2400" dirty="0">
+                <a:solidFill>
+                  <a:srgbClr val="BBBBBB"/>
+                </a:solidFill>
+                <a:latin typeface="JetBrains Mono"/>
+              </a:rPr>
+            </a:br>
+            <a:r>
+              <a:rPr lang="de-DE" altLang="de-DE" sz="2400" dirty="0">
+                <a:solidFill>
+                  <a:srgbClr val="BBBBBB"/>
+                </a:solidFill>
+                <a:latin typeface="JetBrains Mono"/>
+              </a:rPr>
+              <a:t>    </a:t>
+            </a:r>
+            <a:r>
+              <a:rPr lang="de-DE" altLang="de-DE" sz="2400" dirty="0">
+                <a:solidFill>
+                  <a:srgbClr val="EF596F"/>
+                </a:solidFill>
+                <a:latin typeface="JetBrains Mono"/>
+              </a:rPr>
+              <a:t>"0815" </a:t>
+            </a:r>
+            <a:r>
+              <a:rPr lang="de-DE" altLang="de-DE" sz="2400" dirty="0">
+                <a:solidFill>
+                  <a:srgbClr val="BBBBBB"/>
+                </a:solidFill>
+                <a:latin typeface="JetBrains Mono"/>
+              </a:rPr>
+              <a:t>= {</a:t>
+            </a:r>
+            <a:r>
+              <a:rPr lang="de-DE" altLang="de-DE" sz="2400" dirty="0" err="1">
+                <a:solidFill>
+                  <a:srgbClr val="EF596F"/>
+                </a:solidFill>
+                <a:latin typeface="JetBrains Mono"/>
+              </a:rPr>
+              <a:t>name</a:t>
+            </a:r>
+            <a:r>
+              <a:rPr lang="de-DE" altLang="de-DE" sz="2400" dirty="0">
+                <a:solidFill>
+                  <a:srgbClr val="EF596F"/>
+                </a:solidFill>
+                <a:latin typeface="JetBrains Mono"/>
+              </a:rPr>
+              <a:t> </a:t>
+            </a:r>
+            <a:r>
+              <a:rPr lang="de-DE" altLang="de-DE" sz="2400" dirty="0">
+                <a:solidFill>
+                  <a:srgbClr val="BBBBBB"/>
+                </a:solidFill>
+                <a:latin typeface="JetBrains Mono"/>
+              </a:rPr>
+              <a:t>= </a:t>
+            </a:r>
+            <a:r>
+              <a:rPr lang="de-DE" altLang="de-DE" sz="2400" dirty="0">
+                <a:solidFill>
+                  <a:srgbClr val="89CA78"/>
+                </a:solidFill>
+                <a:latin typeface="JetBrains Mono"/>
+              </a:rPr>
+              <a:t>"</a:t>
+            </a:r>
+            <a:r>
+              <a:rPr lang="de-DE" altLang="de-DE" sz="2400" dirty="0" err="1">
+                <a:solidFill>
+                  <a:srgbClr val="89CA78"/>
+                </a:solidFill>
+                <a:latin typeface="JetBrains Mono"/>
+              </a:rPr>
+              <a:t>doe</a:t>
+            </a:r>
+            <a:r>
+              <a:rPr lang="de-DE" altLang="de-DE" sz="2400" dirty="0">
+                <a:solidFill>
+                  <a:srgbClr val="89CA78"/>
+                </a:solidFill>
+                <a:latin typeface="JetBrains Mono"/>
+              </a:rPr>
+              <a:t>"</a:t>
+            </a:r>
+            <a:r>
+              <a:rPr lang="de-DE" altLang="de-DE" sz="2400" dirty="0">
+                <a:solidFill>
+                  <a:srgbClr val="BBBBBB"/>
+                </a:solidFill>
+                <a:latin typeface="JetBrains Mono"/>
+              </a:rPr>
+              <a:t>,</a:t>
+            </a:r>
+            <a:r>
+              <a:rPr lang="de-DE" altLang="de-DE" sz="2400" dirty="0" err="1">
+                <a:solidFill>
+                  <a:srgbClr val="EF596F"/>
+                </a:solidFill>
+                <a:latin typeface="JetBrains Mono"/>
+              </a:rPr>
+              <a:t>department</a:t>
+            </a:r>
+            <a:r>
+              <a:rPr lang="de-DE" altLang="de-DE" sz="2400" dirty="0">
+                <a:solidFill>
+                  <a:srgbClr val="EF596F"/>
+                </a:solidFill>
+                <a:latin typeface="JetBrains Mono"/>
+              </a:rPr>
+              <a:t> </a:t>
+            </a:r>
+            <a:r>
+              <a:rPr lang="de-DE" altLang="de-DE" sz="2400" dirty="0">
+                <a:solidFill>
+                  <a:srgbClr val="BBBBBB"/>
+                </a:solidFill>
+                <a:latin typeface="JetBrains Mono"/>
+              </a:rPr>
+              <a:t>= </a:t>
+            </a:r>
+            <a:r>
+              <a:rPr lang="de-DE" altLang="de-DE" sz="2400" dirty="0">
+                <a:solidFill>
+                  <a:srgbClr val="89CA78"/>
+                </a:solidFill>
+                <a:latin typeface="JetBrains Mono"/>
+              </a:rPr>
+              <a:t>"demo2</a:t>
+            </a:r>
+            <a:r>
+              <a:rPr lang="de-DE" altLang="de-DE" sz="2400" dirty="0" smtClean="0">
+                <a:solidFill>
+                  <a:srgbClr val="89CA78"/>
+                </a:solidFill>
+                <a:latin typeface="JetBrains Mono"/>
+              </a:rPr>
+              <a:t>"</a:t>
+            </a:r>
+            <a:r>
+              <a:rPr lang="de-DE" altLang="de-DE" sz="2400" dirty="0" smtClean="0">
+                <a:solidFill>
+                  <a:srgbClr val="BBBBBB"/>
+                </a:solidFill>
+                <a:latin typeface="JetBrains Mono"/>
+              </a:rPr>
+              <a:t>}})</a:t>
+            </a:r>
+            <a:r>
+              <a:rPr lang="de-DE" altLang="de-DE" sz="2400" dirty="0">
+                <a:solidFill>
+                  <a:srgbClr val="BBBBBB"/>
+                </a:solidFill>
+                <a:latin typeface="JetBrains Mono"/>
+              </a:rPr>
+              <a:t/>
+            </a:r>
+            <a:br>
+              <a:rPr lang="de-DE" altLang="de-DE" sz="2400" dirty="0">
+                <a:solidFill>
+                  <a:srgbClr val="BBBBBB"/>
+                </a:solidFill>
+                <a:latin typeface="JetBrains Mono"/>
+              </a:rPr>
+            </a:br>
+            <a:r>
+              <a:rPr lang="de-DE" altLang="de-DE" sz="2400" dirty="0">
+                <a:solidFill>
+                  <a:srgbClr val="BBBBBB"/>
+                </a:solidFill>
+                <a:latin typeface="JetBrains Mono"/>
+              </a:rPr>
+              <a:t>  </a:t>
+            </a:r>
+            <a:r>
+              <a:rPr lang="de-DE" altLang="de-DE" sz="2400" dirty="0" err="1">
+                <a:solidFill>
+                  <a:srgbClr val="EF596F"/>
+                </a:solidFill>
+                <a:latin typeface="JetBrains Mono"/>
+              </a:rPr>
+              <a:t>name</a:t>
+            </a:r>
+            <a:r>
+              <a:rPr lang="de-DE" altLang="de-DE" sz="2400" dirty="0">
+                <a:solidFill>
+                  <a:srgbClr val="EF596F"/>
+                </a:solidFill>
+                <a:latin typeface="JetBrains Mono"/>
+              </a:rPr>
+              <a:t> </a:t>
+            </a:r>
+            <a:r>
+              <a:rPr lang="de-DE" altLang="de-DE" sz="2400" dirty="0" err="1" smtClean="0">
+                <a:solidFill>
+                  <a:srgbClr val="E5C07B"/>
+                </a:solidFill>
+                <a:latin typeface="JetBrains Mono"/>
+              </a:rPr>
+              <a:t>each</a:t>
+            </a:r>
+            <a:r>
+              <a:rPr lang="de-DE" altLang="de-DE" sz="2400" dirty="0" err="1" smtClean="0">
+                <a:solidFill>
+                  <a:srgbClr val="BBBBBB"/>
+                </a:solidFill>
+                <a:latin typeface="JetBrains Mono"/>
+              </a:rPr>
+              <a:t>.</a:t>
+            </a:r>
+            <a:r>
+              <a:rPr lang="de-DE" altLang="de-DE" sz="2400" dirty="0" err="1" smtClean="0">
+                <a:solidFill>
+                  <a:srgbClr val="E5C07B"/>
+                </a:solidFill>
+                <a:latin typeface="JetBrains Mono"/>
+              </a:rPr>
+              <a:t>value</a:t>
+            </a:r>
+            <a:r>
+              <a:rPr lang="de-DE" altLang="de-DE" sz="2400" dirty="0">
+                <a:solidFill>
+                  <a:srgbClr val="BBBBBB"/>
+                </a:solidFill>
+                <a:latin typeface="JetBrains Mono"/>
+              </a:rPr>
+              <a:t>[</a:t>
+            </a:r>
+            <a:r>
+              <a:rPr lang="de-DE" altLang="de-DE" sz="2400" dirty="0">
+                <a:solidFill>
+                  <a:srgbClr val="89CA78"/>
+                </a:solidFill>
+                <a:latin typeface="JetBrains Mono"/>
+              </a:rPr>
+              <a:t>"</a:t>
+            </a:r>
+            <a:r>
+              <a:rPr lang="de-DE" altLang="de-DE" sz="2400" dirty="0" err="1">
+                <a:solidFill>
+                  <a:srgbClr val="89CA78"/>
+                </a:solidFill>
+                <a:latin typeface="JetBrains Mono"/>
+              </a:rPr>
+              <a:t>name</a:t>
+            </a:r>
+            <a:r>
+              <a:rPr lang="de-DE" altLang="de-DE" sz="2400" dirty="0" smtClean="0">
+                <a:solidFill>
+                  <a:srgbClr val="89CA78"/>
+                </a:solidFill>
+                <a:latin typeface="JetBrains Mono"/>
+              </a:rPr>
+              <a:t>"</a:t>
+            </a:r>
+            <a:r>
+              <a:rPr lang="de-DE" altLang="de-DE" sz="2400" dirty="0" smtClean="0">
+                <a:solidFill>
+                  <a:srgbClr val="BBBBBB"/>
+                </a:solidFill>
+                <a:latin typeface="JetBrains Mono"/>
+              </a:rPr>
+              <a:t>])</a:t>
+            </a:r>
+            <a:r>
+              <a:rPr lang="de-DE" altLang="de-DE" sz="2400" dirty="0">
+                <a:solidFill>
+                  <a:srgbClr val="BBBBBB"/>
+                </a:solidFill>
+                <a:latin typeface="JetBrains Mono"/>
+              </a:rPr>
+              <a:t/>
+            </a:r>
+            <a:br>
+              <a:rPr lang="de-DE" altLang="de-DE" sz="2400" dirty="0">
+                <a:solidFill>
+                  <a:srgbClr val="BBBBBB"/>
+                </a:solidFill>
+                <a:latin typeface="JetBrains Mono"/>
+              </a:rPr>
+            </a:br>
+            <a:r>
+              <a:rPr lang="de-DE" altLang="de-DE" sz="2400" dirty="0" smtClean="0">
+                <a:solidFill>
+                  <a:srgbClr val="BBBBBB"/>
+                </a:solidFill>
+                <a:latin typeface="JetBrains Mono"/>
+              </a:rPr>
+              <a:t>}</a:t>
+            </a:r>
+            <a:r>
+              <a:rPr kumimoji="0" lang="de-DE" altLang="de-DE" sz="2400" b="0" i="0" u="none" strike="noStrike" cap="none" normalizeH="0" baseline="0" dirty="0" smtClean="0">
+                <a:ln>
+                  <a:noFill/>
+                </a:ln>
+                <a:solidFill>
+                  <a:srgbClr val="BBBBBB"/>
+                </a:solidFill>
+                <a:effectLst/>
+                <a:latin typeface="JetBrains Mono"/>
+              </a:rPr>
+              <a:t/>
+            </a:r>
+            <a:br>
+              <a:rPr kumimoji="0" lang="de-DE" altLang="de-DE" sz="2400" b="0" i="0" u="none" strike="noStrike" cap="none" normalizeH="0" baseline="0" dirty="0" smtClean="0">
+                <a:ln>
+                  <a:noFill/>
+                </a:ln>
+                <a:solidFill>
+                  <a:srgbClr val="BBBBBB"/>
+                </a:solidFill>
+                <a:effectLst/>
+                <a:latin typeface="JetBrains Mono"/>
+              </a:rPr>
+            </a:br>
+            <a:r>
               <a:rPr kumimoji="0" lang="de-DE" altLang="de-DE" sz="2400" b="0" i="1" u="none" strike="noStrike" cap="none" normalizeH="0" baseline="0" dirty="0" err="1" smtClean="0">
                 <a:ln>
                   <a:noFill/>
@@ -17753,10 +18326,126 @@
                 <a:effectLst/>
                 <a:latin typeface="JetBrains Mono"/>
               </a:rPr>
+              <a:t>aws_iam_access_key</a:t>
+            </a:r>
+            <a:r>
+              <a:rPr kumimoji="0" lang="de-DE" altLang="de-DE" sz="2400" b="0" i="0" u="none" strike="noStrike" cap="none" normalizeH="0" baseline="0" dirty="0" smtClean="0">
+                <a:ln>
+                  <a:noFill/>
+                </a:ln>
+                <a:solidFill>
+                  <a:srgbClr val="E5C07B"/>
+                </a:solidFill>
+                <a:effectLst/>
+                <a:latin typeface="JetBrains Mono"/>
+              </a:rPr>
+              <a:t>" "test2_key" </a:t>
+            </a:r>
+            <a:r>
+              <a:rPr kumimoji="0" lang="de-DE" altLang="de-DE" sz="2400" b="0" i="0" u="none" strike="noStrike" cap="none" normalizeH="0" baseline="0" dirty="0" smtClean="0">
+                <a:ln>
+                  <a:noFill/>
+                </a:ln>
+                <a:solidFill>
+                  <a:srgbClr val="BBBBBB"/>
+                </a:solidFill>
+                <a:effectLst/>
+                <a:latin typeface="JetBrains Mono"/>
+              </a:rPr>
+              <a:t>{</a:t>
+            </a:r>
+            <a:br>
+              <a:rPr kumimoji="0" lang="de-DE" altLang="de-DE" sz="2400" b="0" i="0" u="none" strike="noStrike" cap="none" normalizeH="0" baseline="0" dirty="0" smtClean="0">
+                <a:ln>
+                  <a:noFill/>
+                </a:ln>
+                <a:solidFill>
+                  <a:srgbClr val="BBBBBB"/>
+                </a:solidFill>
+                <a:effectLst/>
+                <a:latin typeface="JetBrains Mono"/>
+              </a:rPr>
+            </a:br>
+            <a:r>
+              <a:rPr kumimoji="0" lang="de-DE" altLang="de-DE" sz="2400" b="0" i="0" u="none" strike="noStrike" cap="none" normalizeH="0" baseline="0" dirty="0" smtClean="0">
+                <a:ln>
+                  <a:noFill/>
+                </a:ln>
+                <a:solidFill>
+                  <a:srgbClr val="BBBBBB"/>
+                </a:solidFill>
+                <a:effectLst/>
+                <a:latin typeface="JetBrains Mono"/>
+              </a:rPr>
+              <a:t>  </a:t>
+            </a:r>
+            <a:r>
+              <a:rPr kumimoji="0" lang="de-DE" altLang="de-DE" sz="2400" b="0" i="0" u="none" strike="noStrike" cap="none" normalizeH="0" baseline="0" dirty="0" err="1" smtClean="0">
+                <a:ln>
+                  <a:noFill/>
+                </a:ln>
+                <a:solidFill>
+                  <a:srgbClr val="EF596F"/>
+                </a:solidFill>
+                <a:effectLst/>
+                <a:latin typeface="JetBrains Mono"/>
+              </a:rPr>
+              <a:t>user</a:t>
+            </a:r>
+            <a:r>
+              <a:rPr kumimoji="0" lang="de-DE" altLang="de-DE" sz="2400" b="0" i="0" u="none" strike="noStrike" cap="none" normalizeH="0" baseline="0" dirty="0" smtClean="0">
+                <a:ln>
+                  <a:noFill/>
+                </a:ln>
+                <a:solidFill>
+                  <a:srgbClr val="EF596F"/>
+                </a:solidFill>
+                <a:effectLst/>
+                <a:latin typeface="JetBrains Mono"/>
+              </a:rPr>
+              <a:t> </a:t>
+            </a:r>
+            <a:r>
+              <a:rPr kumimoji="0" lang="de-DE" altLang="de-DE" sz="2400" b="0" i="0" u="none" strike="noStrike" cap="none" normalizeH="0" baseline="0" dirty="0" smtClean="0">
+                <a:ln>
+                  <a:noFill/>
+                </a:ln>
+                <a:solidFill>
+                  <a:srgbClr val="BBBBBB"/>
+                </a:solidFill>
+                <a:effectLst/>
+                <a:latin typeface="JetBrains Mono"/>
+              </a:rPr>
+              <a:t>= </a:t>
+            </a:r>
+            <a:r>
+              <a:rPr kumimoji="0" lang="de-DE" altLang="de-DE" sz="2400" b="0" i="0" u="none" strike="noStrike" cap="none" normalizeH="0" baseline="0" dirty="0" err="1" smtClean="0">
+                <a:ln>
+                  <a:noFill/>
+                </a:ln>
+                <a:solidFill>
+                  <a:srgbClr val="E5C07B"/>
+                </a:solidFill>
+                <a:effectLst/>
+                <a:latin typeface="JetBrains Mono"/>
+              </a:rPr>
               <a:t>aws_iam_user</a:t>
             </a:r>
             <a:r>
-              <a:rPr kumimoji="0" lang="de-DE" altLang="de-DE" sz="2400" b="0" i="0" u="none" strike="noStrike" cap="none" normalizeH="0" baseline="0" dirty="0" smtClean="0">
+              <a:rPr kumimoji="0" lang="de-DE" altLang="de-DE" sz="2400" b="0" i="0" u="none" strike="noStrike" cap="none" normalizeH="0" baseline="0" dirty="0" err="1" smtClean="0">
+                <a:ln>
+                  <a:noFill/>
+                </a:ln>
+                <a:solidFill>
+                  <a:srgbClr val="BBBBBB"/>
+                </a:solidFill>
+                <a:effectLst/>
+                <a:latin typeface="JetBrains Mono"/>
+              </a:rPr>
+              <a:t>.</a:t>
+            </a:r>
+            <a:r>
+              <a:rPr kumimoji="0" lang="de-DE" altLang="de-DE" sz="2400" b="0" i="0" u="none" strike="noStrike" cap="none" normalizeH="0" baseline="0" dirty="0" err="1" smtClean="0">
                 <a:ln>
                   <a:noFill/>
                 </a:ln>
@@ -17766,778 +18455,49 @@
                 <a:effectLst/>
                 <a:latin typeface="JetBrains Mono"/>
               </a:rPr>
-              <a:t>" "</a:t>
-            </a:r>
-            <a:r>
-              <a:rPr kumimoji="0" lang="de-DE" altLang="de-DE" sz="2400" b="0" i="0" u="none" strike="noStrike" cap="none" normalizeH="0" baseline="0" dirty="0" err="1" smtClean="0">
-                <a:ln>
-                  <a:noFill/>
-                </a:ln>
+              <a:t>my_user</a:t>
+            </a:r>
+            <a:r>
+              <a:rPr lang="de-DE" altLang="de-DE" sz="2400" dirty="0" smtClean="0">
+                <a:solidFill>
+                  <a:srgbClr val="BBBBBB"/>
+                </a:solidFill>
+                <a:latin typeface="JetBrains Mono"/>
+              </a:rPr>
+              <a:t>[</a:t>
+            </a:r>
+            <a:r>
+              <a:rPr lang="de-DE" altLang="de-DE" sz="2400" dirty="0">
                 <a:solidFill>
                   <a:srgbClr val="E5C07B"/>
                 </a:solidFill>
-                <a:effectLst/>
-                <a:latin typeface="JetBrains Mono"/>
-              </a:rPr>
-              <a:t>my_user</a:t>
-            </a:r>
-            <a:r>
-              <a:rPr kumimoji="0" lang="de-DE" altLang="de-DE" sz="2400" b="0" i="0" u="none" strike="noStrike" cap="none" normalizeH="0" baseline="0" dirty="0" smtClean="0">
-                <a:ln>
-                  <a:noFill/>
-                </a:ln>
+                <a:latin typeface="JetBrains Mono"/>
+              </a:rPr>
+              <a:t>"</a:t>
+            </a:r>
+            <a:r>
+              <a:rPr lang="de-DE" altLang="de-DE" sz="2400" dirty="0">
                 <a:solidFill>
                   <a:srgbClr val="E5C07B"/>
                 </a:solidFill>
-                <a:effectLst/>
-                <a:latin typeface="JetBrains Mono"/>
-              </a:rPr>
-              <a:t>" </a:t>
-            </a:r>
-            <a:r>
-              <a:rPr kumimoji="0" lang="de-DE" altLang="de-DE" sz="2400" b="0" i="0" u="none" strike="noStrike" cap="none" normalizeH="0" baseline="0" dirty="0" smtClean="0">
-                <a:ln>
-                  <a:noFill/>
-                </a:ln>
-                <a:solidFill>
-                  <a:srgbClr val="BBBBBB"/>
-                </a:solidFill>
-                <a:effectLst/>
-                <a:latin typeface="JetBrains Mono"/>
-              </a:rPr>
-              <a:t>{</a:t>
-            </a:r>
-            <a:br>
-              <a:rPr kumimoji="0" lang="de-DE" altLang="de-DE" sz="2400" b="0" i="0" u="none" strike="noStrike" cap="none" normalizeH="0" baseline="0" dirty="0" smtClean="0">
-                <a:ln>
-                  <a:noFill/>
-                </a:ln>
-                <a:solidFill>
-                  <a:srgbClr val="BBBBBB"/>
-                </a:solidFill>
-                <a:effectLst/>
-                <a:latin typeface="JetBrains Mono"/>
-              </a:rPr>
-            </a:br>
-            <a:r>
-              <a:rPr kumimoji="0" lang="de-DE" altLang="de-DE" sz="2400" b="0" i="0" u="none" strike="noStrike" cap="none" normalizeH="0" baseline="0" dirty="0" smtClean="0">
-                <a:ln>
-                  <a:noFill/>
-                </a:ln>
-                <a:solidFill>
-                  <a:srgbClr val="BBBBBB"/>
-                </a:solidFill>
-                <a:effectLst/>
-                <a:latin typeface="JetBrains Mono"/>
-              </a:rPr>
-              <a:t>  </a:t>
-            </a:r>
-            <a:r>
-              <a:rPr kumimoji="0" lang="de-DE" altLang="de-DE" sz="2400" b="0" i="0" u="none" strike="noStrike" cap="none" normalizeH="0" baseline="0" dirty="0" err="1" smtClean="0">
-                <a:ln>
-                  <a:noFill/>
-                </a:ln>
-                <a:solidFill>
-                  <a:srgbClr val="EF596F"/>
-                </a:solidFill>
-                <a:effectLst/>
-                <a:latin typeface="JetBrains Mono"/>
-              </a:rPr>
-              <a:t>for_each</a:t>
-            </a:r>
-            <a:r>
-              <a:rPr kumimoji="0" lang="de-DE" altLang="de-DE" sz="2400" b="0" i="0" u="none" strike="noStrike" cap="none" normalizeH="0" baseline="0" dirty="0" smtClean="0">
-                <a:ln>
-                  <a:noFill/>
-                </a:ln>
-                <a:solidFill>
-                  <a:srgbClr val="EF596F"/>
-                </a:solidFill>
-                <a:effectLst/>
-                <a:latin typeface="JetBrains Mono"/>
-              </a:rPr>
-              <a:t> </a:t>
-            </a:r>
-            <a:r>
-              <a:rPr kumimoji="0" lang="de-DE" altLang="de-DE" sz="2400" b="0" i="0" u="none" strike="noStrike" cap="none" normalizeH="0" baseline="0" dirty="0" smtClean="0">
-                <a:ln>
-                  <a:noFill/>
-                </a:ln>
-                <a:solidFill>
-                  <a:srgbClr val="BBBBBB"/>
-                </a:solidFill>
-                <a:effectLst/>
-                <a:latin typeface="JetBrains Mono"/>
-              </a:rPr>
-              <a:t>= </a:t>
-            </a:r>
-            <a:r>
-              <a:rPr kumimoji="0" lang="de-DE" altLang="de-DE" sz="2400" b="0" i="0" u="none" strike="noStrike" cap="none" normalizeH="0" baseline="0" dirty="0" err="1" smtClean="0">
-                <a:ln>
-                  <a:noFill/>
-                </a:ln>
-                <a:solidFill>
-                  <a:srgbClr val="BBBBBB"/>
-                </a:solidFill>
-                <a:effectLst/>
-                <a:latin typeface="JetBrains Mono"/>
-              </a:rPr>
-              <a:t>tomap</a:t>
-            </a:r>
-            <a:r>
-              <a:rPr kumimoji="0" lang="de-DE" altLang="de-DE" sz="2400" b="0" i="0" u="none" strike="noStrike" cap="none" normalizeH="0" baseline="0" dirty="0" smtClean="0">
-                <a:ln>
-                  <a:noFill/>
-                </a:ln>
-                <a:solidFill>
-                  <a:srgbClr val="BBBBBB"/>
-                </a:solidFill>
-                <a:effectLst/>
-                <a:latin typeface="JetBrains Mono"/>
-              </a:rPr>
-              <a:t>(</a:t>
-            </a:r>
-            <a:r>
-              <a:rPr kumimoji="0" lang="de-DE" altLang="de-DE" sz="2400" b="0" i="0" u="none" strike="noStrike" cap="none" normalizeH="0" baseline="0" dirty="0" err="1" smtClean="0">
-                <a:ln>
-                  <a:noFill/>
-                </a:ln>
-                <a:solidFill>
-                  <a:srgbClr val="BBBBBB"/>
-                </a:solidFill>
-                <a:effectLst/>
-                <a:latin typeface="JetBrains Mono"/>
-              </a:rPr>
-              <a:t>object</a:t>
-            </a:r>
-            <a:r>
-              <a:rPr kumimoji="0" lang="de-DE" altLang="de-DE" sz="2400" b="0" i="0" u="none" strike="noStrike" cap="none" normalizeH="0" baseline="0" dirty="0" smtClean="0">
-                <a:ln>
-                  <a:noFill/>
-                </a:ln>
-                <a:solidFill>
-                  <a:srgbClr val="BBBBBB"/>
-                </a:solidFill>
-                <a:effectLst/>
-                <a:latin typeface="JetBrains Mono"/>
-              </a:rPr>
-              <a:t>({</a:t>
-            </a:r>
-            <a:r>
-              <a:rPr kumimoji="0" lang="de-DE" altLang="de-DE" sz="2400" b="0" i="0" u="none" strike="noStrike" cap="none" normalizeH="0" baseline="0" dirty="0" err="1" smtClean="0">
-                <a:ln>
-                  <a:noFill/>
-                </a:ln>
-                <a:solidFill>
-                  <a:srgbClr val="EF596F"/>
-                </a:solidFill>
-                <a:effectLst/>
-                <a:latin typeface="JetBrains Mono"/>
-              </a:rPr>
-              <a:t>name</a:t>
-            </a:r>
-            <a:r>
-              <a:rPr kumimoji="0" lang="de-DE" altLang="de-DE" sz="2400" b="0" i="0" u="none" strike="noStrike" cap="none" normalizeH="0" baseline="0" dirty="0" smtClean="0">
-                <a:ln>
-                  <a:noFill/>
-                </a:ln>
-                <a:solidFill>
-                  <a:srgbClr val="BBBBBB"/>
-                </a:solidFill>
-                <a:effectLst/>
-                <a:latin typeface="JetBrains Mono"/>
-              </a:rPr>
-              <a:t>=</a:t>
-            </a:r>
-            <a:r>
-              <a:rPr kumimoji="0" lang="de-DE" altLang="de-DE" sz="2400" b="0" i="0" u="none" strike="noStrike" cap="none" normalizeH="0" baseline="0" dirty="0" smtClean="0">
-                <a:ln>
-                  <a:noFill/>
-                </a:ln>
-                <a:solidFill>
-                  <a:srgbClr val="89CA78"/>
-                </a:solidFill>
-                <a:effectLst/>
-                <a:latin typeface="JetBrains Mono"/>
-              </a:rPr>
-              <a:t>"Test" </a:t>
-            </a:r>
-            <a:r>
-              <a:rPr kumimoji="0" lang="de-DE" altLang="de-DE" sz="2400" b="0" i="0" u="none" strike="noStrike" cap="none" normalizeH="0" baseline="0" dirty="0" smtClean="0">
-                <a:ln>
-                  <a:noFill/>
-                </a:ln>
-                <a:solidFill>
-                  <a:srgbClr val="EF596F"/>
-                </a:solidFill>
-                <a:effectLst/>
-                <a:latin typeface="JetBrains Mono"/>
-              </a:rPr>
-              <a:t>email</a:t>
-            </a:r>
-            <a:r>
-              <a:rPr kumimoji="0" lang="de-DE" altLang="de-DE" sz="2400" b="0" i="0" u="none" strike="noStrike" cap="none" normalizeH="0" baseline="0" dirty="0" smtClean="0">
-                <a:ln>
-                  <a:noFill/>
-                </a:ln>
-                <a:solidFill>
-                  <a:srgbClr val="BBBBBB"/>
-                </a:solidFill>
-                <a:effectLst/>
-                <a:latin typeface="JetBrains Mono"/>
-              </a:rPr>
-              <a:t>=</a:t>
-            </a:r>
-            <a:r>
-              <a:rPr kumimoji="0" lang="de-DE" altLang="de-DE" sz="2400" b="0" i="0" u="none" strike="noStrike" cap="none" normalizeH="0" baseline="0" dirty="0" smtClean="0">
-                <a:ln>
-                  <a:noFill/>
-                </a:ln>
-                <a:solidFill>
-                  <a:srgbClr val="89CA78"/>
-                </a:solidFill>
-                <a:effectLst/>
-                <a:latin typeface="JetBrains Mono"/>
-              </a:rPr>
-              <a:t>"test@test.de"</a:t>
-            </a:r>
-            <a:r>
-              <a:rPr kumimoji="0" lang="de-DE" altLang="de-DE" sz="2400" b="0" i="0" u="none" strike="noStrike" cap="none" normalizeH="0" baseline="0" dirty="0" smtClean="0">
-                <a:ln>
-                  <a:noFill/>
-                </a:ln>
-                <a:solidFill>
-                  <a:srgbClr val="BBBBBB"/>
-                </a:solidFill>
-                <a:effectLst/>
-                <a:latin typeface="JetBrains Mono"/>
-              </a:rPr>
-              <a:t>}) </a:t>
-            </a:r>
-            <a:r>
-              <a:rPr kumimoji="0" lang="de-DE" altLang="de-DE" sz="2400" b="0" i="0" u="none" strike="noStrike" cap="none" normalizeH="0" baseline="0" dirty="0" err="1" smtClean="0">
-                <a:ln>
-                  <a:noFill/>
-                </a:ln>
-                <a:solidFill>
-                  <a:srgbClr val="BBBBBB"/>
-                </a:solidFill>
-                <a:effectLst/>
-                <a:latin typeface="JetBrains Mono"/>
-              </a:rPr>
-              <a:t>object</a:t>
-            </a:r>
-            <a:r>
-              <a:rPr kumimoji="0" lang="de-DE" altLang="de-DE" sz="2400" b="0" i="0" u="none" strike="noStrike" cap="none" normalizeH="0" baseline="0" dirty="0" smtClean="0">
-                <a:ln>
-                  <a:noFill/>
-                </a:ln>
-                <a:solidFill>
-                  <a:srgbClr val="BBBBBB"/>
-                </a:solidFill>
-                <a:effectLst/>
-                <a:latin typeface="JetBrains Mono"/>
-              </a:rPr>
-              <a:t>({</a:t>
-            </a:r>
-            <a:r>
-              <a:rPr kumimoji="0" lang="de-DE" altLang="de-DE" sz="2400" b="0" i="0" u="none" strike="noStrike" cap="none" normalizeH="0" baseline="0" dirty="0" err="1" smtClean="0">
-                <a:ln>
-                  <a:noFill/>
-                </a:ln>
-                <a:solidFill>
-                  <a:srgbClr val="EF596F"/>
-                </a:solidFill>
-                <a:effectLst/>
-                <a:latin typeface="JetBrains Mono"/>
-              </a:rPr>
-              <a:t>name</a:t>
-            </a:r>
-            <a:r>
-              <a:rPr kumimoji="0" lang="de-DE" altLang="de-DE" sz="2400" b="0" i="0" u="none" strike="noStrike" cap="none" normalizeH="0" baseline="0" dirty="0" smtClean="0">
-                <a:ln>
-                  <a:noFill/>
-                </a:ln>
-                <a:solidFill>
-                  <a:srgbClr val="BBBBBB"/>
-                </a:solidFill>
-                <a:effectLst/>
-                <a:latin typeface="JetBrains Mono"/>
-              </a:rPr>
-              <a:t>=</a:t>
-            </a:r>
-            <a:r>
-              <a:rPr kumimoji="0" lang="de-DE" altLang="de-DE" sz="2400" b="0" i="0" u="none" strike="noStrike" cap="none" normalizeH="0" baseline="0" dirty="0" smtClean="0">
-                <a:ln>
-                  <a:noFill/>
-                </a:ln>
-                <a:solidFill>
-                  <a:srgbClr val="89CA78"/>
-                </a:solidFill>
-                <a:effectLst/>
-                <a:latin typeface="JetBrains Mono"/>
-              </a:rPr>
-              <a:t>"Test2" </a:t>
-            </a:r>
-            <a:r>
-              <a:rPr kumimoji="0" lang="de-DE" altLang="de-DE" sz="2400" b="0" i="0" u="none" strike="noStrike" cap="none" normalizeH="0" baseline="0" dirty="0" smtClean="0">
-                <a:ln>
-                  <a:noFill/>
-                </a:ln>
-                <a:solidFill>
-                  <a:srgbClr val="EF596F"/>
-                </a:solidFill>
-                <a:effectLst/>
-                <a:latin typeface="JetBrains Mono"/>
-              </a:rPr>
-              <a:t>email</a:t>
-            </a:r>
-            <a:r>
-              <a:rPr kumimoji="0" lang="de-DE" altLang="de-DE" sz="2400" b="0" i="0" u="none" strike="noStrike" cap="none" normalizeH="0" baseline="0" dirty="0" smtClean="0">
-                <a:ln>
-                  <a:noFill/>
-                </a:ln>
-                <a:solidFill>
-                  <a:srgbClr val="BBBBBB"/>
-                </a:solidFill>
-                <a:effectLst/>
-                <a:latin typeface="JetBrains Mono"/>
-              </a:rPr>
-              <a:t>=</a:t>
-            </a:r>
-            <a:r>
-              <a:rPr kumimoji="0" lang="de-DE" altLang="de-DE" sz="2400" b="0" i="0" u="none" strike="noStrike" cap="none" normalizeH="0" baseline="0" dirty="0" smtClean="0">
-                <a:ln>
-                  <a:noFill/>
-                </a:ln>
-                <a:solidFill>
-                  <a:srgbClr val="89CA78"/>
-                </a:solidFill>
-                <a:effectLst/>
-                <a:latin typeface="JetBrains Mono"/>
-              </a:rPr>
-              <a:t>"test2@test.de"</a:t>
-            </a:r>
-            <a:r>
-              <a:rPr kumimoji="0" lang="de-DE" altLang="de-DE" sz="2400" b="0" i="0" u="none" strike="noStrike" cap="none" normalizeH="0" baseline="0" dirty="0" smtClean="0">
-                <a:ln>
-                  <a:noFill/>
-                </a:ln>
-                <a:solidFill>
-                  <a:srgbClr val="BBBBBB"/>
-                </a:solidFill>
-                <a:effectLst/>
-                <a:latin typeface="JetBrains Mono"/>
-              </a:rPr>
-              <a:t>}))</a:t>
-            </a:r>
-            <a:br>
-              <a:rPr kumimoji="0" lang="de-DE" altLang="de-DE" sz="2400" b="0" i="0" u="none" strike="noStrike" cap="none" normalizeH="0" baseline="0" dirty="0" smtClean="0">
-                <a:ln>
-                  <a:noFill/>
-                </a:ln>
-                <a:solidFill>
-                  <a:srgbClr val="BBBBBB"/>
-                </a:solidFill>
-                <a:effectLst/>
-                <a:latin typeface="JetBrains Mono"/>
-              </a:rPr>
-            </a:br>
-            <a:r>
-              <a:rPr kumimoji="0" lang="de-DE" altLang="de-DE" sz="2400" b="0" i="0" u="none" strike="noStrike" cap="none" normalizeH="0" baseline="0" dirty="0" smtClean="0">
-                <a:ln>
-                  <a:noFill/>
-                </a:ln>
-                <a:solidFill>
-                  <a:srgbClr val="BBBBBB"/>
-                </a:solidFill>
-                <a:effectLst/>
-                <a:latin typeface="JetBrains Mono"/>
-              </a:rPr>
-              <a:t>  </a:t>
-            </a:r>
-            <a:r>
-              <a:rPr kumimoji="0" lang="de-DE" altLang="de-DE" sz="2400" b="0" i="0" u="none" strike="noStrike" cap="none" normalizeH="0" baseline="0" dirty="0" err="1" smtClean="0">
-                <a:ln>
-                  <a:noFill/>
-                </a:ln>
-                <a:solidFill>
-                  <a:srgbClr val="EF596F"/>
-                </a:solidFill>
-                <a:effectLst/>
-                <a:latin typeface="JetBrains Mono"/>
-              </a:rPr>
-              <a:t>name</a:t>
-            </a:r>
-            <a:r>
-              <a:rPr kumimoji="0" lang="de-DE" altLang="de-DE" sz="2400" b="0" i="0" u="none" strike="noStrike" cap="none" normalizeH="0" baseline="0" dirty="0" smtClean="0">
-                <a:ln>
-                  <a:noFill/>
-                </a:ln>
-                <a:solidFill>
-                  <a:srgbClr val="EF596F"/>
-                </a:solidFill>
-                <a:effectLst/>
-                <a:latin typeface="JetBrains Mono"/>
-              </a:rPr>
-              <a:t> </a:t>
-            </a:r>
-            <a:r>
-              <a:rPr kumimoji="0" lang="de-DE" altLang="de-DE" sz="2400" b="0" i="0" u="none" strike="noStrike" cap="none" normalizeH="0" baseline="0" dirty="0" smtClean="0">
-                <a:ln>
-                  <a:noFill/>
-                </a:ln>
-                <a:solidFill>
-                  <a:srgbClr val="BBBBBB"/>
-                </a:solidFill>
-                <a:effectLst/>
-                <a:latin typeface="JetBrains Mono"/>
-              </a:rPr>
-              <a:t>= </a:t>
-            </a:r>
-            <a:r>
-              <a:rPr kumimoji="0" lang="de-DE" altLang="de-DE" sz="2400" b="0" i="0" u="none" strike="noStrike" cap="none" normalizeH="0" baseline="0" dirty="0" smtClean="0">
-                <a:ln>
-                  <a:noFill/>
-                </a:ln>
+                <a:latin typeface="JetBrains Mono"/>
+              </a:rPr>
+              <a:t>0815</a:t>
+            </a:r>
+            <a:r>
+              <a:rPr lang="de-DE" altLang="de-DE" sz="2400" dirty="0">
                 <a:solidFill>
                   <a:srgbClr val="E5C07B"/>
                 </a:solidFill>
-                <a:effectLst/>
-                <a:latin typeface="JetBrains Mono"/>
-              </a:rPr>
-              <a:t>each</a:t>
-            </a:r>
-            <a:r>
-              <a:rPr kumimoji="0" lang="de-DE" altLang="de-DE" sz="2400" b="0" i="0" u="none" strike="noStrike" cap="none" normalizeH="0" baseline="0" dirty="0" smtClean="0">
-                <a:ln>
-                  <a:noFill/>
-                </a:ln>
-                <a:solidFill>
-                  <a:srgbClr val="BBBBBB"/>
-                </a:solidFill>
-                <a:effectLst/>
-                <a:latin typeface="JetBrains Mono"/>
-              </a:rPr>
-              <a:t>.</a:t>
-            </a:r>
-            <a:r>
-              <a:rPr kumimoji="0" lang="de-DE" altLang="de-DE" sz="2400" b="0" i="0" u="none" strike="noStrike" cap="none" normalizeH="0" baseline="0" dirty="0" smtClean="0">
-                <a:ln>
-                  <a:noFill/>
-                </a:ln>
-                <a:solidFill>
-                  <a:srgbClr val="E5C07B"/>
-                </a:solidFill>
-                <a:effectLst/>
-                <a:latin typeface="JetBrains Mono"/>
-              </a:rPr>
-              <a:t>value</a:t>
-            </a:r>
-            <a:r>
-              <a:rPr kumimoji="0" lang="de-DE" altLang="de-DE" sz="2400" b="0" i="0" u="none" strike="noStrike" cap="none" normalizeH="0" baseline="0" dirty="0" smtClean="0">
-                <a:ln>
-                  <a:noFill/>
-                </a:ln>
-                <a:solidFill>
-                  <a:srgbClr val="BBBBBB"/>
-                </a:solidFill>
-                <a:effectLst/>
-                <a:latin typeface="JetBrains Mono"/>
-              </a:rPr>
-              <a:t>.</a:t>
-            </a:r>
-            <a:r>
-              <a:rPr kumimoji="0" lang="de-DE" altLang="de-DE" sz="2400" b="0" i="0" u="none" strike="noStrike" cap="none" normalizeH="0" baseline="0" dirty="0" smtClean="0">
-                <a:ln>
-                  <a:noFill/>
-                </a:ln>
-                <a:solidFill>
-                  <a:srgbClr val="EF596F"/>
-                </a:solidFill>
-                <a:effectLst/>
-                <a:latin typeface="JetBrains Mono"/>
-              </a:rPr>
-              <a:t>name</a:t>
-            </a:r>
-            <a:br>
-              <a:rPr kumimoji="0" lang="de-DE" altLang="de-DE" sz="2400" b="0" i="0" u="none" strike="noStrike" cap="none" normalizeH="0" baseline="0" dirty="0" smtClean="0">
-                <a:ln>
-                  <a:noFill/>
-                </a:ln>
-                <a:solidFill>
-                  <a:srgbClr val="EF596F"/>
-                </a:solidFill>
-                <a:effectLst/>
-                <a:latin typeface="JetBrains Mono"/>
-              </a:rPr>
-            </a:br>
-            <a:r>
-              <a:rPr kumimoji="0" lang="de-DE" altLang="de-DE" sz="2400" b="0" i="0" u="none" strike="noStrike" cap="none" normalizeH="0" baseline="0" dirty="0" smtClean="0">
-                <a:ln>
-                  <a:noFill/>
-                </a:ln>
-                <a:solidFill>
-                  <a:srgbClr val="BBBBBB"/>
-                </a:solidFill>
-                <a:effectLst/>
-                <a:latin typeface="JetBrains Mono"/>
-              </a:rPr>
-              <a:t>}</a:t>
-            </a:r>
-            <a:br>
-              <a:rPr kumimoji="0" lang="de-DE" altLang="de-DE" sz="2400" b="0" i="0" u="none" strike="noStrike" cap="none" normalizeH="0" baseline="0" dirty="0" smtClean="0">
-                <a:ln>
-                  <a:noFill/>
-                </a:ln>
-                <a:solidFill>
-                  <a:srgbClr val="BBBBBB"/>
-                </a:solidFill>
-                <a:effectLst/>
-                <a:latin typeface="JetBrains Mono"/>
-              </a:rPr>
-            </a:br>
-            <a:r>
-              <a:rPr kumimoji="0" lang="de-DE" altLang="de-DE" sz="2400" b="0" i="0" u="none" strike="noStrike" cap="none" normalizeH="0" baseline="0" dirty="0" smtClean="0">
-                <a:ln>
-                  <a:noFill/>
-                </a:ln>
-                <a:solidFill>
-                  <a:srgbClr val="BBBBBB"/>
-                </a:solidFill>
-                <a:effectLst/>
-                <a:latin typeface="JetBrains Mono"/>
-              </a:rPr>
-              <a:t/>
-            </a:r>
-            <a:br>
-              <a:rPr kumimoji="0" lang="de-DE" altLang="de-DE" sz="2400" b="0" i="0" u="none" strike="noStrike" cap="none" normalizeH="0" baseline="0" dirty="0" smtClean="0">
-                <a:ln>
-                  <a:noFill/>
-                </a:ln>
-                <a:solidFill>
-                  <a:srgbClr val="BBBBBB"/>
-                </a:solidFill>
-                <a:effectLst/>
-                <a:latin typeface="JetBrains Mono"/>
-              </a:rPr>
-            </a:br>
-            <a:r>
-              <a:rPr kumimoji="0" lang="de-DE" altLang="de-DE" sz="2400" b="0" i="1" u="none" strike="noStrike" cap="none" normalizeH="0" baseline="0" dirty="0" err="1" smtClean="0">
-                <a:ln>
-                  <a:noFill/>
-                </a:ln>
-                <a:solidFill>
-                  <a:srgbClr val="D55FDE"/>
-                </a:solidFill>
-                <a:effectLst/>
-                <a:latin typeface="JetBrains Mono"/>
-              </a:rPr>
-              <a:t>resource</a:t>
-            </a:r>
-            <a:r>
-              <a:rPr kumimoji="0" lang="de-DE" altLang="de-DE" sz="2400" b="0" i="1" u="none" strike="noStrike" cap="none" normalizeH="0" baseline="0" dirty="0" smtClean="0">
-                <a:ln>
-                  <a:noFill/>
-                </a:ln>
-                <a:solidFill>
-                  <a:srgbClr val="D55FDE"/>
-                </a:solidFill>
-                <a:effectLst/>
-                <a:latin typeface="JetBrains Mono"/>
-              </a:rPr>
-              <a:t> </a:t>
-            </a:r>
-            <a:r>
-              <a:rPr kumimoji="0" lang="de-DE" altLang="de-DE" sz="2400" b="0" i="0" u="none" strike="noStrike" cap="none" normalizeH="0" baseline="0" dirty="0" smtClean="0">
-                <a:ln>
-                  <a:noFill/>
-                </a:ln>
-                <a:solidFill>
-                  <a:srgbClr val="E5C07B"/>
-                </a:solidFill>
-                <a:effectLst/>
                 <a:latin typeface="JetBrains Mono"/>
               </a:rPr>
               <a:t>"</a:t>
             </a:r>
             <a:r>
-              <a:rPr kumimoji="0" lang="de-DE" altLang="de-DE" sz="2400" b="0" i="0" u="none" strike="noStrike" cap="none" normalizeH="0" baseline="0" dirty="0" err="1" smtClean="0">
-                <a:ln>
-                  <a:noFill/>
-                </a:ln>
-                <a:solidFill>
-                  <a:srgbClr val="E5C07B"/>
-                </a:solidFill>
-                <a:effectLst/>
-                <a:latin typeface="JetBrains Mono"/>
-              </a:rPr>
-              <a:t>aws_iam_access_key</a:t>
-            </a:r>
-            <a:r>
-              <a:rPr kumimoji="0" lang="de-DE" altLang="de-DE" sz="2400" b="0" i="0" u="none" strike="noStrike" cap="none" normalizeH="0" baseline="0" dirty="0" smtClean="0">
-                <a:ln>
-                  <a:noFill/>
-                </a:ln>
-                <a:solidFill>
-                  <a:srgbClr val="E5C07B"/>
-                </a:solidFill>
-                <a:effectLst/>
-                <a:latin typeface="JetBrains Mono"/>
-              </a:rPr>
-              <a:t>" "test2_key" </a:t>
-            </a:r>
-            <a:r>
-              <a:rPr kumimoji="0" lang="de-DE" altLang="de-DE" sz="2400" b="0" i="0" u="none" strike="noStrike" cap="none" normalizeH="0" baseline="0" dirty="0" smtClean="0">
-                <a:ln>
-                  <a:noFill/>
-                </a:ln>
-                <a:solidFill>
-                  <a:srgbClr val="BBBBBB"/>
-                </a:solidFill>
-                <a:effectLst/>
-                <a:latin typeface="JetBrains Mono"/>
-              </a:rPr>
-              <a:t>{</a:t>
-            </a:r>
-            <a:br>
-              <a:rPr kumimoji="0" lang="de-DE" altLang="de-DE" sz="2400" b="0" i="0" u="none" strike="noStrike" cap="none" normalizeH="0" baseline="0" dirty="0" smtClean="0">
-                <a:ln>
-                  <a:noFill/>
-                </a:ln>
-                <a:solidFill>
-                  <a:srgbClr val="BBBBBB"/>
-                </a:solidFill>
-                <a:effectLst/>
-                <a:latin typeface="JetBrains Mono"/>
-              </a:rPr>
-            </a:br>
-            <a:r>
-              <a:rPr kumimoji="0" lang="de-DE" altLang="de-DE" sz="2400" b="0" i="0" u="none" strike="noStrike" cap="none" normalizeH="0" baseline="0" dirty="0" smtClean="0">
-                <a:ln>
-                  <a:noFill/>
-                </a:ln>
-                <a:solidFill>
-                  <a:srgbClr val="BBBBBB"/>
-                </a:solidFill>
-                <a:effectLst/>
-                <a:latin typeface="JetBrains Mono"/>
-              </a:rPr>
-              <a:t>  </a:t>
-            </a:r>
-            <a:r>
-              <a:rPr kumimoji="0" lang="de-DE" altLang="de-DE" sz="2400" b="0" i="0" u="none" strike="noStrike" cap="none" normalizeH="0" baseline="0" dirty="0" err="1" smtClean="0">
-                <a:ln>
-                  <a:noFill/>
-                </a:ln>
-                <a:solidFill>
-                  <a:srgbClr val="EF596F"/>
-                </a:solidFill>
-                <a:effectLst/>
-                <a:latin typeface="JetBrains Mono"/>
-              </a:rPr>
-              <a:t>user</a:t>
-            </a:r>
-            <a:r>
-              <a:rPr kumimoji="0" lang="de-DE" altLang="de-DE" sz="2400" b="0" i="0" u="none" strike="noStrike" cap="none" normalizeH="0" baseline="0" dirty="0" smtClean="0">
-                <a:ln>
-                  <a:noFill/>
-                </a:ln>
-                <a:solidFill>
-                  <a:srgbClr val="EF596F"/>
-                </a:solidFill>
-                <a:effectLst/>
-                <a:latin typeface="JetBrains Mono"/>
-              </a:rPr>
-              <a:t> </a:t>
-            </a:r>
-            <a:r>
-              <a:rPr kumimoji="0" lang="de-DE" altLang="de-DE" sz="2400" b="0" i="0" u="none" strike="noStrike" cap="none" normalizeH="0" baseline="0" dirty="0" smtClean="0">
-                <a:ln>
-                  <a:noFill/>
-                </a:ln>
-                <a:solidFill>
-                  <a:srgbClr val="BBBBBB"/>
-                </a:solidFill>
-                <a:effectLst/>
-                <a:latin typeface="JetBrains Mono"/>
-              </a:rPr>
-              <a:t>= </a:t>
-            </a:r>
-            <a:r>
-              <a:rPr kumimoji="0" lang="de-DE" altLang="de-DE" sz="2400" b="0" i="0" u="none" strike="noStrike" cap="none" normalizeH="0" baseline="0" dirty="0" err="1" smtClean="0">
-                <a:ln>
-                  <a:noFill/>
-                </a:ln>
-                <a:solidFill>
-                  <a:srgbClr val="E5C07B"/>
-                </a:solidFill>
-                <a:effectLst/>
-                <a:latin typeface="JetBrains Mono"/>
-              </a:rPr>
-              <a:t>aws_iam_user</a:t>
-            </a:r>
-            <a:r>
-              <a:rPr kumimoji="0" lang="de-DE" altLang="de-DE" sz="2400" b="0" i="0" u="none" strike="noStrike" cap="none" normalizeH="0" baseline="0" dirty="0" err="1" smtClean="0">
-                <a:ln>
-                  <a:noFill/>
-                </a:ln>
-                <a:solidFill>
-                  <a:srgbClr val="BBBBBB"/>
-                </a:solidFill>
-                <a:effectLst/>
-                <a:latin typeface="JetBrains Mono"/>
-              </a:rPr>
-              <a:t>.</a:t>
-            </a:r>
-            <a:r>
-              <a:rPr kumimoji="0" lang="de-DE" altLang="de-DE" sz="2400" b="0" i="0" u="none" strike="noStrike" cap="none" normalizeH="0" baseline="0" dirty="0" err="1" smtClean="0">
-                <a:ln>
-                  <a:noFill/>
-                </a:ln>
-                <a:solidFill>
-                  <a:srgbClr val="E5C07B"/>
-                </a:solidFill>
-                <a:effectLst/>
-                <a:latin typeface="JetBrains Mono"/>
-              </a:rPr>
-              <a:t>my_user</a:t>
-            </a:r>
-            <a:r>
-              <a:rPr kumimoji="0" lang="de-DE" altLang="de-DE" sz="2400" b="0" i="0" u="none" strike="noStrike" cap="none" normalizeH="0" baseline="0" dirty="0" smtClean="0">
-                <a:ln>
-                  <a:noFill/>
-                </a:ln>
-                <a:solidFill>
-                  <a:srgbClr val="BBBBBB"/>
-                </a:solidFill>
-                <a:effectLst/>
-                <a:latin typeface="JetBrains Mono"/>
-              </a:rPr>
-              <a:t>[</a:t>
-            </a:r>
-            <a:r>
-              <a:rPr kumimoji="0" lang="de-DE" altLang="de-DE" sz="2400" b="0" i="0" u="none" strike="noStrike" cap="none" normalizeH="0" baseline="0" dirty="0" smtClean="0">
-                <a:ln>
-                  <a:noFill/>
-                </a:ln>
-                <a:solidFill>
-                  <a:srgbClr val="D19A66"/>
-                </a:solidFill>
-                <a:effectLst/>
-                <a:latin typeface="JetBrains Mono"/>
-              </a:rPr>
-              <a:t>1</a:t>
-            </a:r>
-            <a:r>
-              <a:rPr kumimoji="0" lang="de-DE" altLang="de-DE" sz="2400" b="0" i="0" u="none" strike="noStrike" cap="none" normalizeH="0" baseline="0" dirty="0" smtClean="0">
-                <a:ln>
-                  <a:noFill/>
-                </a:ln>
-                <a:solidFill>
-                  <a:srgbClr val="BBBBBB"/>
-                </a:solidFill>
-                <a:effectLst/>
+              <a:rPr lang="de-DE" altLang="de-DE" sz="2400" dirty="0" smtClean="0">
+                <a:solidFill>
+                  <a:srgbClr val="BBBBBB"/>
+                </a:solidFill>
                 <a:latin typeface="JetBrains Mono"/>
               </a:rPr>
               <a:t>].</a:t>

</xml_diff>

<commit_message>
Added slide for terraform graph
</commit_message>
<xml_diff>
--- a/Modul_3_Ressources/Ressources.pptx
+++ b/Modul_3_Ressources/Ressources.pptx
@@ -5,7 +5,7 @@
     <p:sldMasterId id="2147483648" r:id="rId1"/>
   </p:sldMasterIdLst>
   <p:notesMasterIdLst>
-    <p:notesMasterId r:id="rId22"/>
+    <p:notesMasterId r:id="rId23"/>
   </p:notesMasterIdLst>
   <p:sldIdLst>
     <p:sldId id="257" r:id="rId2"/>
@@ -21,13 +21,14 @@
     <p:sldId id="260" r:id="rId12"/>
     <p:sldId id="264" r:id="rId13"/>
     <p:sldId id="265" r:id="rId14"/>
-    <p:sldId id="270" r:id="rId15"/>
-    <p:sldId id="279" r:id="rId16"/>
-    <p:sldId id="281" r:id="rId17"/>
-    <p:sldId id="282" r:id="rId18"/>
-    <p:sldId id="283" r:id="rId19"/>
-    <p:sldId id="273" r:id="rId20"/>
-    <p:sldId id="274" r:id="rId21"/>
+    <p:sldId id="284" r:id="rId15"/>
+    <p:sldId id="270" r:id="rId16"/>
+    <p:sldId id="279" r:id="rId17"/>
+    <p:sldId id="281" r:id="rId18"/>
+    <p:sldId id="282" r:id="rId19"/>
+    <p:sldId id="283" r:id="rId20"/>
+    <p:sldId id="273" r:id="rId21"/>
+    <p:sldId id="274" r:id="rId22"/>
   </p:sldIdLst>
   <p:sldSz cx="12192000" cy="6858000"/>
   <p:notesSz cx="6858000" cy="9144000"/>
@@ -1193,6 +1194,334 @@
       <dsp:cNvGrpSpPr/>
     </dsp:nvGrpSpPr>
     <dsp:grpSpPr/>
+    <dsp:sp modelId="{EB5E673E-33F1-46A3-B2CF-D8E5A83AB1E5}">
+      <dsp:nvSpPr>
+        <dsp:cNvPr id="0" name=""/>
+        <dsp:cNvSpPr/>
+      </dsp:nvSpPr>
+      <dsp:spPr>
+        <a:xfrm>
+          <a:off x="5140" y="548891"/>
+          <a:ext cx="2992590" cy="1197036"/>
+        </a:xfrm>
+        <a:prstGeom prst="chevron">
+          <a:avLst/>
+        </a:prstGeom>
+        <a:solidFill>
+          <a:schemeClr val="accent1">
+            <a:hueOff val="0"/>
+            <a:satOff val="0"/>
+            <a:lumOff val="0"/>
+            <a:alphaOff val="0"/>
+          </a:schemeClr>
+        </a:solidFill>
+        <a:ln w="12700" cap="flat" cmpd="sng" algn="ctr">
+          <a:solidFill>
+            <a:schemeClr val="lt1">
+              <a:hueOff val="0"/>
+              <a:satOff val="0"/>
+              <a:lumOff val="0"/>
+              <a:alphaOff val="0"/>
+            </a:schemeClr>
+          </a:solidFill>
+          <a:prstDash val="solid"/>
+          <a:miter lim="800000"/>
+        </a:ln>
+        <a:effectLst/>
+      </dsp:spPr>
+      <dsp:style>
+        <a:lnRef idx="2">
+          <a:scrgbClr r="0" g="0" b="0"/>
+        </a:lnRef>
+        <a:fillRef idx="1">
+          <a:scrgbClr r="0" g="0" b="0"/>
+        </a:fillRef>
+        <a:effectRef idx="0">
+          <a:scrgbClr r="0" g="0" b="0"/>
+        </a:effectRef>
+        <a:fontRef idx="minor">
+          <a:schemeClr val="lt1"/>
+        </a:fontRef>
+      </dsp:style>
+      <dsp:txBody>
+        <a:bodyPr spcFirstLastPara="0" vert="horz" wrap="square" lIns="104013" tIns="34671" rIns="34671" bIns="34671" numCol="1" spcCol="1270" anchor="ctr" anchorCtr="0">
+          <a:noAutofit/>
+        </a:bodyPr>
+        <a:lstStyle/>
+        <a:p>
+          <a:pPr lvl="0" algn="ctr" defTabSz="1155700">
+            <a:lnSpc>
+              <a:spcPct val="90000"/>
+            </a:lnSpc>
+            <a:spcBef>
+              <a:spcPct val="0"/>
+            </a:spcBef>
+            <a:spcAft>
+              <a:spcPct val="35000"/>
+            </a:spcAft>
+          </a:pPr>
+          <a:r>
+            <a:rPr lang="de-DE" sz="2600" kern="1200" dirty="0" smtClean="0"/>
+            <a:t>Create</a:t>
+          </a:r>
+          <a:endParaRPr lang="de-DE" sz="2600" kern="1200" dirty="0"/>
+        </a:p>
+      </dsp:txBody>
+      <dsp:txXfrm>
+        <a:off x="603658" y="548891"/>
+        <a:ext cx="1795554" cy="1197036"/>
+      </dsp:txXfrm>
+    </dsp:sp>
+    <dsp:sp modelId="{D6A44A52-7EE1-4EFA-8D93-F4FC516819A9}">
+      <dsp:nvSpPr>
+        <dsp:cNvPr id="0" name=""/>
+        <dsp:cNvSpPr/>
+      </dsp:nvSpPr>
+      <dsp:spPr>
+        <a:xfrm>
+          <a:off x="2698472" y="548891"/>
+          <a:ext cx="2992590" cy="1197036"/>
+        </a:xfrm>
+        <a:prstGeom prst="chevron">
+          <a:avLst/>
+        </a:prstGeom>
+        <a:solidFill>
+          <a:schemeClr val="accent1">
+            <a:hueOff val="0"/>
+            <a:satOff val="0"/>
+            <a:lumOff val="0"/>
+            <a:alphaOff val="0"/>
+          </a:schemeClr>
+        </a:solidFill>
+        <a:ln w="12700" cap="flat" cmpd="sng" algn="ctr">
+          <a:solidFill>
+            <a:schemeClr val="lt1">
+              <a:hueOff val="0"/>
+              <a:satOff val="0"/>
+              <a:lumOff val="0"/>
+              <a:alphaOff val="0"/>
+            </a:schemeClr>
+          </a:solidFill>
+          <a:prstDash val="solid"/>
+          <a:miter lim="800000"/>
+        </a:ln>
+        <a:effectLst/>
+      </dsp:spPr>
+      <dsp:style>
+        <a:lnRef idx="2">
+          <a:scrgbClr r="0" g="0" b="0"/>
+        </a:lnRef>
+        <a:fillRef idx="1">
+          <a:scrgbClr r="0" g="0" b="0"/>
+        </a:fillRef>
+        <a:effectRef idx="0">
+          <a:scrgbClr r="0" g="0" b="0"/>
+        </a:effectRef>
+        <a:fontRef idx="minor">
+          <a:schemeClr val="lt1"/>
+        </a:fontRef>
+      </dsp:style>
+      <dsp:txBody>
+        <a:bodyPr spcFirstLastPara="0" vert="horz" wrap="square" lIns="104013" tIns="34671" rIns="34671" bIns="34671" numCol="1" spcCol="1270" anchor="ctr" anchorCtr="0">
+          <a:noAutofit/>
+        </a:bodyPr>
+        <a:lstStyle/>
+        <a:p>
+          <a:pPr lvl="0" algn="ctr" defTabSz="1155700">
+            <a:lnSpc>
+              <a:spcPct val="90000"/>
+            </a:lnSpc>
+            <a:spcBef>
+              <a:spcPct val="0"/>
+            </a:spcBef>
+            <a:spcAft>
+              <a:spcPct val="35000"/>
+            </a:spcAft>
+          </a:pPr>
+          <a:r>
+            <a:rPr lang="de-DE" sz="2600" kern="1200" dirty="0" err="1" smtClean="0"/>
+            <a:t>Destroy</a:t>
+          </a:r>
+          <a:endParaRPr lang="de-DE" sz="2600" kern="1200" dirty="0"/>
+        </a:p>
+      </dsp:txBody>
+      <dsp:txXfrm>
+        <a:off x="3296990" y="548891"/>
+        <a:ext cx="1795554" cy="1197036"/>
+      </dsp:txXfrm>
+    </dsp:sp>
+    <dsp:sp modelId="{A95A2FA1-2525-4E62-912B-28C162AD2F23}">
+      <dsp:nvSpPr>
+        <dsp:cNvPr id="0" name=""/>
+        <dsp:cNvSpPr/>
+      </dsp:nvSpPr>
+      <dsp:spPr>
+        <a:xfrm>
+          <a:off x="5391803" y="548891"/>
+          <a:ext cx="2992590" cy="1197036"/>
+        </a:xfrm>
+        <a:prstGeom prst="chevron">
+          <a:avLst/>
+        </a:prstGeom>
+        <a:solidFill>
+          <a:schemeClr val="accent1">
+            <a:hueOff val="0"/>
+            <a:satOff val="0"/>
+            <a:lumOff val="0"/>
+            <a:alphaOff val="0"/>
+          </a:schemeClr>
+        </a:solidFill>
+        <a:ln w="12700" cap="flat" cmpd="sng" algn="ctr">
+          <a:solidFill>
+            <a:schemeClr val="lt1">
+              <a:hueOff val="0"/>
+              <a:satOff val="0"/>
+              <a:lumOff val="0"/>
+              <a:alphaOff val="0"/>
+            </a:schemeClr>
+          </a:solidFill>
+          <a:prstDash val="solid"/>
+          <a:miter lim="800000"/>
+        </a:ln>
+        <a:effectLst/>
+      </dsp:spPr>
+      <dsp:style>
+        <a:lnRef idx="2">
+          <a:scrgbClr r="0" g="0" b="0"/>
+        </a:lnRef>
+        <a:fillRef idx="1">
+          <a:scrgbClr r="0" g="0" b="0"/>
+        </a:fillRef>
+        <a:effectRef idx="0">
+          <a:scrgbClr r="0" g="0" b="0"/>
+        </a:effectRef>
+        <a:fontRef idx="minor">
+          <a:schemeClr val="lt1"/>
+        </a:fontRef>
+      </dsp:style>
+      <dsp:txBody>
+        <a:bodyPr spcFirstLastPara="0" vert="horz" wrap="square" lIns="104013" tIns="34671" rIns="34671" bIns="34671" numCol="1" spcCol="1270" anchor="ctr" anchorCtr="0">
+          <a:noAutofit/>
+        </a:bodyPr>
+        <a:lstStyle/>
+        <a:p>
+          <a:pPr lvl="0" algn="ctr" defTabSz="1155700">
+            <a:lnSpc>
+              <a:spcPct val="90000"/>
+            </a:lnSpc>
+            <a:spcBef>
+              <a:spcPct val="0"/>
+            </a:spcBef>
+            <a:spcAft>
+              <a:spcPct val="35000"/>
+            </a:spcAft>
+          </a:pPr>
+          <a:r>
+            <a:rPr lang="de-DE" sz="2600" kern="1200" dirty="0" smtClean="0"/>
+            <a:t>Update</a:t>
+          </a:r>
+          <a:endParaRPr lang="de-DE" sz="2600" kern="1200" dirty="0"/>
+        </a:p>
+      </dsp:txBody>
+      <dsp:txXfrm>
+        <a:off x="5990321" y="548891"/>
+        <a:ext cx="1795554" cy="1197036"/>
+      </dsp:txXfrm>
+    </dsp:sp>
+    <dsp:sp modelId="{1CCDB9B4-44E7-4A67-8847-3F3690177928}">
+      <dsp:nvSpPr>
+        <dsp:cNvPr id="0" name=""/>
+        <dsp:cNvSpPr/>
+      </dsp:nvSpPr>
+      <dsp:spPr>
+        <a:xfrm>
+          <a:off x="8085135" y="548891"/>
+          <a:ext cx="2992590" cy="1197036"/>
+        </a:xfrm>
+        <a:prstGeom prst="chevron">
+          <a:avLst/>
+        </a:prstGeom>
+        <a:solidFill>
+          <a:schemeClr val="accent1">
+            <a:hueOff val="0"/>
+            <a:satOff val="0"/>
+            <a:lumOff val="0"/>
+            <a:alphaOff val="0"/>
+          </a:schemeClr>
+        </a:solidFill>
+        <a:ln w="12700" cap="flat" cmpd="sng" algn="ctr">
+          <a:solidFill>
+            <a:schemeClr val="lt1">
+              <a:hueOff val="0"/>
+              <a:satOff val="0"/>
+              <a:lumOff val="0"/>
+              <a:alphaOff val="0"/>
+            </a:schemeClr>
+          </a:solidFill>
+          <a:prstDash val="solid"/>
+          <a:miter lim="800000"/>
+        </a:ln>
+        <a:effectLst/>
+      </dsp:spPr>
+      <dsp:style>
+        <a:lnRef idx="2">
+          <a:scrgbClr r="0" g="0" b="0"/>
+        </a:lnRef>
+        <a:fillRef idx="1">
+          <a:scrgbClr r="0" g="0" b="0"/>
+        </a:fillRef>
+        <a:effectRef idx="0">
+          <a:scrgbClr r="0" g="0" b="0"/>
+        </a:effectRef>
+        <a:fontRef idx="minor">
+          <a:schemeClr val="lt1"/>
+        </a:fontRef>
+      </dsp:style>
+      <dsp:txBody>
+        <a:bodyPr spcFirstLastPara="0" vert="horz" wrap="square" lIns="104013" tIns="34671" rIns="34671" bIns="34671" numCol="1" spcCol="1270" anchor="ctr" anchorCtr="0">
+          <a:noAutofit/>
+        </a:bodyPr>
+        <a:lstStyle/>
+        <a:p>
+          <a:pPr lvl="0" algn="ctr" defTabSz="1155700">
+            <a:lnSpc>
+              <a:spcPct val="90000"/>
+            </a:lnSpc>
+            <a:spcBef>
+              <a:spcPct val="0"/>
+            </a:spcBef>
+            <a:spcAft>
+              <a:spcPct val="35000"/>
+            </a:spcAft>
+          </a:pPr>
+          <a:r>
+            <a:rPr lang="de-DE" sz="2600" kern="1200" dirty="0" err="1" smtClean="0"/>
+            <a:t>Destroy</a:t>
+          </a:r>
+          <a:r>
+            <a:rPr lang="de-DE" sz="2600" kern="1200" dirty="0" smtClean="0"/>
+            <a:t> </a:t>
+          </a:r>
+          <a:r>
+            <a:rPr lang="de-DE" sz="2600" kern="1200" dirty="0" err="1" smtClean="0"/>
+            <a:t>and</a:t>
+          </a:r>
+          <a:r>
+            <a:rPr lang="de-DE" sz="2600" kern="1200" dirty="0" smtClean="0"/>
+            <a:t> </a:t>
+          </a:r>
+          <a:r>
+            <a:rPr lang="de-DE" sz="2600" kern="1200" dirty="0" err="1" smtClean="0"/>
+            <a:t>re-create</a:t>
+          </a:r>
+          <a:endParaRPr lang="de-DE" sz="2600" kern="1200" dirty="0"/>
+        </a:p>
+      </dsp:txBody>
+      <dsp:txXfrm>
+        <a:off x="8683653" y="548891"/>
+        <a:ext cx="1795554" cy="1197036"/>
+      </dsp:txXfrm>
+    </dsp:sp>
   </dsp:spTree>
 </dsp:drawing>
 </file>
@@ -3202,7 +3531,7 @@
     </p:spTree>
     <p:extLst>
       <p:ext uri="{BB962C8B-B14F-4D97-AF65-F5344CB8AC3E}">
-        <p14:creationId xmlns:p14="http://schemas.microsoft.com/office/powerpoint/2010/main" val="2043901991"/>
+        <p14:creationId xmlns:p14="http://schemas.microsoft.com/office/powerpoint/2010/main" val="2769845326"/>
       </p:ext>
     </p:extLst>
   </p:cSld>
@@ -3286,7 +3615,7 @@
     </p:spTree>
     <p:extLst>
       <p:ext uri="{BB962C8B-B14F-4D97-AF65-F5344CB8AC3E}">
-        <p14:creationId xmlns:p14="http://schemas.microsoft.com/office/powerpoint/2010/main" val="2160244950"/>
+        <p14:creationId xmlns:p14="http://schemas.microsoft.com/office/powerpoint/2010/main" val="2043901991"/>
       </p:ext>
     </p:extLst>
   </p:cSld>
@@ -3370,7 +3699,7 @@
     </p:spTree>
     <p:extLst>
       <p:ext uri="{BB962C8B-B14F-4D97-AF65-F5344CB8AC3E}">
-        <p14:creationId xmlns:p14="http://schemas.microsoft.com/office/powerpoint/2010/main" val="1833851798"/>
+        <p14:creationId xmlns:p14="http://schemas.microsoft.com/office/powerpoint/2010/main" val="2160244950"/>
       </p:ext>
     </p:extLst>
   </p:cSld>
@@ -3454,7 +3783,7 @@
     </p:spTree>
     <p:extLst>
       <p:ext uri="{BB962C8B-B14F-4D97-AF65-F5344CB8AC3E}">
-        <p14:creationId xmlns:p14="http://schemas.microsoft.com/office/powerpoint/2010/main" val="514855900"/>
+        <p14:creationId xmlns:p14="http://schemas.microsoft.com/office/powerpoint/2010/main" val="1833851798"/>
       </p:ext>
     </p:extLst>
   </p:cSld>
@@ -3538,7 +3867,7 @@
     </p:spTree>
     <p:extLst>
       <p:ext uri="{BB962C8B-B14F-4D97-AF65-F5344CB8AC3E}">
-        <p14:creationId xmlns:p14="http://schemas.microsoft.com/office/powerpoint/2010/main" val="1707336810"/>
+        <p14:creationId xmlns:p14="http://schemas.microsoft.com/office/powerpoint/2010/main" val="514855900"/>
       </p:ext>
     </p:extLst>
   </p:cSld>
@@ -3622,7 +3951,7 @@
     </p:spTree>
     <p:extLst>
       <p:ext uri="{BB962C8B-B14F-4D97-AF65-F5344CB8AC3E}">
-        <p14:creationId xmlns:p14="http://schemas.microsoft.com/office/powerpoint/2010/main" val="144144860"/>
+        <p14:creationId xmlns:p14="http://schemas.microsoft.com/office/powerpoint/2010/main" val="1707336810"/>
       </p:ext>
     </p:extLst>
   </p:cSld>
@@ -3698,6 +4027,90 @@
             <a:fld id="{E58C7EAB-645A-4FBB-B6AF-831236EEB6FB}" type="slidenum">
               <a:rPr lang="de-DE" smtClean="0"/>
               <a:t>20</a:t>
+            </a:fld>
+            <a:endParaRPr lang="de-DE"/>
+          </a:p>
+        </p:txBody>
+      </p:sp>
+    </p:spTree>
+    <p:extLst>
+      <p:ext uri="{BB962C8B-B14F-4D97-AF65-F5344CB8AC3E}">
+        <p14:creationId xmlns:p14="http://schemas.microsoft.com/office/powerpoint/2010/main" val="144144860"/>
+      </p:ext>
+    </p:extLst>
+  </p:cSld>
+  <p:clrMapOvr>
+    <a:masterClrMapping/>
+  </p:clrMapOvr>
+</p:notes>
+</file>
+
+<file path=ppt/notesSlides/notesSlide19.xml><?xml version="1.0" encoding="utf-8"?>
+<p:notes xmlns:a="http://schemas.openxmlformats.org/drawingml/2006/main" xmlns:r="http://schemas.openxmlformats.org/officeDocument/2006/relationships" xmlns:p="http://schemas.openxmlformats.org/presentationml/2006/main">
+  <p:cSld>
+    <p:spTree>
+      <p:nvGrpSpPr>
+        <p:cNvPr id="1" name=""/>
+        <p:cNvGrpSpPr/>
+        <p:nvPr/>
+      </p:nvGrpSpPr>
+      <p:grpSpPr>
+        <a:xfrm>
+          <a:off x="0" y="0"/>
+          <a:ext cx="0" cy="0"/>
+          <a:chOff x="0" y="0"/>
+          <a:chExt cx="0" cy="0"/>
+        </a:xfrm>
+      </p:grpSpPr>
+      <p:sp>
+        <p:nvSpPr>
+          <p:cNvPr id="2" name="Folienbildplatzhalter 1"/>
+          <p:cNvSpPr>
+            <a:spLocks noGrp="1" noRot="1" noChangeAspect="1"/>
+          </p:cNvSpPr>
+          <p:nvPr>
+            <p:ph type="sldImg"/>
+          </p:nvPr>
+        </p:nvSpPr>
+        <p:spPr/>
+      </p:sp>
+      <p:sp>
+        <p:nvSpPr>
+          <p:cNvPr id="3" name="Notizenplatzhalter 2"/>
+          <p:cNvSpPr>
+            <a:spLocks noGrp="1"/>
+          </p:cNvSpPr>
+          <p:nvPr>
+            <p:ph type="body" idx="1"/>
+          </p:nvPr>
+        </p:nvSpPr>
+        <p:spPr/>
+        <p:txBody>
+          <a:bodyPr/>
+          <a:lstStyle/>
+          <a:p>
+            <a:endParaRPr lang="de-DE" dirty="0"/>
+          </a:p>
+        </p:txBody>
+      </p:sp>
+      <p:sp>
+        <p:nvSpPr>
+          <p:cNvPr id="4" name="Foliennummernplatzhalter 3"/>
+          <p:cNvSpPr>
+            <a:spLocks noGrp="1"/>
+          </p:cNvSpPr>
+          <p:nvPr>
+            <p:ph type="sldNum" sz="quarter" idx="10"/>
+          </p:nvPr>
+        </p:nvSpPr>
+        <p:spPr/>
+        <p:txBody>
+          <a:bodyPr/>
+          <a:lstStyle/>
+          <a:p>
+            <a:fld id="{E58C7EAB-645A-4FBB-B6AF-831236EEB6FB}" type="slidenum">
+              <a:rPr lang="de-DE" smtClean="0"/>
+              <a:t>21</a:t>
             </a:fld>
             <a:endParaRPr lang="de-DE"/>
           </a:p>
@@ -9246,12 +9659,12 @@
           <a:lstStyle/>
           <a:p>
             <a:r>
+              <a:rPr lang="de-DE" dirty="0" err="1" smtClean="0"/>
+              <a:t>Dependency</a:t>
+            </a:r>
+            <a:r>
               <a:rPr lang="de-DE" dirty="0" smtClean="0"/>
-              <a:t>Meta-Argument - </a:t>
-            </a:r>
-            <a:r>
-              <a:rPr lang="de-DE" dirty="0" err="1" smtClean="0"/>
-              <a:t>provider</a:t>
+              <a:t> Graph</a:t>
             </a:r>
             <a:endParaRPr lang="de-DE" dirty="0"/>
           </a:p>
@@ -9278,7 +9691,27 @@
             </a:pPr>
             <a:r>
               <a:rPr lang="de-DE" dirty="0" smtClean="0"/>
-              <a:t>Via Alias können verschiedene Konfigurationen pro Provider angelegt werden (siehe Modul 2 -&gt; Provider)</a:t>
+              <a:t>Über </a:t>
+            </a:r>
+            <a:r>
+              <a:rPr lang="de-DE" i="1" dirty="0" err="1" smtClean="0"/>
+              <a:t>terraform</a:t>
+            </a:r>
+            <a:r>
+              <a:rPr lang="de-DE" i="1" dirty="0" smtClean="0"/>
+              <a:t> </a:t>
+            </a:r>
+            <a:r>
+              <a:rPr lang="de-DE" i="1" dirty="0" err="1" smtClean="0"/>
+              <a:t>graph</a:t>
+            </a:r>
+            <a:r>
+              <a:rPr lang="de-DE" i="1" dirty="0" smtClean="0"/>
+              <a:t> </a:t>
+            </a:r>
+            <a:r>
+              <a:rPr lang="de-DE" dirty="0" smtClean="0"/>
+              <a:t>lassen sich die Abhängigkeiten anzeigen</a:t>
             </a:r>
           </a:p>
           <a:p>
@@ -9288,505 +9721,44 @@
             </a:pPr>
             <a:r>
               <a:rPr lang="de-DE" dirty="0" smtClean="0"/>
-              <a:t>Mit dem Meta-Argument </a:t>
-            </a:r>
-            <a:r>
-              <a:rPr lang="de-DE" dirty="0" err="1" smtClean="0"/>
-              <a:t>provider</a:t>
+              <a:t>Visualisierung z.B. </a:t>
             </a:r>
             <a:r>
               <a:rPr lang="de-DE" dirty="0"/>
-              <a:t> </a:t>
-            </a:r>
-            <a:r>
-              <a:rPr lang="de-DE" dirty="0" smtClean="0"/>
-              <a:t>kann der jeweilige Provider über den Alias angegeben werden</a:t>
-            </a:r>
-            <a:endParaRPr lang="de-DE" dirty="0"/>
-          </a:p>
-          <a:p>
-            <a:pPr lvl="1">
-              <a:buFontTx/>
-              <a:buChar char="-"/>
-            </a:pPr>
+              <a:t>via http://dreampuf.github.io/GraphvizOnline</a:t>
+            </a:r>
             <a:endParaRPr lang="de-DE" dirty="0" smtClean="0"/>
           </a:p>
         </p:txBody>
       </p:sp>
-      <p:sp>
-        <p:nvSpPr>
-          <p:cNvPr id="4" name="Rectangle 1"/>
-          <p:cNvSpPr>
-            <a:spLocks noChangeArrowheads="1"/>
-          </p:cNvSpPr>
+      <p:pic>
+        <p:nvPicPr>
+          <p:cNvPr id="4" name="Grafik 3"/>
+          <p:cNvPicPr>
+            <a:picLocks noChangeAspect="1"/>
+          </p:cNvPicPr>
           <p:nvPr/>
-        </p:nvSpPr>
-        <p:spPr bwMode="auto">
+        </p:nvPicPr>
+        <p:blipFill>
+          <a:blip r:embed="rId3"/>
+          <a:stretch>
+            <a:fillRect/>
+          </a:stretch>
+        </p:blipFill>
+        <p:spPr>
           <a:xfrm>
-            <a:off x="2731911" y="4148050"/>
-            <a:ext cx="6728178" cy="1938992"/>
+            <a:off x="0" y="3351173"/>
+            <a:ext cx="12192000" cy="2577119"/>
           </a:xfrm>
           <a:prstGeom prst="rect">
             <a:avLst/>
           </a:prstGeom>
-          <a:solidFill>
-            <a:srgbClr val="282C34"/>
-          </a:solidFill>
-          <a:ln>
-            <a:noFill/>
-          </a:ln>
-          <a:effectLst/>
-          <a:extLst>
-            <a:ext uri="{91240B29-F687-4F45-9708-019B960494DF}">
-              <a14:hiddenLine xmlns:a14="http://schemas.microsoft.com/office/drawing/2010/main" w="9525">
-                <a:solidFill>
-                  <a:schemeClr val="tx1"/>
-                </a:solidFill>
-                <a:miter lim="800000"/>
-                <a:headEnd/>
-                <a:tailEnd/>
-              </a14:hiddenLine>
-            </a:ext>
-            <a:ext uri="{AF507438-7753-43E0-B8FC-AC1667EBCBE1}">
-              <a14:hiddenEffects xmlns:a14="http://schemas.microsoft.com/office/drawing/2010/main">
-                <a:effectLst>
-                  <a:outerShdw dist="35921" dir="2700000" algn="ctr" rotWithShape="0">
-                    <a:schemeClr val="bg2"/>
-                  </a:outerShdw>
-                </a:effectLst>
-              </a14:hiddenEffects>
-            </a:ext>
-          </a:extLst>
         </p:spPr>
-        <p:txBody>
-          <a:bodyPr vert="horz" wrap="square" lIns="91440" tIns="45720" rIns="91440" bIns="45720" numCol="1" anchor="ctr" anchorCtr="0" compatLnSpc="1">
-            <a:prstTxWarp prst="textNoShape">
-              <a:avLst/>
-            </a:prstTxWarp>
-            <a:spAutoFit/>
-          </a:bodyPr>
-          <a:lstStyle/>
-          <a:p>
-            <a:pPr lvl="0" eaLnBrk="0" fontAlgn="base" hangingPunct="0">
-              <a:spcBef>
-                <a:spcPct val="0"/>
-              </a:spcBef>
-              <a:spcAft>
-                <a:spcPct val="0"/>
-              </a:spcAft>
-            </a:pPr>
-            <a:r>
-              <a:rPr kumimoji="0" lang="de-DE" altLang="de-DE" sz="2400" b="0" i="1" u="none" strike="noStrike" cap="none" normalizeH="0" baseline="0" dirty="0" err="1" smtClean="0">
-                <a:ln>
-                  <a:noFill/>
-                </a:ln>
-                <a:solidFill>
-                  <a:srgbClr val="D55FDE"/>
-                </a:solidFill>
-                <a:effectLst/>
-                <a:latin typeface="JetBrains Mono"/>
-              </a:rPr>
-              <a:t>resource</a:t>
-            </a:r>
-            <a:r>
-              <a:rPr kumimoji="0" lang="de-DE" altLang="de-DE" sz="2400" b="0" i="1" u="none" strike="noStrike" cap="none" normalizeH="0" baseline="0" dirty="0" smtClean="0">
-                <a:ln>
-                  <a:noFill/>
-                </a:ln>
-                <a:solidFill>
-                  <a:srgbClr val="D55FDE"/>
-                </a:solidFill>
-                <a:effectLst/>
-                <a:latin typeface="JetBrains Mono"/>
-              </a:rPr>
-              <a:t> </a:t>
-            </a:r>
-            <a:r>
-              <a:rPr kumimoji="0" lang="de-DE" altLang="de-DE" sz="2400" b="0" i="0" u="none" strike="noStrike" cap="none" normalizeH="0" baseline="0" dirty="0" smtClean="0">
-                <a:ln>
-                  <a:noFill/>
-                </a:ln>
-                <a:solidFill>
-                  <a:srgbClr val="E5C07B"/>
-                </a:solidFill>
-                <a:effectLst/>
-                <a:latin typeface="JetBrains Mono"/>
-              </a:rPr>
-              <a:t>"</a:t>
-            </a:r>
-            <a:r>
-              <a:rPr kumimoji="0" lang="de-DE" altLang="de-DE" sz="2400" b="0" i="0" u="none" strike="noStrike" cap="none" normalizeH="0" baseline="0" dirty="0" err="1" smtClean="0">
-                <a:ln>
-                  <a:noFill/>
-                </a:ln>
-                <a:solidFill>
-                  <a:srgbClr val="E5C07B"/>
-                </a:solidFill>
-                <a:effectLst/>
-                <a:latin typeface="JetBrains Mono"/>
-              </a:rPr>
-              <a:t>aws_instance</a:t>
-            </a:r>
-            <a:r>
-              <a:rPr kumimoji="0" lang="de-DE" altLang="de-DE" sz="2400" b="0" i="0" u="none" strike="noStrike" cap="none" normalizeH="0" baseline="0" dirty="0" smtClean="0">
-                <a:ln>
-                  <a:noFill/>
-                </a:ln>
-                <a:solidFill>
-                  <a:srgbClr val="E5C07B"/>
-                </a:solidFill>
-                <a:effectLst/>
-                <a:latin typeface="JetBrains Mono"/>
-              </a:rPr>
-              <a:t>" "</a:t>
-            </a:r>
-            <a:r>
-              <a:rPr kumimoji="0" lang="de-DE" altLang="de-DE" sz="2400" b="0" i="0" u="none" strike="noStrike" cap="none" normalizeH="0" baseline="0" dirty="0" err="1" smtClean="0">
-                <a:ln>
-                  <a:noFill/>
-                </a:ln>
-                <a:solidFill>
-                  <a:srgbClr val="E5C07B"/>
-                </a:solidFill>
-                <a:effectLst/>
-                <a:latin typeface="JetBrains Mono"/>
-              </a:rPr>
-              <a:t>example</a:t>
-            </a:r>
-            <a:r>
-              <a:rPr kumimoji="0" lang="de-DE" altLang="de-DE" sz="2400" b="0" i="0" u="none" strike="noStrike" cap="none" normalizeH="0" baseline="0" dirty="0" smtClean="0">
-                <a:ln>
-                  <a:noFill/>
-                </a:ln>
-                <a:solidFill>
-                  <a:srgbClr val="E5C07B"/>
-                </a:solidFill>
-                <a:effectLst/>
-                <a:latin typeface="JetBrains Mono"/>
-              </a:rPr>
-              <a:t>" </a:t>
-            </a:r>
-            <a:r>
-              <a:rPr kumimoji="0" lang="de-DE" altLang="de-DE" sz="2400" b="0" i="0" u="none" strike="noStrike" cap="none" normalizeH="0" baseline="0" dirty="0" smtClean="0">
-                <a:ln>
-                  <a:noFill/>
-                </a:ln>
-                <a:solidFill>
-                  <a:srgbClr val="BBBBBB"/>
-                </a:solidFill>
-                <a:effectLst/>
-                <a:latin typeface="JetBrains Mono"/>
-              </a:rPr>
-              <a:t>{</a:t>
-            </a:r>
-            <a:br>
-              <a:rPr kumimoji="0" lang="de-DE" altLang="de-DE" sz="2400" b="0" i="0" u="none" strike="noStrike" cap="none" normalizeH="0" baseline="0" dirty="0" smtClean="0">
-                <a:ln>
-                  <a:noFill/>
-                </a:ln>
-                <a:solidFill>
-                  <a:srgbClr val="BBBBBB"/>
-                </a:solidFill>
-                <a:effectLst/>
-                <a:latin typeface="JetBrains Mono"/>
-              </a:rPr>
-            </a:br>
-            <a:r>
-              <a:rPr kumimoji="0" lang="de-DE" altLang="de-DE" sz="2400" b="0" i="0" u="none" strike="noStrike" cap="none" normalizeH="0" baseline="0" dirty="0" smtClean="0">
-                <a:ln>
-                  <a:noFill/>
-                </a:ln>
-                <a:solidFill>
-                  <a:srgbClr val="BBBBBB"/>
-                </a:solidFill>
-                <a:effectLst/>
-                <a:latin typeface="JetBrains Mono"/>
-              </a:rPr>
-              <a:t>  </a:t>
-            </a:r>
-            <a:r>
-              <a:rPr kumimoji="0" lang="de-DE" altLang="de-DE" sz="2400" b="0" i="0" u="none" strike="noStrike" cap="none" normalizeH="0" baseline="0" dirty="0" err="1" smtClean="0">
-                <a:ln>
-                  <a:noFill/>
-                </a:ln>
-                <a:solidFill>
-                  <a:srgbClr val="EF596F"/>
-                </a:solidFill>
-                <a:effectLst/>
-                <a:latin typeface="JetBrains Mono"/>
-              </a:rPr>
-              <a:t>ami</a:t>
-            </a:r>
-            <a:r>
-              <a:rPr kumimoji="0" lang="de-DE" altLang="de-DE" sz="2400" b="0" i="0" u="none" strike="noStrike" cap="none" normalizeH="0" baseline="0" dirty="0" smtClean="0">
-                <a:ln>
-                  <a:noFill/>
-                </a:ln>
-                <a:solidFill>
-                  <a:srgbClr val="EF596F"/>
-                </a:solidFill>
-                <a:effectLst/>
-                <a:latin typeface="JetBrains Mono"/>
-              </a:rPr>
-              <a:t>           </a:t>
-            </a:r>
-            <a:r>
-              <a:rPr kumimoji="0" lang="de-DE" altLang="de-DE" sz="2400" b="0" i="0" u="none" strike="noStrike" cap="none" normalizeH="0" baseline="0" dirty="0" smtClean="0">
-                <a:ln>
-                  <a:noFill/>
-                </a:ln>
-                <a:solidFill>
-                  <a:srgbClr val="BBBBBB"/>
-                </a:solidFill>
-                <a:effectLst/>
-                <a:latin typeface="JetBrains Mono"/>
-              </a:rPr>
-              <a:t>= </a:t>
-            </a:r>
-            <a:r>
-              <a:rPr lang="de-DE" altLang="de-DE" sz="2400" dirty="0" smtClean="0">
-                <a:solidFill>
-                  <a:srgbClr val="89CA78"/>
-                </a:solidFill>
-                <a:latin typeface="JetBrains Mono"/>
-              </a:rPr>
-              <a:t>"ami-68dae275</a:t>
-            </a:r>
-            <a:r>
-              <a:rPr kumimoji="0" lang="de-DE" altLang="de-DE" sz="2400" b="0" i="0" u="none" strike="noStrike" cap="none" normalizeH="0" baseline="0" dirty="0" smtClean="0">
-                <a:ln>
-                  <a:noFill/>
-                </a:ln>
-                <a:solidFill>
-                  <a:srgbClr val="89CA78"/>
-                </a:solidFill>
-                <a:effectLst/>
-                <a:latin typeface="JetBrains Mono"/>
-              </a:rPr>
-              <a:t>"</a:t>
-            </a:r>
-            <a:br>
-              <a:rPr kumimoji="0" lang="de-DE" altLang="de-DE" sz="2400" b="0" i="0" u="none" strike="noStrike" cap="none" normalizeH="0" baseline="0" dirty="0" smtClean="0">
-                <a:ln>
-                  <a:noFill/>
-                </a:ln>
-                <a:solidFill>
-                  <a:srgbClr val="89CA78"/>
-                </a:solidFill>
-                <a:effectLst/>
-                <a:latin typeface="JetBrains Mono"/>
-              </a:rPr>
-            </a:br>
-            <a:r>
-              <a:rPr kumimoji="0" lang="de-DE" altLang="de-DE" sz="2400" b="0" i="0" u="none" strike="noStrike" cap="none" normalizeH="0" baseline="0" dirty="0" smtClean="0">
-                <a:ln>
-                  <a:noFill/>
-                </a:ln>
-                <a:solidFill>
-                  <a:srgbClr val="89CA78"/>
-                </a:solidFill>
-                <a:effectLst/>
-                <a:latin typeface="JetBrains Mono"/>
-              </a:rPr>
-              <a:t>  </a:t>
-            </a:r>
-            <a:r>
-              <a:rPr kumimoji="0" lang="de-DE" altLang="de-DE" sz="2400" b="0" i="0" u="none" strike="noStrike" cap="none" normalizeH="0" baseline="0" dirty="0" err="1" smtClean="0">
-                <a:ln>
-                  <a:noFill/>
-                </a:ln>
-                <a:solidFill>
-                  <a:srgbClr val="EF596F"/>
-                </a:solidFill>
-                <a:effectLst/>
-                <a:latin typeface="JetBrains Mono"/>
-              </a:rPr>
-              <a:t>instance_type</a:t>
-            </a:r>
-            <a:r>
-              <a:rPr kumimoji="0" lang="de-DE" altLang="de-DE" sz="2400" b="0" i="0" u="none" strike="noStrike" cap="none" normalizeH="0" baseline="0" dirty="0" smtClean="0">
-                <a:ln>
-                  <a:noFill/>
-                </a:ln>
-                <a:solidFill>
-                  <a:srgbClr val="EF596F"/>
-                </a:solidFill>
-                <a:effectLst/>
-                <a:latin typeface="JetBrains Mono"/>
-              </a:rPr>
-              <a:t> </a:t>
-            </a:r>
-            <a:r>
-              <a:rPr kumimoji="0" lang="de-DE" altLang="de-DE" sz="2400" b="0" i="0" u="none" strike="noStrike" cap="none" normalizeH="0" baseline="0" dirty="0" smtClean="0">
-                <a:ln>
-                  <a:noFill/>
-                </a:ln>
-                <a:solidFill>
-                  <a:srgbClr val="BBBBBB"/>
-                </a:solidFill>
-                <a:effectLst/>
-                <a:latin typeface="JetBrains Mono"/>
-              </a:rPr>
-              <a:t>= </a:t>
-            </a:r>
-            <a:r>
-              <a:rPr kumimoji="0" lang="de-DE" altLang="de-DE" sz="2400" b="0" i="0" u="none" strike="noStrike" cap="none" normalizeH="0" baseline="0" dirty="0" smtClean="0">
-                <a:ln>
-                  <a:noFill/>
-                </a:ln>
-                <a:solidFill>
-                  <a:srgbClr val="89CA78"/>
-                </a:solidFill>
-                <a:effectLst/>
-                <a:latin typeface="JetBrains Mono"/>
-              </a:rPr>
-              <a:t>"t2.micro"</a:t>
-            </a:r>
-            <a:br>
-              <a:rPr kumimoji="0" lang="de-DE" altLang="de-DE" sz="2400" b="0" i="0" u="none" strike="noStrike" cap="none" normalizeH="0" baseline="0" dirty="0" smtClean="0">
-                <a:ln>
-                  <a:noFill/>
-                </a:ln>
-                <a:solidFill>
-                  <a:srgbClr val="89CA78"/>
-                </a:solidFill>
-                <a:effectLst/>
-                <a:latin typeface="JetBrains Mono"/>
-              </a:rPr>
-            </a:br>
-            <a:r>
-              <a:rPr kumimoji="0" lang="de-DE" altLang="de-DE" sz="2400" b="0" i="0" u="none" strike="noStrike" cap="none" normalizeH="0" baseline="0" dirty="0" smtClean="0">
-                <a:ln>
-                  <a:noFill/>
-                </a:ln>
-                <a:solidFill>
-                  <a:srgbClr val="89CA78"/>
-                </a:solidFill>
-                <a:effectLst/>
-                <a:latin typeface="JetBrains Mono"/>
-              </a:rPr>
-              <a:t>  </a:t>
-            </a:r>
-            <a:r>
-              <a:rPr kumimoji="0" lang="de-DE" altLang="de-DE" sz="2400" b="0" i="0" u="none" strike="noStrike" cap="none" normalizeH="0" baseline="0" dirty="0" err="1" smtClean="0">
-                <a:ln>
-                  <a:noFill/>
-                </a:ln>
-                <a:solidFill>
-                  <a:srgbClr val="EF596F"/>
-                </a:solidFill>
-                <a:effectLst/>
-                <a:latin typeface="JetBrains Mono"/>
-              </a:rPr>
-              <a:t>provider</a:t>
-            </a:r>
-            <a:r>
-              <a:rPr kumimoji="0" lang="de-DE" altLang="de-DE" sz="2400" b="0" i="0" u="none" strike="noStrike" cap="none" normalizeH="0" baseline="0" dirty="0" smtClean="0">
-                <a:ln>
-                  <a:noFill/>
-                </a:ln>
-                <a:solidFill>
-                  <a:srgbClr val="EF596F"/>
-                </a:solidFill>
-                <a:effectLst/>
-                <a:latin typeface="JetBrains Mono"/>
-              </a:rPr>
-              <a:t> </a:t>
-            </a:r>
-            <a:r>
-              <a:rPr kumimoji="0" lang="de-DE" altLang="de-DE" sz="2400" b="0" i="0" u="none" strike="noStrike" cap="none" normalizeH="0" baseline="0" dirty="0" smtClean="0">
-                <a:ln>
-                  <a:noFill/>
-                </a:ln>
-                <a:solidFill>
-                  <a:srgbClr val="BBBBBB"/>
-                </a:solidFill>
-                <a:effectLst/>
-                <a:latin typeface="JetBrains Mono"/>
-              </a:rPr>
-              <a:t>= </a:t>
-            </a:r>
-            <a:r>
-              <a:rPr kumimoji="0" lang="de-DE" altLang="de-DE" sz="2400" b="0" i="0" u="none" strike="noStrike" cap="none" normalizeH="0" baseline="0" dirty="0" smtClean="0">
-                <a:ln>
-                  <a:noFill/>
-                </a:ln>
-                <a:solidFill>
-                  <a:srgbClr val="E5C07B"/>
-                </a:solidFill>
-                <a:effectLst/>
-                <a:latin typeface="JetBrains Mono"/>
-              </a:rPr>
-              <a:t>aws</a:t>
-            </a:r>
-            <a:r>
-              <a:rPr kumimoji="0" lang="de-DE" altLang="de-DE" sz="2400" b="0" i="0" u="none" strike="noStrike" cap="none" normalizeH="0" baseline="0" dirty="0" smtClean="0">
-                <a:ln>
-                  <a:noFill/>
-                </a:ln>
-                <a:solidFill>
-                  <a:srgbClr val="BBBBBB"/>
-                </a:solidFill>
-                <a:effectLst/>
-                <a:latin typeface="JetBrains Mono"/>
-              </a:rPr>
-              <a:t>.</a:t>
-            </a:r>
-            <a:r>
-              <a:rPr kumimoji="0" lang="de-DE" altLang="de-DE" sz="2400" b="0" i="0" u="none" strike="noStrike" cap="none" normalizeH="0" baseline="0" dirty="0" smtClean="0">
-                <a:ln>
-                  <a:noFill/>
-                </a:ln>
-                <a:solidFill>
-                  <a:srgbClr val="E5C07B"/>
-                </a:solidFill>
-                <a:effectLst/>
-                <a:latin typeface="JetBrains Mono"/>
-              </a:rPr>
-              <a:t>eu-west-1</a:t>
-            </a:r>
-            <a:br>
-              <a:rPr kumimoji="0" lang="de-DE" altLang="de-DE" sz="2400" b="0" i="0" u="none" strike="noStrike" cap="none" normalizeH="0" baseline="0" dirty="0" smtClean="0">
-                <a:ln>
-                  <a:noFill/>
-                </a:ln>
-                <a:solidFill>
-                  <a:srgbClr val="E5C07B"/>
-                </a:solidFill>
-                <a:effectLst/>
-                <a:latin typeface="JetBrains Mono"/>
-              </a:rPr>
-            </a:br>
-            <a:r>
-              <a:rPr kumimoji="0" lang="de-DE" altLang="de-DE" sz="2400" b="0" i="0" u="none" strike="noStrike" cap="none" normalizeH="0" baseline="0" dirty="0" smtClean="0">
-                <a:ln>
-                  <a:noFill/>
-                </a:ln>
-                <a:solidFill>
-                  <a:srgbClr val="BBBBBB"/>
-                </a:solidFill>
-                <a:effectLst/>
-                <a:latin typeface="JetBrains Mono"/>
-              </a:rPr>
-              <a:t>}</a:t>
-            </a:r>
-            <a:endParaRPr kumimoji="0" lang="de-DE" altLang="de-DE" sz="4800" b="0" i="0" u="none" strike="noStrike" cap="none" normalizeH="0" baseline="0" dirty="0" smtClean="0">
-              <a:ln>
-                <a:noFill/>
-              </a:ln>
-              <a:solidFill>
-                <a:schemeClr val="tx1"/>
-              </a:solidFill>
-              <a:effectLst/>
-              <a:latin typeface="Arial" panose="020B0604020202020204" pitchFamily="34" charset="0"/>
-            </a:endParaRPr>
-          </a:p>
-        </p:txBody>
-      </p:sp>
+      </p:pic>
     </p:spTree>
     <p:extLst>
       <p:ext uri="{BB962C8B-B14F-4D97-AF65-F5344CB8AC3E}">
-        <p14:creationId xmlns:p14="http://schemas.microsoft.com/office/powerpoint/2010/main" val="762944614"/>
+        <p14:creationId xmlns:p14="http://schemas.microsoft.com/office/powerpoint/2010/main" val="4305104"/>
       </p:ext>
     </p:extLst>
   </p:cSld>
@@ -9841,6 +9813,596 @@
             </a:r>
             <a:r>
               <a:rPr lang="de-DE" dirty="0" err="1" smtClean="0"/>
+              <a:t>provider</a:t>
+            </a:r>
+            <a:endParaRPr lang="de-DE" dirty="0"/>
+          </a:p>
+        </p:txBody>
+      </p:sp>
+      <p:sp>
+        <p:nvSpPr>
+          <p:cNvPr id="3" name="Inhaltsplatzhalter 2"/>
+          <p:cNvSpPr>
+            <a:spLocks noGrp="1"/>
+          </p:cNvSpPr>
+          <p:nvPr>
+            <p:ph idx="1"/>
+          </p:nvPr>
+        </p:nvSpPr>
+        <p:spPr/>
+        <p:txBody>
+          <a:bodyPr/>
+          <a:lstStyle/>
+          <a:p>
+            <a:pPr>
+              <a:buFontTx/>
+              <a:buChar char="-"/>
+            </a:pPr>
+            <a:r>
+              <a:rPr lang="de-DE" dirty="0" smtClean="0"/>
+              <a:t>Via Alias können verschiedene Konfigurationen pro Provider angelegt werden (siehe Modul 2 -&gt; Provider)</a:t>
+            </a:r>
+          </a:p>
+          <a:p>
+            <a:pPr>
+              <a:buFontTx/>
+              <a:buChar char="-"/>
+            </a:pPr>
+            <a:r>
+              <a:rPr lang="de-DE" dirty="0" smtClean="0"/>
+              <a:t>Mit dem Meta-Argument </a:t>
+            </a:r>
+            <a:r>
+              <a:rPr lang="de-DE" dirty="0" err="1" smtClean="0"/>
+              <a:t>provider</a:t>
+            </a:r>
+            <a:r>
+              <a:rPr lang="de-DE" dirty="0"/>
+              <a:t> </a:t>
+            </a:r>
+            <a:r>
+              <a:rPr lang="de-DE" dirty="0" smtClean="0"/>
+              <a:t>kann der jeweilige Provider über den Alias angegeben werden</a:t>
+            </a:r>
+            <a:endParaRPr lang="de-DE" dirty="0"/>
+          </a:p>
+          <a:p>
+            <a:pPr lvl="1">
+              <a:buFontTx/>
+              <a:buChar char="-"/>
+            </a:pPr>
+            <a:endParaRPr lang="de-DE" dirty="0" smtClean="0"/>
+          </a:p>
+        </p:txBody>
+      </p:sp>
+      <p:sp>
+        <p:nvSpPr>
+          <p:cNvPr id="4" name="Rectangle 1"/>
+          <p:cNvSpPr>
+            <a:spLocks noChangeArrowheads="1"/>
+          </p:cNvSpPr>
+          <p:nvPr/>
+        </p:nvSpPr>
+        <p:spPr bwMode="auto">
+          <a:xfrm>
+            <a:off x="2731911" y="4148050"/>
+            <a:ext cx="6728178" cy="1938992"/>
+          </a:xfrm>
+          <a:prstGeom prst="rect">
+            <a:avLst/>
+          </a:prstGeom>
+          <a:solidFill>
+            <a:srgbClr val="282C34"/>
+          </a:solidFill>
+          <a:ln>
+            <a:noFill/>
+          </a:ln>
+          <a:effectLst/>
+          <a:extLst>
+            <a:ext uri="{91240B29-F687-4F45-9708-019B960494DF}">
+              <a14:hiddenLine xmlns:a14="http://schemas.microsoft.com/office/drawing/2010/main" w="9525">
+                <a:solidFill>
+                  <a:schemeClr val="tx1"/>
+                </a:solidFill>
+                <a:miter lim="800000"/>
+                <a:headEnd/>
+                <a:tailEnd/>
+              </a14:hiddenLine>
+            </a:ext>
+            <a:ext uri="{AF507438-7753-43E0-B8FC-AC1667EBCBE1}">
+              <a14:hiddenEffects xmlns:a14="http://schemas.microsoft.com/office/drawing/2010/main">
+                <a:effectLst>
+                  <a:outerShdw dist="35921" dir="2700000" algn="ctr" rotWithShape="0">
+                    <a:schemeClr val="bg2"/>
+                  </a:outerShdw>
+                </a:effectLst>
+              </a14:hiddenEffects>
+            </a:ext>
+          </a:extLst>
+        </p:spPr>
+        <p:txBody>
+          <a:bodyPr vert="horz" wrap="square" lIns="91440" tIns="45720" rIns="91440" bIns="45720" numCol="1" anchor="ctr" anchorCtr="0" compatLnSpc="1">
+            <a:prstTxWarp prst="textNoShape">
+              <a:avLst/>
+            </a:prstTxWarp>
+            <a:spAutoFit/>
+          </a:bodyPr>
+          <a:lstStyle/>
+          <a:p>
+            <a:pPr lvl="0" eaLnBrk="0" fontAlgn="base" hangingPunct="0">
+              <a:spcBef>
+                <a:spcPct val="0"/>
+              </a:spcBef>
+              <a:spcAft>
+                <a:spcPct val="0"/>
+              </a:spcAft>
+            </a:pPr>
+            <a:r>
+              <a:rPr kumimoji="0" lang="de-DE" altLang="de-DE" sz="2400" b="0" i="1" u="none" strike="noStrike" cap="none" normalizeH="0" baseline="0" dirty="0" err="1" smtClean="0">
+                <a:ln>
+                  <a:noFill/>
+                </a:ln>
+                <a:solidFill>
+                  <a:srgbClr val="D55FDE"/>
+                </a:solidFill>
+                <a:effectLst/>
+                <a:latin typeface="JetBrains Mono"/>
+              </a:rPr>
+              <a:t>resource</a:t>
+            </a:r>
+            <a:r>
+              <a:rPr kumimoji="0" lang="de-DE" altLang="de-DE" sz="2400" b="0" i="1" u="none" strike="noStrike" cap="none" normalizeH="0" baseline="0" dirty="0" smtClean="0">
+                <a:ln>
+                  <a:noFill/>
+                </a:ln>
+                <a:solidFill>
+                  <a:srgbClr val="D55FDE"/>
+                </a:solidFill>
+                <a:effectLst/>
+                <a:latin typeface="JetBrains Mono"/>
+              </a:rPr>
+              <a:t> </a:t>
+            </a:r>
+            <a:r>
+              <a:rPr kumimoji="0" lang="de-DE" altLang="de-DE" sz="2400" b="0" i="0" u="none" strike="noStrike" cap="none" normalizeH="0" baseline="0" dirty="0" smtClean="0">
+                <a:ln>
+                  <a:noFill/>
+                </a:ln>
+                <a:solidFill>
+                  <a:srgbClr val="E5C07B"/>
+                </a:solidFill>
+                <a:effectLst/>
+                <a:latin typeface="JetBrains Mono"/>
+              </a:rPr>
+              <a:t>"</a:t>
+            </a:r>
+            <a:r>
+              <a:rPr kumimoji="0" lang="de-DE" altLang="de-DE" sz="2400" b="0" i="0" u="none" strike="noStrike" cap="none" normalizeH="0" baseline="0" dirty="0" err="1" smtClean="0">
+                <a:ln>
+                  <a:noFill/>
+                </a:ln>
+                <a:solidFill>
+                  <a:srgbClr val="E5C07B"/>
+                </a:solidFill>
+                <a:effectLst/>
+                <a:latin typeface="JetBrains Mono"/>
+              </a:rPr>
+              <a:t>aws_instance</a:t>
+            </a:r>
+            <a:r>
+              <a:rPr kumimoji="0" lang="de-DE" altLang="de-DE" sz="2400" b="0" i="0" u="none" strike="noStrike" cap="none" normalizeH="0" baseline="0" dirty="0" smtClean="0">
+                <a:ln>
+                  <a:noFill/>
+                </a:ln>
+                <a:solidFill>
+                  <a:srgbClr val="E5C07B"/>
+                </a:solidFill>
+                <a:effectLst/>
+                <a:latin typeface="JetBrains Mono"/>
+              </a:rPr>
+              <a:t>" "</a:t>
+            </a:r>
+            <a:r>
+              <a:rPr kumimoji="0" lang="de-DE" altLang="de-DE" sz="2400" b="0" i="0" u="none" strike="noStrike" cap="none" normalizeH="0" baseline="0" dirty="0" err="1" smtClean="0">
+                <a:ln>
+                  <a:noFill/>
+                </a:ln>
+                <a:solidFill>
+                  <a:srgbClr val="E5C07B"/>
+                </a:solidFill>
+                <a:effectLst/>
+                <a:latin typeface="JetBrains Mono"/>
+              </a:rPr>
+              <a:t>example</a:t>
+            </a:r>
+            <a:r>
+              <a:rPr kumimoji="0" lang="de-DE" altLang="de-DE" sz="2400" b="0" i="0" u="none" strike="noStrike" cap="none" normalizeH="0" baseline="0" dirty="0" smtClean="0">
+                <a:ln>
+                  <a:noFill/>
+                </a:ln>
+                <a:solidFill>
+                  <a:srgbClr val="E5C07B"/>
+                </a:solidFill>
+                <a:effectLst/>
+                <a:latin typeface="JetBrains Mono"/>
+              </a:rPr>
+              <a:t>" </a:t>
+            </a:r>
+            <a:r>
+              <a:rPr kumimoji="0" lang="de-DE" altLang="de-DE" sz="2400" b="0" i="0" u="none" strike="noStrike" cap="none" normalizeH="0" baseline="0" dirty="0" smtClean="0">
+                <a:ln>
+                  <a:noFill/>
+                </a:ln>
+                <a:solidFill>
+                  <a:srgbClr val="BBBBBB"/>
+                </a:solidFill>
+                <a:effectLst/>
+                <a:latin typeface="JetBrains Mono"/>
+              </a:rPr>
+              <a:t>{</a:t>
+            </a:r>
+            <a:br>
+              <a:rPr kumimoji="0" lang="de-DE" altLang="de-DE" sz="2400" b="0" i="0" u="none" strike="noStrike" cap="none" normalizeH="0" baseline="0" dirty="0" smtClean="0">
+                <a:ln>
+                  <a:noFill/>
+                </a:ln>
+                <a:solidFill>
+                  <a:srgbClr val="BBBBBB"/>
+                </a:solidFill>
+                <a:effectLst/>
+                <a:latin typeface="JetBrains Mono"/>
+              </a:rPr>
+            </a:br>
+            <a:r>
+              <a:rPr kumimoji="0" lang="de-DE" altLang="de-DE" sz="2400" b="0" i="0" u="none" strike="noStrike" cap="none" normalizeH="0" baseline="0" dirty="0" smtClean="0">
+                <a:ln>
+                  <a:noFill/>
+                </a:ln>
+                <a:solidFill>
+                  <a:srgbClr val="BBBBBB"/>
+                </a:solidFill>
+                <a:effectLst/>
+                <a:latin typeface="JetBrains Mono"/>
+              </a:rPr>
+              <a:t>  </a:t>
+            </a:r>
+            <a:r>
+              <a:rPr kumimoji="0" lang="de-DE" altLang="de-DE" sz="2400" b="0" i="0" u="none" strike="noStrike" cap="none" normalizeH="0" baseline="0" dirty="0" err="1" smtClean="0">
+                <a:ln>
+                  <a:noFill/>
+                </a:ln>
+                <a:solidFill>
+                  <a:srgbClr val="EF596F"/>
+                </a:solidFill>
+                <a:effectLst/>
+                <a:latin typeface="JetBrains Mono"/>
+              </a:rPr>
+              <a:t>ami</a:t>
+            </a:r>
+            <a:r>
+              <a:rPr kumimoji="0" lang="de-DE" altLang="de-DE" sz="2400" b="0" i="0" u="none" strike="noStrike" cap="none" normalizeH="0" baseline="0" dirty="0" smtClean="0">
+                <a:ln>
+                  <a:noFill/>
+                </a:ln>
+                <a:solidFill>
+                  <a:srgbClr val="EF596F"/>
+                </a:solidFill>
+                <a:effectLst/>
+                <a:latin typeface="JetBrains Mono"/>
+              </a:rPr>
+              <a:t>           </a:t>
+            </a:r>
+            <a:r>
+              <a:rPr kumimoji="0" lang="de-DE" altLang="de-DE" sz="2400" b="0" i="0" u="none" strike="noStrike" cap="none" normalizeH="0" baseline="0" dirty="0" smtClean="0">
+                <a:ln>
+                  <a:noFill/>
+                </a:ln>
+                <a:solidFill>
+                  <a:srgbClr val="BBBBBB"/>
+                </a:solidFill>
+                <a:effectLst/>
+                <a:latin typeface="JetBrains Mono"/>
+              </a:rPr>
+              <a:t>= </a:t>
+            </a:r>
+            <a:r>
+              <a:rPr lang="de-DE" altLang="de-DE" sz="2400" dirty="0" smtClean="0">
+                <a:solidFill>
+                  <a:srgbClr val="89CA78"/>
+                </a:solidFill>
+                <a:latin typeface="JetBrains Mono"/>
+              </a:rPr>
+              <a:t>"ami-68dae275</a:t>
+            </a:r>
+            <a:r>
+              <a:rPr kumimoji="0" lang="de-DE" altLang="de-DE" sz="2400" b="0" i="0" u="none" strike="noStrike" cap="none" normalizeH="0" baseline="0" dirty="0" smtClean="0">
+                <a:ln>
+                  <a:noFill/>
+                </a:ln>
+                <a:solidFill>
+                  <a:srgbClr val="89CA78"/>
+                </a:solidFill>
+                <a:effectLst/>
+                <a:latin typeface="JetBrains Mono"/>
+              </a:rPr>
+              <a:t>"</a:t>
+            </a:r>
+            <a:br>
+              <a:rPr kumimoji="0" lang="de-DE" altLang="de-DE" sz="2400" b="0" i="0" u="none" strike="noStrike" cap="none" normalizeH="0" baseline="0" dirty="0" smtClean="0">
+                <a:ln>
+                  <a:noFill/>
+                </a:ln>
+                <a:solidFill>
+                  <a:srgbClr val="89CA78"/>
+                </a:solidFill>
+                <a:effectLst/>
+                <a:latin typeface="JetBrains Mono"/>
+              </a:rPr>
+            </a:br>
+            <a:r>
+              <a:rPr kumimoji="0" lang="de-DE" altLang="de-DE" sz="2400" b="0" i="0" u="none" strike="noStrike" cap="none" normalizeH="0" baseline="0" dirty="0" smtClean="0">
+                <a:ln>
+                  <a:noFill/>
+                </a:ln>
+                <a:solidFill>
+                  <a:srgbClr val="89CA78"/>
+                </a:solidFill>
+                <a:effectLst/>
+                <a:latin typeface="JetBrains Mono"/>
+              </a:rPr>
+              <a:t>  </a:t>
+            </a:r>
+            <a:r>
+              <a:rPr kumimoji="0" lang="de-DE" altLang="de-DE" sz="2400" b="0" i="0" u="none" strike="noStrike" cap="none" normalizeH="0" baseline="0" dirty="0" err="1" smtClean="0">
+                <a:ln>
+                  <a:noFill/>
+                </a:ln>
+                <a:solidFill>
+                  <a:srgbClr val="EF596F"/>
+                </a:solidFill>
+                <a:effectLst/>
+                <a:latin typeface="JetBrains Mono"/>
+              </a:rPr>
+              <a:t>instance_type</a:t>
+            </a:r>
+            <a:r>
+              <a:rPr kumimoji="0" lang="de-DE" altLang="de-DE" sz="2400" b="0" i="0" u="none" strike="noStrike" cap="none" normalizeH="0" baseline="0" dirty="0" smtClean="0">
+                <a:ln>
+                  <a:noFill/>
+                </a:ln>
+                <a:solidFill>
+                  <a:srgbClr val="EF596F"/>
+                </a:solidFill>
+                <a:effectLst/>
+                <a:latin typeface="JetBrains Mono"/>
+              </a:rPr>
+              <a:t> </a:t>
+            </a:r>
+            <a:r>
+              <a:rPr kumimoji="0" lang="de-DE" altLang="de-DE" sz="2400" b="0" i="0" u="none" strike="noStrike" cap="none" normalizeH="0" baseline="0" dirty="0" smtClean="0">
+                <a:ln>
+                  <a:noFill/>
+                </a:ln>
+                <a:solidFill>
+                  <a:srgbClr val="BBBBBB"/>
+                </a:solidFill>
+                <a:effectLst/>
+                <a:latin typeface="JetBrains Mono"/>
+              </a:rPr>
+              <a:t>= </a:t>
+            </a:r>
+            <a:r>
+              <a:rPr kumimoji="0" lang="de-DE" altLang="de-DE" sz="2400" b="0" i="0" u="none" strike="noStrike" cap="none" normalizeH="0" baseline="0" dirty="0" smtClean="0">
+                <a:ln>
+                  <a:noFill/>
+                </a:ln>
+                <a:solidFill>
+                  <a:srgbClr val="89CA78"/>
+                </a:solidFill>
+                <a:effectLst/>
+                <a:latin typeface="JetBrains Mono"/>
+              </a:rPr>
+              <a:t>"t2.micro"</a:t>
+            </a:r>
+            <a:br>
+              <a:rPr kumimoji="0" lang="de-DE" altLang="de-DE" sz="2400" b="0" i="0" u="none" strike="noStrike" cap="none" normalizeH="0" baseline="0" dirty="0" smtClean="0">
+                <a:ln>
+                  <a:noFill/>
+                </a:ln>
+                <a:solidFill>
+                  <a:srgbClr val="89CA78"/>
+                </a:solidFill>
+                <a:effectLst/>
+                <a:latin typeface="JetBrains Mono"/>
+              </a:rPr>
+            </a:br>
+            <a:r>
+              <a:rPr kumimoji="0" lang="de-DE" altLang="de-DE" sz="2400" b="0" i="0" u="none" strike="noStrike" cap="none" normalizeH="0" baseline="0" dirty="0" smtClean="0">
+                <a:ln>
+                  <a:noFill/>
+                </a:ln>
+                <a:solidFill>
+                  <a:srgbClr val="89CA78"/>
+                </a:solidFill>
+                <a:effectLst/>
+                <a:latin typeface="JetBrains Mono"/>
+              </a:rPr>
+              <a:t>  </a:t>
+            </a:r>
+            <a:r>
+              <a:rPr kumimoji="0" lang="de-DE" altLang="de-DE" sz="2400" b="0" i="0" u="none" strike="noStrike" cap="none" normalizeH="0" baseline="0" dirty="0" err="1" smtClean="0">
+                <a:ln>
+                  <a:noFill/>
+                </a:ln>
+                <a:solidFill>
+                  <a:srgbClr val="EF596F"/>
+                </a:solidFill>
+                <a:effectLst/>
+                <a:latin typeface="JetBrains Mono"/>
+              </a:rPr>
+              <a:t>provider</a:t>
+            </a:r>
+            <a:r>
+              <a:rPr kumimoji="0" lang="de-DE" altLang="de-DE" sz="2400" b="0" i="0" u="none" strike="noStrike" cap="none" normalizeH="0" baseline="0" dirty="0" smtClean="0">
+                <a:ln>
+                  <a:noFill/>
+                </a:ln>
+                <a:solidFill>
+                  <a:srgbClr val="EF596F"/>
+                </a:solidFill>
+                <a:effectLst/>
+                <a:latin typeface="JetBrains Mono"/>
+              </a:rPr>
+              <a:t> </a:t>
+            </a:r>
+            <a:r>
+              <a:rPr kumimoji="0" lang="de-DE" altLang="de-DE" sz="2400" b="0" i="0" u="none" strike="noStrike" cap="none" normalizeH="0" baseline="0" dirty="0" smtClean="0">
+                <a:ln>
+                  <a:noFill/>
+                </a:ln>
+                <a:solidFill>
+                  <a:srgbClr val="BBBBBB"/>
+                </a:solidFill>
+                <a:effectLst/>
+                <a:latin typeface="JetBrains Mono"/>
+              </a:rPr>
+              <a:t>= </a:t>
+            </a:r>
+            <a:r>
+              <a:rPr kumimoji="0" lang="de-DE" altLang="de-DE" sz="2400" b="0" i="0" u="none" strike="noStrike" cap="none" normalizeH="0" baseline="0" dirty="0" smtClean="0">
+                <a:ln>
+                  <a:noFill/>
+                </a:ln>
+                <a:solidFill>
+                  <a:srgbClr val="E5C07B"/>
+                </a:solidFill>
+                <a:effectLst/>
+                <a:latin typeface="JetBrains Mono"/>
+              </a:rPr>
+              <a:t>aws</a:t>
+            </a:r>
+            <a:r>
+              <a:rPr kumimoji="0" lang="de-DE" altLang="de-DE" sz="2400" b="0" i="0" u="none" strike="noStrike" cap="none" normalizeH="0" baseline="0" dirty="0" smtClean="0">
+                <a:ln>
+                  <a:noFill/>
+                </a:ln>
+                <a:solidFill>
+                  <a:srgbClr val="BBBBBB"/>
+                </a:solidFill>
+                <a:effectLst/>
+                <a:latin typeface="JetBrains Mono"/>
+              </a:rPr>
+              <a:t>.</a:t>
+            </a:r>
+            <a:r>
+              <a:rPr kumimoji="0" lang="de-DE" altLang="de-DE" sz="2400" b="0" i="0" u="none" strike="noStrike" cap="none" normalizeH="0" baseline="0" dirty="0" smtClean="0">
+                <a:ln>
+                  <a:noFill/>
+                </a:ln>
+                <a:solidFill>
+                  <a:srgbClr val="E5C07B"/>
+                </a:solidFill>
+                <a:effectLst/>
+                <a:latin typeface="JetBrains Mono"/>
+              </a:rPr>
+              <a:t>eu-west-1</a:t>
+            </a:r>
+            <a:br>
+              <a:rPr kumimoji="0" lang="de-DE" altLang="de-DE" sz="2400" b="0" i="0" u="none" strike="noStrike" cap="none" normalizeH="0" baseline="0" dirty="0" smtClean="0">
+                <a:ln>
+                  <a:noFill/>
+                </a:ln>
+                <a:solidFill>
+                  <a:srgbClr val="E5C07B"/>
+                </a:solidFill>
+                <a:effectLst/>
+                <a:latin typeface="JetBrains Mono"/>
+              </a:rPr>
+            </a:br>
+            <a:r>
+              <a:rPr kumimoji="0" lang="de-DE" altLang="de-DE" sz="2400" b="0" i="0" u="none" strike="noStrike" cap="none" normalizeH="0" baseline="0" dirty="0" smtClean="0">
+                <a:ln>
+                  <a:noFill/>
+                </a:ln>
+                <a:solidFill>
+                  <a:srgbClr val="BBBBBB"/>
+                </a:solidFill>
+                <a:effectLst/>
+                <a:latin typeface="JetBrains Mono"/>
+              </a:rPr>
+              <a:t>}</a:t>
+            </a:r>
+            <a:endParaRPr kumimoji="0" lang="de-DE" altLang="de-DE" sz="4800" b="0" i="0" u="none" strike="noStrike" cap="none" normalizeH="0" baseline="0" dirty="0" smtClean="0">
+              <a:ln>
+                <a:noFill/>
+              </a:ln>
+              <a:solidFill>
+                <a:schemeClr val="tx1"/>
+              </a:solidFill>
+              <a:effectLst/>
+              <a:latin typeface="Arial" panose="020B0604020202020204" pitchFamily="34" charset="0"/>
+            </a:endParaRPr>
+          </a:p>
+        </p:txBody>
+      </p:sp>
+    </p:spTree>
+    <p:extLst>
+      <p:ext uri="{BB962C8B-B14F-4D97-AF65-F5344CB8AC3E}">
+        <p14:creationId xmlns:p14="http://schemas.microsoft.com/office/powerpoint/2010/main" val="762944614"/>
+      </p:ext>
+    </p:extLst>
+  </p:cSld>
+  <p:clrMapOvr>
+    <a:masterClrMapping/>
+  </p:clrMapOvr>
+  <p:timing>
+    <p:tnLst>
+      <p:par>
+        <p:cTn id="1" dur="indefinite" restart="never" nodeType="tmRoot"/>
+      </p:par>
+    </p:tnLst>
+  </p:timing>
+</p:sld>
+</file>
+
+<file path=ppt/slides/slide16.xml><?xml version="1.0" encoding="utf-8"?>
+<p:sld xmlns:a="http://schemas.openxmlformats.org/drawingml/2006/main" xmlns:r="http://schemas.openxmlformats.org/officeDocument/2006/relationships" xmlns:p="http://schemas.openxmlformats.org/presentationml/2006/main">
+  <p:cSld>
+    <p:spTree>
+      <p:nvGrpSpPr>
+        <p:cNvPr id="1" name=""/>
+        <p:cNvGrpSpPr/>
+        <p:nvPr/>
+      </p:nvGrpSpPr>
+      <p:grpSpPr>
+        <a:xfrm>
+          <a:off x="0" y="0"/>
+          <a:ext cx="0" cy="0"/>
+          <a:chOff x="0" y="0"/>
+          <a:chExt cx="0" cy="0"/>
+        </a:xfrm>
+      </p:grpSpPr>
+      <p:sp>
+        <p:nvSpPr>
+          <p:cNvPr id="2" name="Titel 1"/>
+          <p:cNvSpPr>
+            <a:spLocks noGrp="1"/>
+          </p:cNvSpPr>
+          <p:nvPr>
+            <p:ph type="title"/>
+          </p:nvPr>
+        </p:nvSpPr>
+        <p:spPr/>
+        <p:txBody>
+          <a:bodyPr/>
+          <a:lstStyle/>
+          <a:p>
+            <a:r>
+              <a:rPr lang="de-DE" dirty="0" smtClean="0"/>
+              <a:t>Meta-Argument - </a:t>
+            </a:r>
+            <a:r>
+              <a:rPr lang="de-DE" dirty="0" err="1" smtClean="0"/>
               <a:t>lifecycle</a:t>
             </a:r>
             <a:endParaRPr lang="de-DE" dirty="0"/>
@@ -9938,7 +10500,7 @@
 </p:sld>
 </file>
 
-<file path=ppt/slides/slide16.xml><?xml version="1.0" encoding="utf-8"?>
+<file path=ppt/slides/slide17.xml><?xml version="1.0" encoding="utf-8"?>
 <p:sld xmlns:a="http://schemas.openxmlformats.org/drawingml/2006/main" xmlns:r="http://schemas.openxmlformats.org/officeDocument/2006/relationships" xmlns:p="http://schemas.openxmlformats.org/presentationml/2006/main">
   <p:cSld>
     <p:spTree>
@@ -10713,595 +11275,6 @@
 </p:sld>
 </file>
 
-<file path=ppt/slides/slide17.xml><?xml version="1.0" encoding="utf-8"?>
-<p:sld xmlns:a="http://schemas.openxmlformats.org/drawingml/2006/main" xmlns:r="http://schemas.openxmlformats.org/officeDocument/2006/relationships" xmlns:p="http://schemas.openxmlformats.org/presentationml/2006/main">
-  <p:cSld>
-    <p:spTree>
-      <p:nvGrpSpPr>
-        <p:cNvPr id="1" name=""/>
-        <p:cNvGrpSpPr/>
-        <p:nvPr/>
-      </p:nvGrpSpPr>
-      <p:grpSpPr>
-        <a:xfrm>
-          <a:off x="0" y="0"/>
-          <a:ext cx="0" cy="0"/>
-          <a:chOff x="0" y="0"/>
-          <a:chExt cx="0" cy="0"/>
-        </a:xfrm>
-      </p:grpSpPr>
-      <p:sp>
-        <p:nvSpPr>
-          <p:cNvPr id="2" name="Titel 1"/>
-          <p:cNvSpPr>
-            <a:spLocks noGrp="1"/>
-          </p:cNvSpPr>
-          <p:nvPr>
-            <p:ph type="title"/>
-          </p:nvPr>
-        </p:nvSpPr>
-        <p:spPr/>
-        <p:txBody>
-          <a:bodyPr/>
-          <a:lstStyle/>
-          <a:p>
-            <a:r>
-              <a:rPr lang="de-DE" dirty="0" err="1"/>
-              <a:t>Lifecycle</a:t>
-            </a:r>
-            <a:r>
-              <a:rPr lang="de-DE" dirty="0"/>
-              <a:t> </a:t>
-            </a:r>
-            <a:r>
-              <a:rPr lang="de-DE" dirty="0" smtClean="0"/>
-              <a:t>- </a:t>
-            </a:r>
-            <a:r>
-              <a:rPr lang="de-DE" dirty="0" err="1" smtClean="0"/>
-              <a:t>prevent_destroy</a:t>
-            </a:r>
-            <a:endParaRPr lang="de-DE" dirty="0"/>
-          </a:p>
-        </p:txBody>
-      </p:sp>
-      <p:sp>
-        <p:nvSpPr>
-          <p:cNvPr id="3" name="Inhaltsplatzhalter 2"/>
-          <p:cNvSpPr>
-            <a:spLocks noGrp="1"/>
-          </p:cNvSpPr>
-          <p:nvPr>
-            <p:ph idx="1"/>
-          </p:nvPr>
-        </p:nvSpPr>
-        <p:spPr/>
-        <p:txBody>
-          <a:bodyPr/>
-          <a:lstStyle/>
-          <a:p>
-            <a:pPr>
-              <a:buFontTx/>
-              <a:buChar char="-"/>
-            </a:pPr>
-            <a:r>
-              <a:rPr lang="de-DE" dirty="0" smtClean="0"/>
-              <a:t>Dient dazu zu verhindern, dass kritische Infrastrukturobjekte versehentlich zerstört werden</a:t>
-            </a:r>
-          </a:p>
-          <a:p>
-            <a:pPr>
-              <a:buFontTx/>
-              <a:buChar char="-"/>
-            </a:pPr>
-            <a:r>
-              <a:rPr lang="de-DE" dirty="0" smtClean="0"/>
-              <a:t>Soll das Infrastrukturobjekt tatsächlich zerstört werden, muss das Meta-Argument erst aus der Konfiguration entfernt werden</a:t>
-            </a:r>
-          </a:p>
-        </p:txBody>
-      </p:sp>
-      <p:sp>
-        <p:nvSpPr>
-          <p:cNvPr id="4" name="Rectangle 1"/>
-          <p:cNvSpPr>
-            <a:spLocks noChangeArrowheads="1"/>
-          </p:cNvSpPr>
-          <p:nvPr/>
-        </p:nvSpPr>
-        <p:spPr bwMode="auto">
-          <a:xfrm>
-            <a:off x="2432756" y="4001294"/>
-            <a:ext cx="7326488" cy="2308324"/>
-          </a:xfrm>
-          <a:prstGeom prst="rect">
-            <a:avLst/>
-          </a:prstGeom>
-          <a:solidFill>
-            <a:srgbClr val="282C34"/>
-          </a:solidFill>
-          <a:ln>
-            <a:noFill/>
-          </a:ln>
-          <a:effectLst/>
-          <a:extLst>
-            <a:ext uri="{91240B29-F687-4F45-9708-019B960494DF}">
-              <a14:hiddenLine xmlns:a14="http://schemas.microsoft.com/office/drawing/2010/main" w="9525">
-                <a:solidFill>
-                  <a:schemeClr val="tx1"/>
-                </a:solidFill>
-                <a:miter lim="800000"/>
-                <a:headEnd/>
-                <a:tailEnd/>
-              </a14:hiddenLine>
-            </a:ext>
-            <a:ext uri="{AF507438-7753-43E0-B8FC-AC1667EBCBE1}">
-              <a14:hiddenEffects xmlns:a14="http://schemas.microsoft.com/office/drawing/2010/main">
-                <a:effectLst>
-                  <a:outerShdw dist="35921" dir="2700000" algn="ctr" rotWithShape="0">
-                    <a:schemeClr val="bg2"/>
-                  </a:outerShdw>
-                </a:effectLst>
-              </a14:hiddenEffects>
-            </a:ext>
-          </a:extLst>
-        </p:spPr>
-        <p:txBody>
-          <a:bodyPr vert="horz" wrap="square" lIns="91440" tIns="45720" rIns="91440" bIns="45720" numCol="1" anchor="ctr" anchorCtr="0" compatLnSpc="1">
-            <a:prstTxWarp prst="textNoShape">
-              <a:avLst/>
-            </a:prstTxWarp>
-            <a:spAutoFit/>
-          </a:bodyPr>
-          <a:lstStyle/>
-          <a:p>
-            <a:pPr marL="0" marR="0" lvl="0" indent="0" algn="l" defTabSz="914400" rtl="0" eaLnBrk="0" fontAlgn="base" latinLnBrk="0" hangingPunct="0">
-              <a:lnSpc>
-                <a:spcPct val="100000"/>
-              </a:lnSpc>
-              <a:spcBef>
-                <a:spcPct val="0"/>
-              </a:spcBef>
-              <a:spcAft>
-                <a:spcPct val="0"/>
-              </a:spcAft>
-              <a:buClrTx/>
-              <a:buSzTx/>
-              <a:buFontTx/>
-              <a:buNone/>
-              <a:tabLst/>
-            </a:pPr>
-            <a:r>
-              <a:rPr kumimoji="0" lang="de-DE" altLang="de-DE" sz="2400" b="0" i="1" u="none" strike="noStrike" cap="none" normalizeH="0" baseline="0" dirty="0" err="1" smtClean="0">
-                <a:ln>
-                  <a:noFill/>
-                </a:ln>
-                <a:solidFill>
-                  <a:srgbClr val="D55FDE"/>
-                </a:solidFill>
-                <a:effectLst/>
-                <a:latin typeface="JetBrains Mono"/>
-              </a:rPr>
-              <a:t>resource</a:t>
-            </a:r>
-            <a:r>
-              <a:rPr kumimoji="0" lang="de-DE" altLang="de-DE" sz="2400" b="0" i="1" u="none" strike="noStrike" cap="none" normalizeH="0" baseline="0" dirty="0" smtClean="0">
-                <a:ln>
-                  <a:noFill/>
-                </a:ln>
-                <a:solidFill>
-                  <a:srgbClr val="D55FDE"/>
-                </a:solidFill>
-                <a:effectLst/>
-                <a:latin typeface="JetBrains Mono"/>
-              </a:rPr>
-              <a:t> </a:t>
-            </a:r>
-            <a:r>
-              <a:rPr kumimoji="0" lang="de-DE" altLang="de-DE" sz="2400" b="0" i="0" u="none" strike="noStrike" cap="none" normalizeH="0" baseline="0" dirty="0" smtClean="0">
-                <a:ln>
-                  <a:noFill/>
-                </a:ln>
-                <a:solidFill>
-                  <a:srgbClr val="E5C07B"/>
-                </a:solidFill>
-                <a:effectLst/>
-                <a:latin typeface="JetBrains Mono"/>
-              </a:rPr>
-              <a:t>"aws_s3_bucket" "</a:t>
-            </a:r>
-            <a:r>
-              <a:rPr kumimoji="0" lang="de-DE" altLang="de-DE" sz="2400" b="0" i="0" u="none" strike="noStrike" cap="none" normalizeH="0" baseline="0" dirty="0" err="1" smtClean="0">
-                <a:ln>
-                  <a:noFill/>
-                </a:ln>
-                <a:solidFill>
-                  <a:srgbClr val="E5C07B"/>
-                </a:solidFill>
-                <a:effectLst/>
-                <a:latin typeface="JetBrains Mono"/>
-              </a:rPr>
-              <a:t>important</a:t>
-            </a:r>
-            <a:r>
-              <a:rPr kumimoji="0" lang="de-DE" altLang="de-DE" sz="2400" b="0" i="0" u="none" strike="noStrike" cap="none" normalizeH="0" baseline="0" dirty="0" smtClean="0">
-                <a:ln>
-                  <a:noFill/>
-                </a:ln>
-                <a:solidFill>
-                  <a:srgbClr val="E5C07B"/>
-                </a:solidFill>
-                <a:effectLst/>
-                <a:latin typeface="JetBrains Mono"/>
-              </a:rPr>
-              <a:t>" </a:t>
-            </a:r>
-            <a:r>
-              <a:rPr kumimoji="0" lang="de-DE" altLang="de-DE" sz="2400" b="0" i="0" u="none" strike="noStrike" cap="none" normalizeH="0" baseline="0" dirty="0" smtClean="0">
-                <a:ln>
-                  <a:noFill/>
-                </a:ln>
-                <a:solidFill>
-                  <a:srgbClr val="BBBBBB"/>
-                </a:solidFill>
-                <a:effectLst/>
-                <a:latin typeface="JetBrains Mono"/>
-              </a:rPr>
-              <a:t>{</a:t>
-            </a:r>
-            <a:br>
-              <a:rPr kumimoji="0" lang="de-DE" altLang="de-DE" sz="2400" b="0" i="0" u="none" strike="noStrike" cap="none" normalizeH="0" baseline="0" dirty="0" smtClean="0">
-                <a:ln>
-                  <a:noFill/>
-                </a:ln>
-                <a:solidFill>
-                  <a:srgbClr val="BBBBBB"/>
-                </a:solidFill>
-                <a:effectLst/>
-                <a:latin typeface="JetBrains Mono"/>
-              </a:rPr>
-            </a:br>
-            <a:r>
-              <a:rPr kumimoji="0" lang="de-DE" altLang="de-DE" sz="2400" b="0" i="0" u="none" strike="noStrike" cap="none" normalizeH="0" baseline="0" dirty="0" smtClean="0">
-                <a:ln>
-                  <a:noFill/>
-                </a:ln>
-                <a:solidFill>
-                  <a:srgbClr val="BBBBBB"/>
-                </a:solidFill>
-                <a:effectLst/>
-                <a:latin typeface="JetBrains Mono"/>
-              </a:rPr>
-              <a:t>  </a:t>
-            </a:r>
-            <a:r>
-              <a:rPr kumimoji="0" lang="de-DE" altLang="de-DE" sz="2400" b="0" i="0" u="none" strike="noStrike" cap="none" normalizeH="0" baseline="0" dirty="0" err="1" smtClean="0">
-                <a:ln>
-                  <a:noFill/>
-                </a:ln>
-                <a:solidFill>
-                  <a:srgbClr val="EF596F"/>
-                </a:solidFill>
-                <a:effectLst/>
-                <a:latin typeface="JetBrains Mono"/>
-              </a:rPr>
-              <a:t>bucket</a:t>
-            </a:r>
-            <a:r>
-              <a:rPr kumimoji="0" lang="de-DE" altLang="de-DE" sz="2400" b="0" i="0" u="none" strike="noStrike" cap="none" normalizeH="0" baseline="0" dirty="0" smtClean="0">
-                <a:ln>
-                  <a:noFill/>
-                </a:ln>
-                <a:solidFill>
-                  <a:srgbClr val="EF596F"/>
-                </a:solidFill>
-                <a:effectLst/>
-                <a:latin typeface="JetBrains Mono"/>
-              </a:rPr>
-              <a:t> </a:t>
-            </a:r>
-            <a:r>
-              <a:rPr kumimoji="0" lang="de-DE" altLang="de-DE" sz="2400" b="0" i="0" u="none" strike="noStrike" cap="none" normalizeH="0" baseline="0" dirty="0" smtClean="0">
-                <a:ln>
-                  <a:noFill/>
-                </a:ln>
-                <a:solidFill>
-                  <a:srgbClr val="BBBBBB"/>
-                </a:solidFill>
-                <a:effectLst/>
-                <a:latin typeface="JetBrains Mono"/>
-              </a:rPr>
-              <a:t>= </a:t>
-            </a:r>
-            <a:r>
-              <a:rPr kumimoji="0" lang="de-DE" altLang="de-DE" sz="2400" b="0" i="0" u="none" strike="noStrike" cap="none" normalizeH="0" baseline="0" dirty="0" smtClean="0">
-                <a:ln>
-                  <a:noFill/>
-                </a:ln>
-                <a:solidFill>
-                  <a:srgbClr val="89CA78"/>
-                </a:solidFill>
-                <a:effectLst/>
-                <a:latin typeface="JetBrains Mono"/>
-              </a:rPr>
-              <a:t>"</a:t>
-            </a:r>
-            <a:r>
-              <a:rPr kumimoji="0" lang="de-DE" altLang="de-DE" sz="2400" b="0" i="0" u="none" strike="noStrike" cap="none" normalizeH="0" baseline="0" dirty="0" err="1" smtClean="0">
-                <a:ln>
-                  <a:noFill/>
-                </a:ln>
-                <a:solidFill>
-                  <a:srgbClr val="89CA78"/>
-                </a:solidFill>
-                <a:effectLst/>
-                <a:latin typeface="JetBrains Mono"/>
-              </a:rPr>
-              <a:t>important</a:t>
-            </a:r>
-            <a:r>
-              <a:rPr kumimoji="0" lang="de-DE" altLang="de-DE" sz="2400" b="0" i="0" u="none" strike="noStrike" cap="none" normalizeH="0" baseline="0" dirty="0" smtClean="0">
-                <a:ln>
-                  <a:noFill/>
-                </a:ln>
-                <a:solidFill>
-                  <a:srgbClr val="89CA78"/>
-                </a:solidFill>
-                <a:effectLst/>
-                <a:latin typeface="JetBrains Mono"/>
-              </a:rPr>
-              <a:t>"</a:t>
-            </a:r>
-            <a:br>
-              <a:rPr kumimoji="0" lang="de-DE" altLang="de-DE" sz="2400" b="0" i="0" u="none" strike="noStrike" cap="none" normalizeH="0" baseline="0" dirty="0" smtClean="0">
-                <a:ln>
-                  <a:noFill/>
-                </a:ln>
-                <a:solidFill>
-                  <a:srgbClr val="89CA78"/>
-                </a:solidFill>
-                <a:effectLst/>
-                <a:latin typeface="JetBrains Mono"/>
-              </a:rPr>
-            </a:br>
-            <a:r>
-              <a:rPr kumimoji="0" lang="de-DE" altLang="de-DE" sz="2400" b="0" i="0" u="none" strike="noStrike" cap="none" normalizeH="0" baseline="0" dirty="0" smtClean="0">
-                <a:ln>
-                  <a:noFill/>
-                </a:ln>
-                <a:solidFill>
-                  <a:srgbClr val="89CA78"/>
-                </a:solidFill>
-                <a:effectLst/>
-                <a:latin typeface="JetBrains Mono"/>
-              </a:rPr>
-              <a:t>  </a:t>
-            </a:r>
-            <a:r>
-              <a:rPr kumimoji="0" lang="de-DE" altLang="de-DE" sz="2400" b="0" i="1" u="none" strike="noStrike" cap="none" normalizeH="0" baseline="0" dirty="0" err="1" smtClean="0">
-                <a:ln>
-                  <a:noFill/>
-                </a:ln>
-                <a:solidFill>
-                  <a:srgbClr val="D55FDE"/>
-                </a:solidFill>
-                <a:effectLst/>
-                <a:latin typeface="JetBrains Mono"/>
-              </a:rPr>
-              <a:t>lifecycle</a:t>
-            </a:r>
-            <a:r>
-              <a:rPr kumimoji="0" lang="de-DE" altLang="de-DE" sz="2400" b="0" i="1" u="none" strike="noStrike" cap="none" normalizeH="0" baseline="0" dirty="0" smtClean="0">
-                <a:ln>
-                  <a:noFill/>
-                </a:ln>
-                <a:solidFill>
-                  <a:srgbClr val="D55FDE"/>
-                </a:solidFill>
-                <a:effectLst/>
-                <a:latin typeface="JetBrains Mono"/>
-              </a:rPr>
-              <a:t> </a:t>
-            </a:r>
-            <a:r>
-              <a:rPr kumimoji="0" lang="de-DE" altLang="de-DE" sz="2400" b="0" i="0" u="none" strike="noStrike" cap="none" normalizeH="0" baseline="0" dirty="0" smtClean="0">
-                <a:ln>
-                  <a:noFill/>
-                </a:ln>
-                <a:solidFill>
-                  <a:srgbClr val="BBBBBB"/>
-                </a:solidFill>
-                <a:effectLst/>
-                <a:latin typeface="JetBrains Mono"/>
-              </a:rPr>
-              <a:t>{</a:t>
-            </a:r>
-            <a:br>
-              <a:rPr kumimoji="0" lang="de-DE" altLang="de-DE" sz="2400" b="0" i="0" u="none" strike="noStrike" cap="none" normalizeH="0" baseline="0" dirty="0" smtClean="0">
-                <a:ln>
-                  <a:noFill/>
-                </a:ln>
-                <a:solidFill>
-                  <a:srgbClr val="BBBBBB"/>
-                </a:solidFill>
-                <a:effectLst/>
-                <a:latin typeface="JetBrains Mono"/>
-              </a:rPr>
-            </a:br>
-            <a:r>
-              <a:rPr kumimoji="0" lang="de-DE" altLang="de-DE" sz="2400" b="0" i="0" u="none" strike="noStrike" cap="none" normalizeH="0" baseline="0" dirty="0" smtClean="0">
-                <a:ln>
-                  <a:noFill/>
-                </a:ln>
-                <a:solidFill>
-                  <a:srgbClr val="BBBBBB"/>
-                </a:solidFill>
-                <a:effectLst/>
-                <a:latin typeface="JetBrains Mono"/>
-              </a:rPr>
-              <a:t>    </a:t>
-            </a:r>
-            <a:r>
-              <a:rPr kumimoji="0" lang="de-DE" altLang="de-DE" sz="2400" b="0" i="0" u="none" strike="noStrike" cap="none" normalizeH="0" baseline="0" dirty="0" err="1" smtClean="0">
-                <a:ln>
-                  <a:noFill/>
-                </a:ln>
-                <a:solidFill>
-                  <a:srgbClr val="EF596F"/>
-                </a:solidFill>
-                <a:effectLst/>
-                <a:latin typeface="JetBrains Mono"/>
-              </a:rPr>
-              <a:t>prevent_destroy</a:t>
-            </a:r>
-            <a:r>
-              <a:rPr kumimoji="0" lang="de-DE" altLang="de-DE" sz="2400" b="0" i="0" u="none" strike="noStrike" cap="none" normalizeH="0" baseline="0" dirty="0" smtClean="0">
-                <a:ln>
-                  <a:noFill/>
-                </a:ln>
-                <a:solidFill>
-                  <a:srgbClr val="EF596F"/>
-                </a:solidFill>
-                <a:effectLst/>
-                <a:latin typeface="JetBrains Mono"/>
-              </a:rPr>
-              <a:t> </a:t>
-            </a:r>
-            <a:r>
-              <a:rPr kumimoji="0" lang="de-DE" altLang="de-DE" sz="2400" b="0" i="0" u="none" strike="noStrike" cap="none" normalizeH="0" baseline="0" dirty="0" smtClean="0">
-                <a:ln>
-                  <a:noFill/>
-                </a:ln>
-                <a:solidFill>
-                  <a:srgbClr val="BBBBBB"/>
-                </a:solidFill>
-                <a:effectLst/>
-                <a:latin typeface="JetBrains Mono"/>
-              </a:rPr>
-              <a:t>= </a:t>
-            </a:r>
-            <a:r>
-              <a:rPr kumimoji="0" lang="de-DE" altLang="de-DE" sz="2400" b="0" i="1" u="none" strike="noStrike" cap="none" normalizeH="0" baseline="0" dirty="0" err="1" smtClean="0">
-                <a:ln>
-                  <a:noFill/>
-                </a:ln>
-                <a:solidFill>
-                  <a:srgbClr val="D55FDE"/>
-                </a:solidFill>
-                <a:effectLst/>
-                <a:latin typeface="JetBrains Mono"/>
-              </a:rPr>
-              <a:t>true</a:t>
-            </a:r>
-            <a:r>
-              <a:rPr kumimoji="0" lang="de-DE" altLang="de-DE" sz="2400" b="0" i="1" u="none" strike="noStrike" cap="none" normalizeH="0" baseline="0" dirty="0" smtClean="0">
-                <a:ln>
-                  <a:noFill/>
-                </a:ln>
-                <a:solidFill>
-                  <a:srgbClr val="D55FDE"/>
-                </a:solidFill>
-                <a:effectLst/>
-                <a:latin typeface="JetBrains Mono"/>
-              </a:rPr>
-              <a:t/>
-            </a:r>
-            <a:br>
-              <a:rPr kumimoji="0" lang="de-DE" altLang="de-DE" sz="2400" b="0" i="1" u="none" strike="noStrike" cap="none" normalizeH="0" baseline="0" dirty="0" smtClean="0">
-                <a:ln>
-                  <a:noFill/>
-                </a:ln>
-                <a:solidFill>
-                  <a:srgbClr val="D55FDE"/>
-                </a:solidFill>
-                <a:effectLst/>
-                <a:latin typeface="JetBrains Mono"/>
-              </a:rPr>
-            </a:br>
-            <a:r>
-              <a:rPr kumimoji="0" lang="de-DE" altLang="de-DE" sz="2400" b="0" i="1" u="none" strike="noStrike" cap="none" normalizeH="0" baseline="0" dirty="0" smtClean="0">
-                <a:ln>
-                  <a:noFill/>
-                </a:ln>
-                <a:solidFill>
-                  <a:srgbClr val="D55FDE"/>
-                </a:solidFill>
-                <a:effectLst/>
-                <a:latin typeface="JetBrains Mono"/>
-              </a:rPr>
-              <a:t>  </a:t>
-            </a:r>
-            <a:r>
-              <a:rPr kumimoji="0" lang="de-DE" altLang="de-DE" sz="2400" b="0" i="0" u="none" strike="noStrike" cap="none" normalizeH="0" baseline="0" dirty="0" smtClean="0">
-                <a:ln>
-                  <a:noFill/>
-                </a:ln>
-                <a:solidFill>
-                  <a:srgbClr val="BBBBBB"/>
-                </a:solidFill>
-                <a:effectLst/>
-                <a:latin typeface="JetBrains Mono"/>
-              </a:rPr>
-              <a:t>}</a:t>
-            </a:r>
-            <a:br>
-              <a:rPr kumimoji="0" lang="de-DE" altLang="de-DE" sz="2400" b="0" i="0" u="none" strike="noStrike" cap="none" normalizeH="0" baseline="0" dirty="0" smtClean="0">
-                <a:ln>
-                  <a:noFill/>
-                </a:ln>
-                <a:solidFill>
-                  <a:srgbClr val="BBBBBB"/>
-                </a:solidFill>
-                <a:effectLst/>
-                <a:latin typeface="JetBrains Mono"/>
-              </a:rPr>
-            </a:br>
-            <a:r>
-              <a:rPr kumimoji="0" lang="de-DE" altLang="de-DE" sz="2400" b="0" i="0" u="none" strike="noStrike" cap="none" normalizeH="0" baseline="0" dirty="0" smtClean="0">
-                <a:ln>
-                  <a:noFill/>
-                </a:ln>
-                <a:solidFill>
-                  <a:srgbClr val="BBBBBB"/>
-                </a:solidFill>
-                <a:effectLst/>
-                <a:latin typeface="JetBrains Mono"/>
-              </a:rPr>
-              <a:t>}</a:t>
-            </a:r>
-            <a:endParaRPr kumimoji="0" lang="de-DE" altLang="de-DE" sz="4800" b="0" i="0" u="none" strike="noStrike" cap="none" normalizeH="0" baseline="0" dirty="0" smtClean="0">
-              <a:ln>
-                <a:noFill/>
-              </a:ln>
-              <a:solidFill>
-                <a:schemeClr val="tx1"/>
-              </a:solidFill>
-              <a:effectLst/>
-              <a:latin typeface="Arial" panose="020B0604020202020204" pitchFamily="34" charset="0"/>
-            </a:endParaRPr>
-          </a:p>
-        </p:txBody>
-      </p:sp>
-    </p:spTree>
-    <p:extLst>
-      <p:ext uri="{BB962C8B-B14F-4D97-AF65-F5344CB8AC3E}">
-        <p14:creationId xmlns:p14="http://schemas.microsoft.com/office/powerpoint/2010/main" val="2839185652"/>
-      </p:ext>
-    </p:extLst>
-  </p:cSld>
-  <p:clrMapOvr>
-    <a:masterClrMapping/>
-  </p:clrMapOvr>
-  <p:timing>
-    <p:tnLst>
-      <p:par>
-        <p:cTn id="1" dur="indefinite" restart="never" nodeType="tmRoot"/>
-      </p:par>
-    </p:tnLst>
-  </p:timing>
-</p:sld>
-</file>
-
 <file path=ppt/slides/slide18.xml><?xml version="1.0" encoding="utf-8"?>
 <p:sld xmlns:a="http://schemas.openxmlformats.org/drawingml/2006/main" xmlns:r="http://schemas.openxmlformats.org/officeDocument/2006/relationships" xmlns:p="http://schemas.openxmlformats.org/presentationml/2006/main">
   <p:cSld>
@@ -11335,16 +11308,20 @@
           <a:lstStyle/>
           <a:p>
             <a:r>
+              <a:rPr lang="de-DE" dirty="0" err="1"/>
+              <a:t>Lifecycle</a:t>
+            </a:r>
+            <a:r>
+              <a:rPr lang="de-DE" dirty="0"/>
+              <a:t> </a:t>
+            </a:r>
+            <a:r>
+              <a:rPr lang="de-DE" dirty="0" smtClean="0"/>
+              <a:t>- </a:t>
+            </a:r>
+            <a:r>
               <a:rPr lang="de-DE" dirty="0" err="1" smtClean="0"/>
-              <a:t>Lifecycle</a:t>
-            </a:r>
-            <a:r>
-              <a:rPr lang="de-DE" dirty="0" smtClean="0"/>
-              <a:t> – </a:t>
-            </a:r>
-            <a:r>
-              <a:rPr lang="de-DE" dirty="0" err="1" smtClean="0"/>
-              <a:t>ignore_changes</a:t>
+              <a:t>prevent_destroy</a:t>
             </a:r>
             <a:endParaRPr lang="de-DE" dirty="0"/>
           </a:p>
@@ -11371,30 +11348,24 @@
             </a:pPr>
             <a:r>
               <a:rPr lang="de-DE" dirty="0" smtClean="0"/>
-              <a:t>Änderungen an den angegebenen Argumenten der Ressource führen nicht zu einem Update / </a:t>
-            </a:r>
-            <a:r>
-              <a:rPr lang="de-DE" dirty="0" err="1" smtClean="0"/>
-              <a:t>Destroy</a:t>
-            </a:r>
+              <a:t>Dient dazu zu verhindern, dass kritische Infrastrukturobjekte versehentlich zerstört werden</a:t>
+            </a:r>
+          </a:p>
+          <a:p>
+            <a:pPr>
+              <a:buFontTx/>
+              <a:buChar char="-"/>
+            </a:pPr>
             <a:r>
               <a:rPr lang="de-DE" dirty="0" smtClean="0"/>
-              <a:t> </a:t>
-            </a:r>
-            <a:r>
-              <a:rPr lang="de-DE" dirty="0" err="1" smtClean="0"/>
-              <a:t>and</a:t>
-            </a:r>
-            <a:r>
-              <a:rPr lang="de-DE" dirty="0" smtClean="0"/>
-              <a:t> Create</a:t>
+              <a:t>Soll das Infrastrukturobjekt tatsächlich zerstört werden, muss das Meta-Argument erst aus der Konfiguration entfernt werden</a:t>
             </a:r>
           </a:p>
         </p:txBody>
       </p:sp>
       <p:sp>
         <p:nvSpPr>
-          <p:cNvPr id="5" name="Rectangle 2"/>
+          <p:cNvPr id="4" name="Rectangle 1"/>
           <p:cNvSpPr>
             <a:spLocks noChangeArrowheads="1"/>
           </p:cNvSpPr>
@@ -11402,8 +11373,8 @@
         </p:nvSpPr>
         <p:spPr bwMode="auto">
           <a:xfrm>
-            <a:off x="1907822" y="3264912"/>
-            <a:ext cx="8376356" cy="3046988"/>
+            <a:off x="2432756" y="4001294"/>
+            <a:ext cx="7326488" cy="2308324"/>
           </a:xfrm>
           <a:prstGeom prst="rect">
             <a:avLst/>
@@ -11499,6 +11470,122 @@
                 <a:effectLst/>
                 <a:latin typeface="JetBrains Mono"/>
               </a:rPr>
+              <a:t>"aws_s3_bucket" "</a:t>
+            </a:r>
+            <a:r>
+              <a:rPr kumimoji="0" lang="de-DE" altLang="de-DE" sz="2400" b="0" i="0" u="none" strike="noStrike" cap="none" normalizeH="0" baseline="0" dirty="0" err="1" smtClean="0">
+                <a:ln>
+                  <a:noFill/>
+                </a:ln>
+                <a:solidFill>
+                  <a:srgbClr val="E5C07B"/>
+                </a:solidFill>
+                <a:effectLst/>
+                <a:latin typeface="JetBrains Mono"/>
+              </a:rPr>
+              <a:t>important</a:t>
+            </a:r>
+            <a:r>
+              <a:rPr kumimoji="0" lang="de-DE" altLang="de-DE" sz="2400" b="0" i="0" u="none" strike="noStrike" cap="none" normalizeH="0" baseline="0" dirty="0" smtClean="0">
+                <a:ln>
+                  <a:noFill/>
+                </a:ln>
+                <a:solidFill>
+                  <a:srgbClr val="E5C07B"/>
+                </a:solidFill>
+                <a:effectLst/>
+                <a:latin typeface="JetBrains Mono"/>
+              </a:rPr>
+              <a:t>" </a:t>
+            </a:r>
+            <a:r>
+              <a:rPr kumimoji="0" lang="de-DE" altLang="de-DE" sz="2400" b="0" i="0" u="none" strike="noStrike" cap="none" normalizeH="0" baseline="0" dirty="0" smtClean="0">
+                <a:ln>
+                  <a:noFill/>
+                </a:ln>
+                <a:solidFill>
+                  <a:srgbClr val="BBBBBB"/>
+                </a:solidFill>
+                <a:effectLst/>
+                <a:latin typeface="JetBrains Mono"/>
+              </a:rPr>
+              <a:t>{</a:t>
+            </a:r>
+            <a:br>
+              <a:rPr kumimoji="0" lang="de-DE" altLang="de-DE" sz="2400" b="0" i="0" u="none" strike="noStrike" cap="none" normalizeH="0" baseline="0" dirty="0" smtClean="0">
+                <a:ln>
+                  <a:noFill/>
+                </a:ln>
+                <a:solidFill>
+                  <a:srgbClr val="BBBBBB"/>
+                </a:solidFill>
+                <a:effectLst/>
+                <a:latin typeface="JetBrains Mono"/>
+              </a:rPr>
+            </a:br>
+            <a:r>
+              <a:rPr kumimoji="0" lang="de-DE" altLang="de-DE" sz="2400" b="0" i="0" u="none" strike="noStrike" cap="none" normalizeH="0" baseline="0" dirty="0" smtClean="0">
+                <a:ln>
+                  <a:noFill/>
+                </a:ln>
+                <a:solidFill>
+                  <a:srgbClr val="BBBBBB"/>
+                </a:solidFill>
+                <a:effectLst/>
+                <a:latin typeface="JetBrains Mono"/>
+              </a:rPr>
+              <a:t>  </a:t>
+            </a:r>
+            <a:r>
+              <a:rPr kumimoji="0" lang="de-DE" altLang="de-DE" sz="2400" b="0" i="0" u="none" strike="noStrike" cap="none" normalizeH="0" baseline="0" dirty="0" err="1" smtClean="0">
+                <a:ln>
+                  <a:noFill/>
+                </a:ln>
+                <a:solidFill>
+                  <a:srgbClr val="EF596F"/>
+                </a:solidFill>
+                <a:effectLst/>
+                <a:latin typeface="JetBrains Mono"/>
+              </a:rPr>
+              <a:t>bucket</a:t>
+            </a:r>
+            <a:r>
+              <a:rPr kumimoji="0" lang="de-DE" altLang="de-DE" sz="2400" b="0" i="0" u="none" strike="noStrike" cap="none" normalizeH="0" baseline="0" dirty="0" smtClean="0">
+                <a:ln>
+                  <a:noFill/>
+                </a:ln>
+                <a:solidFill>
+                  <a:srgbClr val="EF596F"/>
+                </a:solidFill>
+                <a:effectLst/>
+                <a:latin typeface="JetBrains Mono"/>
+              </a:rPr>
+              <a:t> </a:t>
+            </a:r>
+            <a:r>
+              <a:rPr kumimoji="0" lang="de-DE" altLang="de-DE" sz="2400" b="0" i="0" u="none" strike="noStrike" cap="none" normalizeH="0" baseline="0" dirty="0" smtClean="0">
+                <a:ln>
+                  <a:noFill/>
+                </a:ln>
+                <a:solidFill>
+                  <a:srgbClr val="BBBBBB"/>
+                </a:solidFill>
+                <a:effectLst/>
+                <a:latin typeface="JetBrains Mono"/>
+              </a:rPr>
+              <a:t>= </a:t>
+            </a:r>
+            <a:r>
+              <a:rPr kumimoji="0" lang="de-DE" altLang="de-DE" sz="2400" b="0" i="0" u="none" strike="noStrike" cap="none" normalizeH="0" baseline="0" dirty="0" smtClean="0">
+                <a:ln>
+                  <a:noFill/>
+                </a:ln>
+                <a:solidFill>
+                  <a:srgbClr val="89CA78"/>
+                </a:solidFill>
+                <a:effectLst/>
+                <a:latin typeface="JetBrains Mono"/>
+              </a:rPr>
               <a:t>"</a:t>
             </a:r>
             <a:r>
@@ -11507,25 +11594,114 @@
                   <a:noFill/>
                 </a:ln>
                 <a:solidFill>
-                  <a:srgbClr val="E5C07B"/>
-                </a:solidFill>
-                <a:effectLst/>
-                <a:latin typeface="JetBrains Mono"/>
-              </a:rPr>
-              <a:t>aws_instance</a:t>
-            </a:r>
-            <a:r>
-              <a:rPr kumimoji="0" lang="de-DE" altLang="de-DE" sz="2400" b="0" i="0" u="none" strike="noStrike" cap="none" normalizeH="0" baseline="0" dirty="0" smtClean="0">
-                <a:ln>
-                  <a:noFill/>
-                </a:ln>
-                <a:solidFill>
-                  <a:srgbClr val="E5C07B"/>
-                </a:solidFill>
-                <a:effectLst/>
-                <a:latin typeface="JetBrains Mono"/>
-              </a:rPr>
-              <a:t>" "</a:t>
+                  <a:srgbClr val="89CA78"/>
+                </a:solidFill>
+                <a:effectLst/>
+                <a:latin typeface="JetBrains Mono"/>
+              </a:rPr>
+              <a:t>important</a:t>
+            </a:r>
+            <a:r>
+              <a:rPr kumimoji="0" lang="de-DE" altLang="de-DE" sz="2400" b="0" i="0" u="none" strike="noStrike" cap="none" normalizeH="0" baseline="0" dirty="0" smtClean="0">
+                <a:ln>
+                  <a:noFill/>
+                </a:ln>
+                <a:solidFill>
+                  <a:srgbClr val="89CA78"/>
+                </a:solidFill>
+                <a:effectLst/>
+                <a:latin typeface="JetBrains Mono"/>
+              </a:rPr>
+              <a:t>"</a:t>
+            </a:r>
+            <a:br>
+              <a:rPr kumimoji="0" lang="de-DE" altLang="de-DE" sz="2400" b="0" i="0" u="none" strike="noStrike" cap="none" normalizeH="0" baseline="0" dirty="0" smtClean="0">
+                <a:ln>
+                  <a:noFill/>
+                </a:ln>
+                <a:solidFill>
+                  <a:srgbClr val="89CA78"/>
+                </a:solidFill>
+                <a:effectLst/>
+                <a:latin typeface="JetBrains Mono"/>
+              </a:rPr>
+            </a:br>
+            <a:r>
+              <a:rPr kumimoji="0" lang="de-DE" altLang="de-DE" sz="2400" b="0" i="0" u="none" strike="noStrike" cap="none" normalizeH="0" baseline="0" dirty="0" smtClean="0">
+                <a:ln>
+                  <a:noFill/>
+                </a:ln>
+                <a:solidFill>
+                  <a:srgbClr val="89CA78"/>
+                </a:solidFill>
+                <a:effectLst/>
+                <a:latin typeface="JetBrains Mono"/>
+              </a:rPr>
+              <a:t>  </a:t>
+            </a:r>
+            <a:r>
+              <a:rPr kumimoji="0" lang="de-DE" altLang="de-DE" sz="2400" b="0" i="1" u="none" strike="noStrike" cap="none" normalizeH="0" baseline="0" dirty="0" err="1" smtClean="0">
+                <a:ln>
+                  <a:noFill/>
+                </a:ln>
+                <a:solidFill>
+                  <a:srgbClr val="D55FDE"/>
+                </a:solidFill>
+                <a:effectLst/>
+                <a:latin typeface="JetBrains Mono"/>
+              </a:rPr>
+              <a:t>lifecycle</a:t>
+            </a:r>
+            <a:r>
+              <a:rPr kumimoji="0" lang="de-DE" altLang="de-DE" sz="2400" b="0" i="1" u="none" strike="noStrike" cap="none" normalizeH="0" baseline="0" dirty="0" smtClean="0">
+                <a:ln>
+                  <a:noFill/>
+                </a:ln>
+                <a:solidFill>
+                  <a:srgbClr val="D55FDE"/>
+                </a:solidFill>
+                <a:effectLst/>
+                <a:latin typeface="JetBrains Mono"/>
+              </a:rPr>
+              <a:t> </a:t>
+            </a:r>
+            <a:r>
+              <a:rPr kumimoji="0" lang="de-DE" altLang="de-DE" sz="2400" b="0" i="0" u="none" strike="noStrike" cap="none" normalizeH="0" baseline="0" dirty="0" smtClean="0">
+                <a:ln>
+                  <a:noFill/>
+                </a:ln>
+                <a:solidFill>
+                  <a:srgbClr val="BBBBBB"/>
+                </a:solidFill>
+                <a:effectLst/>
+                <a:latin typeface="JetBrains Mono"/>
+              </a:rPr>
+              <a:t>{</a:t>
+            </a:r>
+            <a:br>
+              <a:rPr kumimoji="0" lang="de-DE" altLang="de-DE" sz="2400" b="0" i="0" u="none" strike="noStrike" cap="none" normalizeH="0" baseline="0" dirty="0" smtClean="0">
+                <a:ln>
+                  <a:noFill/>
+                </a:ln>
+                <a:solidFill>
+                  <a:srgbClr val="BBBBBB"/>
+                </a:solidFill>
+                <a:effectLst/>
+                <a:latin typeface="JetBrains Mono"/>
+              </a:rPr>
+            </a:br>
+            <a:r>
+              <a:rPr kumimoji="0" lang="de-DE" altLang="de-DE" sz="2400" b="0" i="0" u="none" strike="noStrike" cap="none" normalizeH="0" baseline="0" dirty="0" smtClean="0">
+                <a:ln>
+                  <a:noFill/>
+                </a:ln>
+                <a:solidFill>
+                  <a:srgbClr val="BBBBBB"/>
+                </a:solidFill>
+                <a:effectLst/>
+                <a:latin typeface="JetBrains Mono"/>
+              </a:rPr>
+              <a:t>    </a:t>
             </a:r>
             <a:r>
               <a:rPr kumimoji="0" lang="de-DE" altLang="de-DE" sz="2400" b="0" i="0" u="none" strike="noStrike" cap="none" normalizeH="0" baseline="0" dirty="0" err="1" smtClean="0">
@@ -11533,58 +11709,84 @@
                   <a:noFill/>
                 </a:ln>
                 <a:solidFill>
-                  <a:srgbClr val="E5C07B"/>
-                </a:solidFill>
-                <a:effectLst/>
-                <a:latin typeface="JetBrains Mono"/>
-              </a:rPr>
-              <a:t>demo</a:t>
-            </a:r>
-            <a:r>
-              <a:rPr kumimoji="0" lang="de-DE" altLang="de-DE" sz="2400" b="0" i="0" u="none" strike="noStrike" cap="none" normalizeH="0" baseline="0" dirty="0" smtClean="0">
-                <a:ln>
-                  <a:noFill/>
-                </a:ln>
-                <a:solidFill>
-                  <a:srgbClr val="E5C07B"/>
-                </a:solidFill>
-                <a:effectLst/>
-                <a:latin typeface="JetBrains Mono"/>
-              </a:rPr>
-              <a:t>"</a:t>
-            </a:r>
-            <a:r>
-              <a:rPr kumimoji="0" lang="de-DE" altLang="de-DE" sz="2400" b="0" i="0" u="none" strike="noStrike" cap="none" normalizeH="0" baseline="0" dirty="0" smtClean="0">
-                <a:ln>
-                  <a:noFill/>
-                </a:ln>
-                <a:solidFill>
-                  <a:srgbClr val="BBBBBB"/>
-                </a:solidFill>
-                <a:effectLst/>
-                <a:latin typeface="JetBrains Mono"/>
-              </a:rPr>
-              <a:t>{</a:t>
+                  <a:srgbClr val="EF596F"/>
+                </a:solidFill>
+                <a:effectLst/>
+                <a:latin typeface="JetBrains Mono"/>
+              </a:rPr>
+              <a:t>prevent_destroy</a:t>
+            </a:r>
+            <a:r>
+              <a:rPr kumimoji="0" lang="de-DE" altLang="de-DE" sz="2400" b="0" i="0" u="none" strike="noStrike" cap="none" normalizeH="0" baseline="0" dirty="0" smtClean="0">
+                <a:ln>
+                  <a:noFill/>
+                </a:ln>
+                <a:solidFill>
+                  <a:srgbClr val="EF596F"/>
+                </a:solidFill>
+                <a:effectLst/>
+                <a:latin typeface="JetBrains Mono"/>
+              </a:rPr>
+              <a:t> </a:t>
+            </a:r>
+            <a:r>
+              <a:rPr kumimoji="0" lang="de-DE" altLang="de-DE" sz="2400" b="0" i="0" u="none" strike="noStrike" cap="none" normalizeH="0" baseline="0" dirty="0" smtClean="0">
+                <a:ln>
+                  <a:noFill/>
+                </a:ln>
+                <a:solidFill>
+                  <a:srgbClr val="BBBBBB"/>
+                </a:solidFill>
+                <a:effectLst/>
+                <a:latin typeface="JetBrains Mono"/>
+              </a:rPr>
+              <a:t>= </a:t>
+            </a:r>
+            <a:r>
+              <a:rPr kumimoji="0" lang="de-DE" altLang="de-DE" sz="2400" b="0" i="1" u="none" strike="noStrike" cap="none" normalizeH="0" baseline="0" dirty="0" err="1" smtClean="0">
+                <a:ln>
+                  <a:noFill/>
+                </a:ln>
+                <a:solidFill>
+                  <a:srgbClr val="D55FDE"/>
+                </a:solidFill>
+                <a:effectLst/>
+                <a:latin typeface="JetBrains Mono"/>
+              </a:rPr>
+              <a:t>true</a:t>
+            </a:r>
+            <a:r>
+              <a:rPr kumimoji="0" lang="de-DE" altLang="de-DE" sz="2400" b="0" i="1" u="none" strike="noStrike" cap="none" normalizeH="0" baseline="0" dirty="0" smtClean="0">
+                <a:ln>
+                  <a:noFill/>
+                </a:ln>
+                <a:solidFill>
+                  <a:srgbClr val="D55FDE"/>
+                </a:solidFill>
+                <a:effectLst/>
+                <a:latin typeface="JetBrains Mono"/>
+              </a:rPr>
+              <a:t/>
             </a:r>
             <a:br>
-              <a:rPr kumimoji="0" lang="de-DE" altLang="de-DE" sz="2400" b="0" i="0" u="none" strike="noStrike" cap="none" normalizeH="0" baseline="0" dirty="0" smtClean="0">
-                <a:ln>
-                  <a:noFill/>
-                </a:ln>
-                <a:solidFill>
-                  <a:srgbClr val="BBBBBB"/>
+              <a:rPr kumimoji="0" lang="de-DE" altLang="de-DE" sz="2400" b="0" i="1" u="none" strike="noStrike" cap="none" normalizeH="0" baseline="0" dirty="0" smtClean="0">
+                <a:ln>
+                  <a:noFill/>
+                </a:ln>
+                <a:solidFill>
+                  <a:srgbClr val="D55FDE"/>
                 </a:solidFill>
                 <a:effectLst/>
                 <a:latin typeface="JetBrains Mono"/>
               </a:rPr>
             </a:br>
             <a:r>
-              <a:rPr kumimoji="0" lang="de-DE" altLang="de-DE" sz="2400" b="0" i="0" u="none" strike="noStrike" cap="none" normalizeH="0" baseline="0" dirty="0" smtClean="0">
-                <a:ln>
-                  <a:noFill/>
-                </a:ln>
-                <a:solidFill>
-                  <a:srgbClr val="BBBBBB"/>
+              <a:rPr kumimoji="0" lang="de-DE" altLang="de-DE" sz="2400" b="0" i="1" u="none" strike="noStrike" cap="none" normalizeH="0" baseline="0" dirty="0" smtClean="0">
+                <a:ln>
+                  <a:noFill/>
+                </a:ln>
+                <a:solidFill>
+                  <a:srgbClr val="D55FDE"/>
                 </a:solidFill>
                 <a:effectLst/>
                 <a:latin typeface="JetBrains Mono"/>
@@ -11592,389 +11794,17 @@
               <a:t>  </a:t>
             </a:r>
             <a:r>
-              <a:rPr kumimoji="0" lang="de-DE" altLang="de-DE" sz="2400" b="0" i="0" u="none" strike="noStrike" cap="none" normalizeH="0" baseline="0" dirty="0" err="1" smtClean="0">
-                <a:ln>
-                  <a:noFill/>
-                </a:ln>
-                <a:solidFill>
-                  <a:srgbClr val="EF596F"/>
-                </a:solidFill>
-                <a:effectLst/>
-                <a:latin typeface="JetBrains Mono"/>
-              </a:rPr>
-              <a:t>ami</a:t>
-            </a:r>
-            <a:r>
-              <a:rPr kumimoji="0" lang="de-DE" altLang="de-DE" sz="2400" b="0" i="0" u="none" strike="noStrike" cap="none" normalizeH="0" baseline="0" dirty="0" smtClean="0">
-                <a:ln>
-                  <a:noFill/>
-                </a:ln>
-                <a:solidFill>
-                  <a:srgbClr val="EF596F"/>
-                </a:solidFill>
-                <a:effectLst/>
-                <a:latin typeface="JetBrains Mono"/>
-              </a:rPr>
-              <a:t> </a:t>
-            </a:r>
-            <a:r>
-              <a:rPr kumimoji="0" lang="de-DE" altLang="de-DE" sz="2400" b="0" i="0" u="none" strike="noStrike" cap="none" normalizeH="0" baseline="0" dirty="0" smtClean="0">
-                <a:ln>
-                  <a:noFill/>
-                </a:ln>
-                <a:solidFill>
-                  <a:srgbClr val="BBBBBB"/>
-                </a:solidFill>
-                <a:effectLst/>
-                <a:latin typeface="JetBrains Mono"/>
-              </a:rPr>
-              <a:t>= ami-68dae275</a:t>
-            </a:r>
-            <a:br>
-              <a:rPr kumimoji="0" lang="de-DE" altLang="de-DE" sz="2400" b="0" i="0" u="none" strike="noStrike" cap="none" normalizeH="0" baseline="0" dirty="0" smtClean="0">
-                <a:ln>
-                  <a:noFill/>
-                </a:ln>
-                <a:solidFill>
-                  <a:srgbClr val="BBBBBB"/>
-                </a:solidFill>
-                <a:effectLst/>
-                <a:latin typeface="JetBrains Mono"/>
-              </a:rPr>
-            </a:br>
-            <a:r>
-              <a:rPr kumimoji="0" lang="de-DE" altLang="de-DE" sz="2400" b="0" i="0" u="none" strike="noStrike" cap="none" normalizeH="0" baseline="0" dirty="0" smtClean="0">
-                <a:ln>
-                  <a:noFill/>
-                </a:ln>
-                <a:solidFill>
-                  <a:srgbClr val="BBBBBB"/>
-                </a:solidFill>
-                <a:effectLst/>
-                <a:latin typeface="JetBrains Mono"/>
-              </a:rPr>
-              <a:t>  </a:t>
-            </a:r>
-            <a:r>
-              <a:rPr kumimoji="0" lang="de-DE" altLang="de-DE" sz="2400" b="0" i="0" u="none" strike="noStrike" cap="none" normalizeH="0" baseline="0" dirty="0" err="1" smtClean="0">
-                <a:ln>
-                  <a:noFill/>
-                </a:ln>
-                <a:solidFill>
-                  <a:srgbClr val="EF596F"/>
-                </a:solidFill>
-                <a:effectLst/>
-                <a:latin typeface="JetBrains Mono"/>
-              </a:rPr>
-              <a:t>instance_type</a:t>
-            </a:r>
-            <a:r>
-              <a:rPr kumimoji="0" lang="de-DE" altLang="de-DE" sz="2400" b="0" i="0" u="none" strike="noStrike" cap="none" normalizeH="0" baseline="0" dirty="0" smtClean="0">
-                <a:ln>
-                  <a:noFill/>
-                </a:ln>
-                <a:solidFill>
-                  <a:srgbClr val="EF596F"/>
-                </a:solidFill>
-                <a:effectLst/>
-                <a:latin typeface="JetBrains Mono"/>
-              </a:rPr>
-              <a:t> </a:t>
-            </a:r>
-            <a:r>
-              <a:rPr kumimoji="0" lang="de-DE" altLang="de-DE" sz="2400" b="0" i="0" u="none" strike="noStrike" cap="none" normalizeH="0" baseline="0" dirty="0" smtClean="0">
-                <a:ln>
-                  <a:noFill/>
-                </a:ln>
-                <a:solidFill>
-                  <a:srgbClr val="BBBBBB"/>
-                </a:solidFill>
-                <a:effectLst/>
-                <a:latin typeface="JetBrains Mono"/>
-              </a:rPr>
-              <a:t>= </a:t>
-            </a:r>
-            <a:r>
-              <a:rPr kumimoji="0" lang="de-DE" altLang="de-DE" sz="2400" b="0" i="0" u="none" strike="noStrike" cap="none" normalizeH="0" baseline="0" dirty="0" smtClean="0">
-                <a:ln>
-                  <a:noFill/>
-                </a:ln>
-                <a:solidFill>
-                  <a:srgbClr val="89CA78"/>
-                </a:solidFill>
-                <a:effectLst/>
-                <a:latin typeface="JetBrains Mono"/>
-              </a:rPr>
-              <a:t>"t2.micro"</a:t>
-            </a:r>
-            <a:br>
-              <a:rPr kumimoji="0" lang="de-DE" altLang="de-DE" sz="2400" b="0" i="0" u="none" strike="noStrike" cap="none" normalizeH="0" baseline="0" dirty="0" smtClean="0">
-                <a:ln>
-                  <a:noFill/>
-                </a:ln>
-                <a:solidFill>
-                  <a:srgbClr val="89CA78"/>
-                </a:solidFill>
-                <a:effectLst/>
-                <a:latin typeface="JetBrains Mono"/>
-              </a:rPr>
-            </a:br>
-            <a:r>
-              <a:rPr kumimoji="0" lang="de-DE" altLang="de-DE" sz="2400" b="0" i="0" u="none" strike="noStrike" cap="none" normalizeH="0" baseline="0" dirty="0" smtClean="0">
-                <a:ln>
-                  <a:noFill/>
-                </a:ln>
-                <a:solidFill>
-                  <a:srgbClr val="89CA78"/>
-                </a:solidFill>
-                <a:effectLst/>
-                <a:latin typeface="JetBrains Mono"/>
-              </a:rPr>
-              <a:t>  </a:t>
-            </a:r>
-            <a:r>
-              <a:rPr kumimoji="0" lang="de-DE" altLang="de-DE" sz="2400" b="0" i="0" u="none" strike="noStrike" cap="none" normalizeH="0" baseline="0" dirty="0" smtClean="0">
-                <a:ln>
-                  <a:noFill/>
-                </a:ln>
-                <a:solidFill>
-                  <a:srgbClr val="EF596F"/>
-                </a:solidFill>
-                <a:effectLst/>
-                <a:latin typeface="JetBrains Mono"/>
-              </a:rPr>
-              <a:t>tags </a:t>
-            </a:r>
-            <a:r>
-              <a:rPr kumimoji="0" lang="de-DE" altLang="de-DE" sz="2400" b="0" i="0" u="none" strike="noStrike" cap="none" normalizeH="0" baseline="0" dirty="0" smtClean="0">
-                <a:ln>
-                  <a:noFill/>
-                </a:ln>
-                <a:solidFill>
-                  <a:srgbClr val="BBBBBB"/>
-                </a:solidFill>
-                <a:effectLst/>
-                <a:latin typeface="JetBrains Mono"/>
-              </a:rPr>
-              <a:t>= { </a:t>
-            </a:r>
-            <a:r>
-              <a:rPr kumimoji="0" lang="de-DE" altLang="de-DE" sz="2400" b="0" i="0" u="none" strike="noStrike" cap="none" normalizeH="0" baseline="0" dirty="0" err="1" smtClean="0">
-                <a:ln>
-                  <a:noFill/>
-                </a:ln>
-                <a:solidFill>
-                  <a:srgbClr val="EF596F"/>
-                </a:solidFill>
-                <a:effectLst/>
-                <a:latin typeface="JetBrains Mono"/>
-              </a:rPr>
-              <a:t>LastModified</a:t>
-            </a:r>
-            <a:r>
-              <a:rPr kumimoji="0" lang="de-DE" altLang="de-DE" sz="2400" b="0" i="0" u="none" strike="noStrike" cap="none" normalizeH="0" baseline="0" dirty="0" smtClean="0">
-                <a:ln>
-                  <a:noFill/>
-                </a:ln>
-                <a:solidFill>
-                  <a:srgbClr val="EF596F"/>
-                </a:solidFill>
-                <a:effectLst/>
-                <a:latin typeface="JetBrains Mono"/>
-              </a:rPr>
-              <a:t> </a:t>
-            </a:r>
-            <a:r>
-              <a:rPr kumimoji="0" lang="de-DE" altLang="de-DE" sz="2400" b="0" i="0" u="none" strike="noStrike" cap="none" normalizeH="0" baseline="0" dirty="0" smtClean="0">
-                <a:ln>
-                  <a:noFill/>
-                </a:ln>
-                <a:solidFill>
-                  <a:srgbClr val="BBBBBB"/>
-                </a:solidFill>
-                <a:effectLst/>
-                <a:latin typeface="JetBrains Mono"/>
-              </a:rPr>
-              <a:t>= </a:t>
-            </a:r>
-            <a:r>
-              <a:rPr kumimoji="0" lang="de-DE" altLang="de-DE" sz="2400" b="0" i="0" u="none" strike="noStrike" cap="none" normalizeH="0" baseline="0" dirty="0" err="1" smtClean="0">
-                <a:ln>
-                  <a:noFill/>
-                </a:ln>
-                <a:solidFill>
-                  <a:srgbClr val="BBBBBB"/>
-                </a:solidFill>
-                <a:effectLst/>
-                <a:latin typeface="JetBrains Mono"/>
-              </a:rPr>
-              <a:t>timestamp</a:t>
-            </a:r>
-            <a:r>
-              <a:rPr kumimoji="0" lang="de-DE" altLang="de-DE" sz="2400" b="0" i="0" u="none" strike="noStrike" cap="none" normalizeH="0" baseline="0" dirty="0" smtClean="0">
-                <a:ln>
-                  <a:noFill/>
-                </a:ln>
-                <a:solidFill>
-                  <a:srgbClr val="BBBBBB"/>
-                </a:solidFill>
-                <a:effectLst/>
-                <a:latin typeface="JetBrains Mono"/>
-              </a:rPr>
-              <a:t>() }</a:t>
-            </a:r>
-            <a:br>
-              <a:rPr kumimoji="0" lang="de-DE" altLang="de-DE" sz="2400" b="0" i="0" u="none" strike="noStrike" cap="none" normalizeH="0" baseline="0" dirty="0" smtClean="0">
-                <a:ln>
-                  <a:noFill/>
-                </a:ln>
-                <a:solidFill>
-                  <a:srgbClr val="BBBBBB"/>
-                </a:solidFill>
-                <a:effectLst/>
-                <a:latin typeface="JetBrains Mono"/>
-              </a:rPr>
-            </a:br>
-            <a:r>
-              <a:rPr kumimoji="0" lang="de-DE" altLang="de-DE" sz="2400" b="0" i="0" u="none" strike="noStrike" cap="none" normalizeH="0" baseline="0" dirty="0" smtClean="0">
-                <a:ln>
-                  <a:noFill/>
-                </a:ln>
-                <a:solidFill>
-                  <a:srgbClr val="BBBBBB"/>
-                </a:solidFill>
-                <a:effectLst/>
-                <a:latin typeface="JetBrains Mono"/>
-              </a:rPr>
-              <a:t>  </a:t>
-            </a:r>
-            <a:r>
-              <a:rPr kumimoji="0" lang="de-DE" altLang="de-DE" sz="2400" b="0" i="1" u="none" strike="noStrike" cap="none" normalizeH="0" baseline="0" dirty="0" err="1" smtClean="0">
-                <a:ln>
-                  <a:noFill/>
-                </a:ln>
-                <a:solidFill>
-                  <a:srgbClr val="D55FDE"/>
-                </a:solidFill>
-                <a:effectLst/>
-                <a:latin typeface="JetBrains Mono"/>
-              </a:rPr>
-              <a:t>lifecycle</a:t>
-            </a:r>
-            <a:r>
-              <a:rPr kumimoji="0" lang="de-DE" altLang="de-DE" sz="2400" b="0" i="1" u="none" strike="noStrike" cap="none" normalizeH="0" baseline="0" dirty="0" smtClean="0">
-                <a:ln>
-                  <a:noFill/>
-                </a:ln>
-                <a:solidFill>
-                  <a:srgbClr val="D55FDE"/>
-                </a:solidFill>
-                <a:effectLst/>
-                <a:latin typeface="JetBrains Mono"/>
-              </a:rPr>
-              <a:t> </a:t>
-            </a:r>
-            <a:r>
-              <a:rPr kumimoji="0" lang="de-DE" altLang="de-DE" sz="2400" b="0" i="0" u="none" strike="noStrike" cap="none" normalizeH="0" baseline="0" dirty="0" smtClean="0">
-                <a:ln>
-                  <a:noFill/>
-                </a:ln>
-                <a:solidFill>
-                  <a:srgbClr val="BBBBBB"/>
-                </a:solidFill>
-                <a:effectLst/>
-                <a:latin typeface="JetBrains Mono"/>
-              </a:rPr>
-              <a:t>{</a:t>
-            </a:r>
-            <a:br>
-              <a:rPr kumimoji="0" lang="de-DE" altLang="de-DE" sz="2400" b="0" i="0" u="none" strike="noStrike" cap="none" normalizeH="0" baseline="0" dirty="0" smtClean="0">
-                <a:ln>
-                  <a:noFill/>
-                </a:ln>
-                <a:solidFill>
-                  <a:srgbClr val="BBBBBB"/>
-                </a:solidFill>
-                <a:effectLst/>
-                <a:latin typeface="JetBrains Mono"/>
-              </a:rPr>
-            </a:br>
-            <a:r>
-              <a:rPr kumimoji="0" lang="de-DE" altLang="de-DE" sz="2400" b="0" i="0" u="none" strike="noStrike" cap="none" normalizeH="0" baseline="0" dirty="0" smtClean="0">
-                <a:ln>
-                  <a:noFill/>
-                </a:ln>
-                <a:solidFill>
-                  <a:srgbClr val="BBBBBB"/>
-                </a:solidFill>
-                <a:effectLst/>
-                <a:latin typeface="JetBrains Mono"/>
-              </a:rPr>
-              <a:t>    </a:t>
-            </a:r>
-            <a:r>
-              <a:rPr kumimoji="0" lang="de-DE" altLang="de-DE" sz="2400" b="0" i="0" u="none" strike="noStrike" cap="none" normalizeH="0" baseline="0" dirty="0" err="1" smtClean="0">
-                <a:ln>
-                  <a:noFill/>
-                </a:ln>
-                <a:solidFill>
-                  <a:srgbClr val="EF596F"/>
-                </a:solidFill>
-                <a:effectLst/>
-                <a:latin typeface="JetBrains Mono"/>
-              </a:rPr>
-              <a:t>ignore_changes</a:t>
-            </a:r>
-            <a:r>
-              <a:rPr kumimoji="0" lang="de-DE" altLang="de-DE" sz="2400" b="0" i="0" u="none" strike="noStrike" cap="none" normalizeH="0" baseline="0" dirty="0" smtClean="0">
-                <a:ln>
-                  <a:noFill/>
-                </a:ln>
-                <a:solidFill>
-                  <a:srgbClr val="EF596F"/>
-                </a:solidFill>
-                <a:effectLst/>
-                <a:latin typeface="JetBrains Mono"/>
-              </a:rPr>
-              <a:t> </a:t>
-            </a:r>
-            <a:r>
-              <a:rPr kumimoji="0" lang="de-DE" altLang="de-DE" sz="2400" b="0" i="0" u="none" strike="noStrike" cap="none" normalizeH="0" baseline="0" dirty="0" smtClean="0">
-                <a:ln>
-                  <a:noFill/>
-                </a:ln>
-                <a:solidFill>
-                  <a:srgbClr val="BBBBBB"/>
-                </a:solidFill>
-                <a:effectLst/>
-                <a:latin typeface="JetBrains Mono"/>
-              </a:rPr>
-              <a:t>= [tags]</a:t>
-            </a:r>
-            <a:br>
-              <a:rPr kumimoji="0" lang="de-DE" altLang="de-DE" sz="2400" b="0" i="0" u="none" strike="noStrike" cap="none" normalizeH="0" baseline="0" dirty="0" smtClean="0">
-                <a:ln>
-                  <a:noFill/>
-                </a:ln>
-                <a:solidFill>
-                  <a:srgbClr val="BBBBBB"/>
-                </a:solidFill>
-                <a:effectLst/>
-                <a:latin typeface="JetBrains Mono"/>
-              </a:rPr>
-            </a:br>
-            <a:r>
-              <a:rPr kumimoji="0" lang="de-DE" altLang="de-DE" sz="2400" b="0" i="0" u="none" strike="noStrike" cap="none" normalizeH="0" baseline="0" dirty="0" smtClean="0">
-                <a:ln>
-                  <a:noFill/>
-                </a:ln>
-                <a:solidFill>
-                  <a:srgbClr val="BBBBBB"/>
-                </a:solidFill>
-                <a:effectLst/>
-                <a:latin typeface="JetBrains Mono"/>
-              </a:rPr>
-              <a:t>  }</a:t>
+              <a:rPr kumimoji="0" lang="de-DE" altLang="de-DE" sz="2400" b="0" i="0" u="none" strike="noStrike" cap="none" normalizeH="0" baseline="0" dirty="0" smtClean="0">
+                <a:ln>
+                  <a:noFill/>
+                </a:ln>
+                <a:solidFill>
+                  <a:srgbClr val="BBBBBB"/>
+                </a:solidFill>
+                <a:effectLst/>
+                <a:latin typeface="JetBrains Mono"/>
+              </a:rPr>
+              <a:t>}</a:t>
             </a:r>
             <a:br>
               <a:rPr kumimoji="0" lang="de-DE" altLang="de-DE" sz="2400" b="0" i="0" u="none" strike="noStrike" cap="none" normalizeH="0" baseline="0" dirty="0" smtClean="0">
@@ -12017,7 +11847,7 @@
     </p:spTree>
     <p:extLst>
       <p:ext uri="{BB962C8B-B14F-4D97-AF65-F5344CB8AC3E}">
-        <p14:creationId xmlns:p14="http://schemas.microsoft.com/office/powerpoint/2010/main" val="1490331711"/>
+        <p14:creationId xmlns:p14="http://schemas.microsoft.com/office/powerpoint/2010/main" val="2839185652"/>
       </p:ext>
     </p:extLst>
   </p:cSld>
@@ -12067,8 +11897,16 @@
           <a:lstStyle/>
           <a:p>
             <a:r>
+              <a:rPr lang="de-DE" dirty="0" err="1" smtClean="0"/>
+              <a:t>Lifecycle</a:t>
+            </a:r>
+            <a:r>
               <a:rPr lang="de-DE" dirty="0" smtClean="0"/>
-              <a:t>Timeouts</a:t>
+              <a:t> – </a:t>
+            </a:r>
+            <a:r>
+              <a:rPr lang="de-DE" dirty="0" err="1" smtClean="0"/>
+              <a:t>ignore_changes</a:t>
             </a:r>
             <a:endParaRPr lang="de-DE" dirty="0"/>
           </a:p>
@@ -12095,61 +11933,30 @@
             </a:pPr>
             <a:r>
               <a:rPr lang="de-DE" dirty="0" smtClean="0"/>
-              <a:t>Einige Ressourcen bieten die Möglichkeit einen Block </a:t>
-            </a:r>
-            <a:r>
-              <a:rPr lang="de-DE" dirty="0" err="1" smtClean="0">
-                <a:latin typeface="Consolas" panose="020B0609020204030204" pitchFamily="49" charset="0"/>
-              </a:rPr>
-              <a:t>timeouts</a:t>
+              <a:t>Änderungen an den angegebenen Argumenten der Ressource führen nicht zu einem Update / </a:t>
+            </a:r>
+            <a:r>
+              <a:rPr lang="de-DE" dirty="0" err="1" smtClean="0"/>
+              <a:t>Destroy</a:t>
             </a:r>
             <a:r>
               <a:rPr lang="de-DE" dirty="0" smtClean="0"/>
-              <a:t> zu definieren, in welchem für die Operationen </a:t>
-            </a:r>
-            <a:r>
-              <a:rPr lang="de-DE" dirty="0" err="1" smtClean="0">
-                <a:latin typeface="Consolas" panose="020B0609020204030204" pitchFamily="49" charset="0"/>
-              </a:rPr>
-              <a:t>create</a:t>
+              <a:t> </a:t>
+            </a:r>
+            <a:r>
+              <a:rPr lang="de-DE" dirty="0" err="1" smtClean="0"/>
+              <a:t>and</a:t>
             </a:r>
             <a:r>
               <a:rPr lang="de-DE" dirty="0" smtClean="0"/>
-              <a:t>, </a:t>
-            </a:r>
-            <a:r>
-              <a:rPr lang="de-DE" dirty="0" smtClean="0">
-                <a:latin typeface="Consolas" panose="020B0609020204030204" pitchFamily="49" charset="0"/>
-              </a:rPr>
-              <a:t>update</a:t>
-            </a:r>
-            <a:r>
-              <a:rPr lang="de-DE" dirty="0" smtClean="0"/>
-              <a:t> und </a:t>
-            </a:r>
-            <a:r>
-              <a:rPr lang="de-DE" dirty="0" err="1" smtClean="0">
-                <a:latin typeface="Consolas" panose="020B0609020204030204" pitchFamily="49" charset="0"/>
-              </a:rPr>
-              <a:t>delete</a:t>
-            </a:r>
-            <a:r>
-              <a:rPr lang="de-DE" dirty="0" smtClean="0"/>
-              <a:t> Timeouts definiert werden können</a:t>
-            </a:r>
-          </a:p>
-          <a:p>
-            <a:pPr>
-              <a:buFontTx/>
-              <a:buChar char="-"/>
-            </a:pPr>
-            <a:endParaRPr lang="de-DE" dirty="0" smtClean="0"/>
+              <a:t> Create</a:t>
+            </a:r>
           </a:p>
         </p:txBody>
       </p:sp>
       <p:sp>
         <p:nvSpPr>
-          <p:cNvPr id="4" name="Rectangle 1"/>
+          <p:cNvPr id="5" name="Rectangle 2"/>
           <p:cNvSpPr>
             <a:spLocks noChangeArrowheads="1"/>
           </p:cNvSpPr>
@@ -12157,8 +11964,8 @@
         </p:nvSpPr>
         <p:spPr bwMode="auto">
           <a:xfrm>
-            <a:off x="2946400" y="3250488"/>
-            <a:ext cx="6299199" cy="3416320"/>
+            <a:off x="1907822" y="3264912"/>
+            <a:ext cx="8376356" cy="3046988"/>
           </a:xfrm>
           <a:prstGeom prst="rect">
             <a:avLst/>
@@ -12488,6 +12295,122 @@
               <a:t>  </a:t>
             </a:r>
             <a:r>
+              <a:rPr kumimoji="0" lang="de-DE" altLang="de-DE" sz="2400" b="0" i="0" u="none" strike="noStrike" cap="none" normalizeH="0" baseline="0" dirty="0" smtClean="0">
+                <a:ln>
+                  <a:noFill/>
+                </a:ln>
+                <a:solidFill>
+                  <a:srgbClr val="EF596F"/>
+                </a:solidFill>
+                <a:effectLst/>
+                <a:latin typeface="JetBrains Mono"/>
+              </a:rPr>
+              <a:t>tags </a:t>
+            </a:r>
+            <a:r>
+              <a:rPr kumimoji="0" lang="de-DE" altLang="de-DE" sz="2400" b="0" i="0" u="none" strike="noStrike" cap="none" normalizeH="0" baseline="0" dirty="0" smtClean="0">
+                <a:ln>
+                  <a:noFill/>
+                </a:ln>
+                <a:solidFill>
+                  <a:srgbClr val="BBBBBB"/>
+                </a:solidFill>
+                <a:effectLst/>
+                <a:latin typeface="JetBrains Mono"/>
+              </a:rPr>
+              <a:t>= { </a:t>
+            </a:r>
+            <a:r>
+              <a:rPr kumimoji="0" lang="de-DE" altLang="de-DE" sz="2400" b="0" i="0" u="none" strike="noStrike" cap="none" normalizeH="0" baseline="0" dirty="0" err="1" smtClean="0">
+                <a:ln>
+                  <a:noFill/>
+                </a:ln>
+                <a:solidFill>
+                  <a:srgbClr val="EF596F"/>
+                </a:solidFill>
+                <a:effectLst/>
+                <a:latin typeface="JetBrains Mono"/>
+              </a:rPr>
+              <a:t>LastModified</a:t>
+            </a:r>
+            <a:r>
+              <a:rPr kumimoji="0" lang="de-DE" altLang="de-DE" sz="2400" b="0" i="0" u="none" strike="noStrike" cap="none" normalizeH="0" baseline="0" dirty="0" smtClean="0">
+                <a:ln>
+                  <a:noFill/>
+                </a:ln>
+                <a:solidFill>
+                  <a:srgbClr val="EF596F"/>
+                </a:solidFill>
+                <a:effectLst/>
+                <a:latin typeface="JetBrains Mono"/>
+              </a:rPr>
+              <a:t> </a:t>
+            </a:r>
+            <a:r>
+              <a:rPr kumimoji="0" lang="de-DE" altLang="de-DE" sz="2400" b="0" i="0" u="none" strike="noStrike" cap="none" normalizeH="0" baseline="0" dirty="0" smtClean="0">
+                <a:ln>
+                  <a:noFill/>
+                </a:ln>
+                <a:solidFill>
+                  <a:srgbClr val="BBBBBB"/>
+                </a:solidFill>
+                <a:effectLst/>
+                <a:latin typeface="JetBrains Mono"/>
+              </a:rPr>
+              <a:t>= </a:t>
+            </a:r>
+            <a:r>
+              <a:rPr kumimoji="0" lang="de-DE" altLang="de-DE" sz="2400" b="0" i="0" u="none" strike="noStrike" cap="none" normalizeH="0" baseline="0" dirty="0" err="1" smtClean="0">
+                <a:ln>
+                  <a:noFill/>
+                </a:ln>
+                <a:solidFill>
+                  <a:srgbClr val="BBBBBB"/>
+                </a:solidFill>
+                <a:effectLst/>
+                <a:latin typeface="JetBrains Mono"/>
+              </a:rPr>
+              <a:t>timestamp</a:t>
+            </a:r>
+            <a:r>
+              <a:rPr kumimoji="0" lang="de-DE" altLang="de-DE" sz="2400" b="0" i="0" u="none" strike="noStrike" cap="none" normalizeH="0" baseline="0" dirty="0" smtClean="0">
+                <a:ln>
+                  <a:noFill/>
+                </a:ln>
+                <a:solidFill>
+                  <a:srgbClr val="BBBBBB"/>
+                </a:solidFill>
+                <a:effectLst/>
+                <a:latin typeface="JetBrains Mono"/>
+              </a:rPr>
+              <a:t>() }</a:t>
+            </a:r>
+            <a:br>
+              <a:rPr kumimoji="0" lang="de-DE" altLang="de-DE" sz="2400" b="0" i="0" u="none" strike="noStrike" cap="none" normalizeH="0" baseline="0" dirty="0" smtClean="0">
+                <a:ln>
+                  <a:noFill/>
+                </a:ln>
+                <a:solidFill>
+                  <a:srgbClr val="BBBBBB"/>
+                </a:solidFill>
+                <a:effectLst/>
+                <a:latin typeface="JetBrains Mono"/>
+              </a:rPr>
+            </a:br>
+            <a:r>
+              <a:rPr kumimoji="0" lang="de-DE" altLang="de-DE" sz="2400" b="0" i="0" u="none" strike="noStrike" cap="none" normalizeH="0" baseline="0" dirty="0" smtClean="0">
+                <a:ln>
+                  <a:noFill/>
+                </a:ln>
+                <a:solidFill>
+                  <a:srgbClr val="BBBBBB"/>
+                </a:solidFill>
+                <a:effectLst/>
+                <a:latin typeface="JetBrains Mono"/>
+              </a:rPr>
+              <a:t>  </a:t>
+            </a:r>
+            <a:r>
               <a:rPr kumimoji="0" lang="de-DE" altLang="de-DE" sz="2400" b="0" i="1" u="none" strike="noStrike" cap="none" normalizeH="0" baseline="0" dirty="0" err="1" smtClean="0">
                 <a:ln>
                   <a:noFill/>
@@ -12498,7 +12421,7 @@
                 <a:effectLst/>
                 <a:latin typeface="JetBrains Mono"/>
               </a:rPr>
-              <a:t>timeouts</a:t>
+              <a:t>lifecycle</a:t>
             </a:r>
             <a:r>
               <a:rPr kumimoji="0" lang="de-DE" altLang="de-DE" sz="2400" b="0" i="1" u="none" strike="noStrike" cap="none" normalizeH="0" baseline="0" dirty="0" smtClean="0">
@@ -12562,7 +12485,7 @@
                 <a:effectLst/>
                 <a:latin typeface="JetBrains Mono"/>
               </a:rPr>
-              <a:t>create</a:t>
+              <a:t>ignore_changes</a:t>
             </a:r>
             <a:r>
               <a:rPr kumimoji="0" lang="de-DE" altLang="de-DE" sz="2400" b="0" i="0" u="none" strike="noStrike" cap="none" normalizeH="0" baseline="0" dirty="0" smtClean="0">
@@ -12588,20 +12511,7 @@
                 <a:effectLst/>
                 <a:latin typeface="JetBrains Mono"/>
               </a:rPr>
-              <a:t>= </a:t>
-            </a:r>
-            <a:r>
-              <a:rPr kumimoji="0" lang="de-DE" altLang="de-DE" sz="2400" b="0" i="0" u="none" strike="noStrike" cap="none" normalizeH="0" baseline="0" dirty="0" smtClean="0">
-                <a:ln>
-                  <a:noFill/>
-                </a:ln>
-                <a:solidFill>
-                  <a:srgbClr val="89CA78"/>
-                </a:solidFill>
-                <a:effectLst/>
-                <a:latin typeface="JetBrains Mono"/>
-              </a:rPr>
-              <a:t>"5m"</a:t>
+              <a:t>= [tags]</a:t>
             </a:r>
             <a:br>
               <a:rPr kumimoji="0" lang="de-DE" altLang="de-DE" sz="2400" b="0" i="0" u="none" strike="noStrike" cap="none" normalizeH="0" baseline="0" dirty="0" smtClean="0">
@@ -12609,7 +12519,7 @@
                   <a:noFill/>
                 </a:ln>
                 <a:solidFill>
-                  <a:srgbClr val="89CA78"/>
+                  <a:srgbClr val="BBBBBB"/>
                 </a:solidFill>
                 <a:effectLst/>
                 <a:latin typeface="JetBrains Mono"/>
@@ -12621,166 +12531,12 @@
                   <a:noFill/>
                 </a:ln>
                 <a:solidFill>
-                  <a:srgbClr val="89CA78"/>
-                </a:solidFill>
-                <a:effectLst/>
-                <a:latin typeface="JetBrains Mono"/>
-              </a:rPr>
-              <a:t>    </a:t>
-            </a:r>
-            <a:r>
-              <a:rPr kumimoji="0" lang="de-DE" altLang="de-DE" sz="2400" b="0" i="0" u="none" strike="noStrike" cap="none" normalizeH="0" baseline="0" dirty="0" smtClean="0">
-                <a:ln>
-                  <a:noFill/>
-                </a:ln>
-                <a:solidFill>
-                  <a:srgbClr val="EF596F"/>
-                </a:solidFill>
-                <a:effectLst/>
-                <a:latin typeface="JetBrains Mono"/>
-              </a:rPr>
-              <a:t>update </a:t>
-            </a:r>
-            <a:r>
-              <a:rPr kumimoji="0" lang="de-DE" altLang="de-DE" sz="2400" b="0" i="0" u="none" strike="noStrike" cap="none" normalizeH="0" baseline="0" dirty="0" smtClean="0">
-                <a:ln>
-                  <a:noFill/>
-                </a:ln>
-                <a:solidFill>
-                  <a:srgbClr val="BBBBBB"/>
-                </a:solidFill>
-                <a:effectLst/>
-                <a:latin typeface="JetBrains Mono"/>
-              </a:rPr>
-              <a:t>= </a:t>
-            </a:r>
-            <a:r>
-              <a:rPr kumimoji="0" lang="de-DE" altLang="de-DE" sz="2400" b="0" i="0" u="none" strike="noStrike" cap="none" normalizeH="0" baseline="0" dirty="0" smtClean="0">
-                <a:ln>
-                  <a:noFill/>
-                </a:ln>
-                <a:solidFill>
-                  <a:srgbClr val="89CA78"/>
-                </a:solidFill>
-                <a:effectLst/>
-                <a:latin typeface="JetBrains Mono"/>
-              </a:rPr>
-              <a:t>"60s"</a:t>
-            </a:r>
-            <a:br>
-              <a:rPr kumimoji="0" lang="de-DE" altLang="de-DE" sz="2400" b="0" i="0" u="none" strike="noStrike" cap="none" normalizeH="0" baseline="0" dirty="0" smtClean="0">
-                <a:ln>
-                  <a:noFill/>
-                </a:ln>
-                <a:solidFill>
-                  <a:srgbClr val="89CA78"/>
-                </a:solidFill>
-                <a:effectLst/>
-                <a:latin typeface="JetBrains Mono"/>
-              </a:rPr>
-            </a:br>
-            <a:r>
-              <a:rPr kumimoji="0" lang="de-DE" altLang="de-DE" sz="2400" b="0" i="0" u="none" strike="noStrike" cap="none" normalizeH="0" baseline="0" dirty="0" smtClean="0">
-                <a:ln>
-                  <a:noFill/>
-                </a:ln>
-                <a:solidFill>
-                  <a:srgbClr val="89CA78"/>
-                </a:solidFill>
-                <a:effectLst/>
-                <a:latin typeface="JetBrains Mono"/>
-              </a:rPr>
-              <a:t>    </a:t>
-            </a:r>
-            <a:r>
-              <a:rPr kumimoji="0" lang="de-DE" altLang="de-DE" sz="2400" b="0" i="0" u="none" strike="noStrike" cap="none" normalizeH="0" baseline="0" dirty="0" err="1" smtClean="0">
-                <a:ln>
-                  <a:noFill/>
-                </a:ln>
-                <a:solidFill>
-                  <a:srgbClr val="EF596F"/>
-                </a:solidFill>
-                <a:effectLst/>
-                <a:latin typeface="JetBrains Mono"/>
-              </a:rPr>
-              <a:t>delete</a:t>
-            </a:r>
-            <a:r>
-              <a:rPr kumimoji="0" lang="de-DE" altLang="de-DE" sz="2400" b="0" i="0" u="none" strike="noStrike" cap="none" normalizeH="0" baseline="0" dirty="0" smtClean="0">
-                <a:ln>
-                  <a:noFill/>
-                </a:ln>
-                <a:solidFill>
-                  <a:srgbClr val="EF596F"/>
-                </a:solidFill>
-                <a:effectLst/>
-                <a:latin typeface="JetBrains Mono"/>
-              </a:rPr>
-              <a:t> </a:t>
-            </a:r>
-            <a:r>
-              <a:rPr kumimoji="0" lang="de-DE" altLang="de-DE" sz="2400" b="0" i="0" u="none" strike="noStrike" cap="none" normalizeH="0" baseline="0" dirty="0" smtClean="0">
-                <a:ln>
-                  <a:noFill/>
-                </a:ln>
-                <a:solidFill>
-                  <a:srgbClr val="BBBBBB"/>
-                </a:solidFill>
-                <a:effectLst/>
-                <a:latin typeface="JetBrains Mono"/>
-              </a:rPr>
-              <a:t>= </a:t>
-            </a:r>
-            <a:r>
-              <a:rPr kumimoji="0" lang="de-DE" altLang="de-DE" sz="2400" b="0" i="0" u="none" strike="noStrike" cap="none" normalizeH="0" baseline="0" dirty="0" smtClean="0">
-                <a:ln>
-                  <a:noFill/>
-                </a:ln>
-                <a:solidFill>
-                  <a:srgbClr val="89CA78"/>
-                </a:solidFill>
-                <a:effectLst/>
-                <a:latin typeface="JetBrains Mono"/>
-              </a:rPr>
-              <a:t>"1h"</a:t>
-            </a:r>
-            <a:br>
-              <a:rPr kumimoji="0" lang="de-DE" altLang="de-DE" sz="2400" b="0" i="0" u="none" strike="noStrike" cap="none" normalizeH="0" baseline="0" dirty="0" smtClean="0">
-                <a:ln>
-                  <a:noFill/>
-                </a:ln>
-                <a:solidFill>
-                  <a:srgbClr val="89CA78"/>
-                </a:solidFill>
-                <a:effectLst/>
-                <a:latin typeface="JetBrains Mono"/>
-              </a:rPr>
-            </a:br>
-            <a:r>
-              <a:rPr kumimoji="0" lang="de-DE" altLang="de-DE" sz="2400" b="0" i="0" u="none" strike="noStrike" cap="none" normalizeH="0" baseline="0" dirty="0" smtClean="0">
-                <a:ln>
-                  <a:noFill/>
-                </a:ln>
-                <a:solidFill>
-                  <a:srgbClr val="89CA78"/>
-                </a:solidFill>
-                <a:effectLst/>
-                <a:latin typeface="JetBrains Mono"/>
-              </a:rPr>
-              <a:t>  </a:t>
-            </a:r>
-            <a:r>
-              <a:rPr kumimoji="0" lang="de-DE" altLang="de-DE" sz="2400" b="0" i="0" u="none" strike="noStrike" cap="none" normalizeH="0" baseline="0" dirty="0" smtClean="0">
-                <a:ln>
-                  <a:noFill/>
-                </a:ln>
-                <a:solidFill>
-                  <a:srgbClr val="BBBBBB"/>
-                </a:solidFill>
-                <a:effectLst/>
-                <a:latin typeface="JetBrains Mono"/>
-              </a:rPr>
-              <a:t>}</a:t>
+                  <a:srgbClr val="BBBBBB"/>
+                </a:solidFill>
+                <a:effectLst/>
+                <a:latin typeface="JetBrains Mono"/>
+              </a:rPr>
+              <a:t>  }</a:t>
             </a:r>
             <a:br>
               <a:rPr kumimoji="0" lang="de-DE" altLang="de-DE" sz="2400" b="0" i="0" u="none" strike="noStrike" cap="none" normalizeH="0" baseline="0" dirty="0" smtClean="0">
@@ -12823,7 +12579,7 @@
     </p:spTree>
     <p:extLst>
       <p:ext uri="{BB962C8B-B14F-4D97-AF65-F5344CB8AC3E}">
-        <p14:creationId xmlns:p14="http://schemas.microsoft.com/office/powerpoint/2010/main" val="4176639223"/>
+        <p14:creationId xmlns:p14="http://schemas.microsoft.com/office/powerpoint/2010/main" val="1490331711"/>
       </p:ext>
     </p:extLst>
   </p:cSld>
@@ -13286,6 +13042,812 @@
 </file>
 
 <file path=ppt/slides/slide20.xml><?xml version="1.0" encoding="utf-8"?>
+<p:sld xmlns:a="http://schemas.openxmlformats.org/drawingml/2006/main" xmlns:r="http://schemas.openxmlformats.org/officeDocument/2006/relationships" xmlns:p="http://schemas.openxmlformats.org/presentationml/2006/main">
+  <p:cSld>
+    <p:spTree>
+      <p:nvGrpSpPr>
+        <p:cNvPr id="1" name=""/>
+        <p:cNvGrpSpPr/>
+        <p:nvPr/>
+      </p:nvGrpSpPr>
+      <p:grpSpPr>
+        <a:xfrm>
+          <a:off x="0" y="0"/>
+          <a:ext cx="0" cy="0"/>
+          <a:chOff x="0" y="0"/>
+          <a:chExt cx="0" cy="0"/>
+        </a:xfrm>
+      </p:grpSpPr>
+      <p:sp>
+        <p:nvSpPr>
+          <p:cNvPr id="2" name="Titel 1"/>
+          <p:cNvSpPr>
+            <a:spLocks noGrp="1"/>
+          </p:cNvSpPr>
+          <p:nvPr>
+            <p:ph type="title"/>
+          </p:nvPr>
+        </p:nvSpPr>
+        <p:spPr/>
+        <p:txBody>
+          <a:bodyPr/>
+          <a:lstStyle/>
+          <a:p>
+            <a:r>
+              <a:rPr lang="de-DE" dirty="0" smtClean="0"/>
+              <a:t>Timeouts</a:t>
+            </a:r>
+            <a:endParaRPr lang="de-DE" dirty="0"/>
+          </a:p>
+        </p:txBody>
+      </p:sp>
+      <p:sp>
+        <p:nvSpPr>
+          <p:cNvPr id="3" name="Inhaltsplatzhalter 2"/>
+          <p:cNvSpPr>
+            <a:spLocks noGrp="1"/>
+          </p:cNvSpPr>
+          <p:nvPr>
+            <p:ph idx="1"/>
+          </p:nvPr>
+        </p:nvSpPr>
+        <p:spPr/>
+        <p:txBody>
+          <a:bodyPr/>
+          <a:lstStyle/>
+          <a:p>
+            <a:pPr>
+              <a:buFontTx/>
+              <a:buChar char="-"/>
+            </a:pPr>
+            <a:r>
+              <a:rPr lang="de-DE" dirty="0" smtClean="0"/>
+              <a:t>Einige Ressourcen bieten die Möglichkeit einen Block </a:t>
+            </a:r>
+            <a:r>
+              <a:rPr lang="de-DE" dirty="0" err="1" smtClean="0">
+                <a:latin typeface="Consolas" panose="020B0609020204030204" pitchFamily="49" charset="0"/>
+              </a:rPr>
+              <a:t>timeouts</a:t>
+            </a:r>
+            <a:r>
+              <a:rPr lang="de-DE" dirty="0" smtClean="0"/>
+              <a:t> zu definieren, in welchem für die Operationen </a:t>
+            </a:r>
+            <a:r>
+              <a:rPr lang="de-DE" dirty="0" err="1" smtClean="0">
+                <a:latin typeface="Consolas" panose="020B0609020204030204" pitchFamily="49" charset="0"/>
+              </a:rPr>
+              <a:t>create</a:t>
+            </a:r>
+            <a:r>
+              <a:rPr lang="de-DE" dirty="0" smtClean="0"/>
+              <a:t>, </a:t>
+            </a:r>
+            <a:r>
+              <a:rPr lang="de-DE" dirty="0" smtClean="0">
+                <a:latin typeface="Consolas" panose="020B0609020204030204" pitchFamily="49" charset="0"/>
+              </a:rPr>
+              <a:t>update</a:t>
+            </a:r>
+            <a:r>
+              <a:rPr lang="de-DE" dirty="0" smtClean="0"/>
+              <a:t> und </a:t>
+            </a:r>
+            <a:r>
+              <a:rPr lang="de-DE" dirty="0" err="1" smtClean="0">
+                <a:latin typeface="Consolas" panose="020B0609020204030204" pitchFamily="49" charset="0"/>
+              </a:rPr>
+              <a:t>delete</a:t>
+            </a:r>
+            <a:r>
+              <a:rPr lang="de-DE" dirty="0" smtClean="0"/>
+              <a:t> Timeouts definiert werden können</a:t>
+            </a:r>
+          </a:p>
+          <a:p>
+            <a:pPr>
+              <a:buFontTx/>
+              <a:buChar char="-"/>
+            </a:pPr>
+            <a:endParaRPr lang="de-DE" dirty="0" smtClean="0"/>
+          </a:p>
+        </p:txBody>
+      </p:sp>
+      <p:sp>
+        <p:nvSpPr>
+          <p:cNvPr id="4" name="Rectangle 1"/>
+          <p:cNvSpPr>
+            <a:spLocks noChangeArrowheads="1"/>
+          </p:cNvSpPr>
+          <p:nvPr/>
+        </p:nvSpPr>
+        <p:spPr bwMode="auto">
+          <a:xfrm>
+            <a:off x="2946400" y="3250488"/>
+            <a:ext cx="6299199" cy="3416320"/>
+          </a:xfrm>
+          <a:prstGeom prst="rect">
+            <a:avLst/>
+          </a:prstGeom>
+          <a:solidFill>
+            <a:srgbClr val="282C34"/>
+          </a:solidFill>
+          <a:ln>
+            <a:noFill/>
+          </a:ln>
+          <a:effectLst/>
+          <a:extLst>
+            <a:ext uri="{91240B29-F687-4F45-9708-019B960494DF}">
+              <a14:hiddenLine xmlns:a14="http://schemas.microsoft.com/office/drawing/2010/main" w="9525">
+                <a:solidFill>
+                  <a:schemeClr val="tx1"/>
+                </a:solidFill>
+                <a:miter lim="800000"/>
+                <a:headEnd/>
+                <a:tailEnd/>
+              </a14:hiddenLine>
+            </a:ext>
+            <a:ext uri="{AF507438-7753-43E0-B8FC-AC1667EBCBE1}">
+              <a14:hiddenEffects xmlns:a14="http://schemas.microsoft.com/office/drawing/2010/main">
+                <a:effectLst>
+                  <a:outerShdw dist="35921" dir="2700000" algn="ctr" rotWithShape="0">
+                    <a:schemeClr val="bg2"/>
+                  </a:outerShdw>
+                </a:effectLst>
+              </a14:hiddenEffects>
+            </a:ext>
+          </a:extLst>
+        </p:spPr>
+        <p:txBody>
+          <a:bodyPr vert="horz" wrap="square" lIns="91440" tIns="45720" rIns="91440" bIns="45720" numCol="1" anchor="ctr" anchorCtr="0" compatLnSpc="1">
+            <a:prstTxWarp prst="textNoShape">
+              <a:avLst/>
+            </a:prstTxWarp>
+            <a:spAutoFit/>
+          </a:bodyPr>
+          <a:lstStyle/>
+          <a:p>
+            <a:pPr marL="0" marR="0" lvl="0" indent="0" algn="l" defTabSz="914400" rtl="0" eaLnBrk="0" fontAlgn="base" latinLnBrk="0" hangingPunct="0">
+              <a:lnSpc>
+                <a:spcPct val="100000"/>
+              </a:lnSpc>
+              <a:spcBef>
+                <a:spcPct val="0"/>
+              </a:spcBef>
+              <a:spcAft>
+                <a:spcPct val="0"/>
+              </a:spcAft>
+              <a:buClrTx/>
+              <a:buSzTx/>
+              <a:buFontTx/>
+              <a:buNone/>
+              <a:tabLst/>
+            </a:pPr>
+            <a:r>
+              <a:rPr kumimoji="0" lang="de-DE" altLang="de-DE" sz="2400" b="0" i="1" u="none" strike="noStrike" cap="none" normalizeH="0" baseline="0" dirty="0" err="1" smtClean="0">
+                <a:ln>
+                  <a:noFill/>
+                </a:ln>
+                <a:solidFill>
+                  <a:srgbClr val="D55FDE"/>
+                </a:solidFill>
+                <a:effectLst/>
+                <a:latin typeface="JetBrains Mono"/>
+              </a:rPr>
+              <a:t>resource</a:t>
+            </a:r>
+            <a:r>
+              <a:rPr kumimoji="0" lang="de-DE" altLang="de-DE" sz="2400" b="0" i="1" u="none" strike="noStrike" cap="none" normalizeH="0" baseline="0" dirty="0" smtClean="0">
+                <a:ln>
+                  <a:noFill/>
+                </a:ln>
+                <a:solidFill>
+                  <a:srgbClr val="D55FDE"/>
+                </a:solidFill>
+                <a:effectLst/>
+                <a:latin typeface="JetBrains Mono"/>
+              </a:rPr>
+              <a:t> </a:t>
+            </a:r>
+            <a:r>
+              <a:rPr kumimoji="0" lang="de-DE" altLang="de-DE" sz="2400" b="0" i="0" u="none" strike="noStrike" cap="none" normalizeH="0" baseline="0" dirty="0" smtClean="0">
+                <a:ln>
+                  <a:noFill/>
+                </a:ln>
+                <a:solidFill>
+                  <a:srgbClr val="E5C07B"/>
+                </a:solidFill>
+                <a:effectLst/>
+                <a:latin typeface="JetBrains Mono"/>
+              </a:rPr>
+              <a:t>"</a:t>
+            </a:r>
+            <a:r>
+              <a:rPr kumimoji="0" lang="de-DE" altLang="de-DE" sz="2400" b="0" i="0" u="none" strike="noStrike" cap="none" normalizeH="0" baseline="0" dirty="0" err="1" smtClean="0">
+                <a:ln>
+                  <a:noFill/>
+                </a:ln>
+                <a:solidFill>
+                  <a:srgbClr val="E5C07B"/>
+                </a:solidFill>
+                <a:effectLst/>
+                <a:latin typeface="JetBrains Mono"/>
+              </a:rPr>
+              <a:t>aws_instance</a:t>
+            </a:r>
+            <a:r>
+              <a:rPr kumimoji="0" lang="de-DE" altLang="de-DE" sz="2400" b="0" i="0" u="none" strike="noStrike" cap="none" normalizeH="0" baseline="0" dirty="0" smtClean="0">
+                <a:ln>
+                  <a:noFill/>
+                </a:ln>
+                <a:solidFill>
+                  <a:srgbClr val="E5C07B"/>
+                </a:solidFill>
+                <a:effectLst/>
+                <a:latin typeface="JetBrains Mono"/>
+              </a:rPr>
+              <a:t>" "</a:t>
+            </a:r>
+            <a:r>
+              <a:rPr kumimoji="0" lang="de-DE" altLang="de-DE" sz="2400" b="0" i="0" u="none" strike="noStrike" cap="none" normalizeH="0" baseline="0" dirty="0" err="1" smtClean="0">
+                <a:ln>
+                  <a:noFill/>
+                </a:ln>
+                <a:solidFill>
+                  <a:srgbClr val="E5C07B"/>
+                </a:solidFill>
+                <a:effectLst/>
+                <a:latin typeface="JetBrains Mono"/>
+              </a:rPr>
+              <a:t>demo</a:t>
+            </a:r>
+            <a:r>
+              <a:rPr kumimoji="0" lang="de-DE" altLang="de-DE" sz="2400" b="0" i="0" u="none" strike="noStrike" cap="none" normalizeH="0" baseline="0" dirty="0" smtClean="0">
+                <a:ln>
+                  <a:noFill/>
+                </a:ln>
+                <a:solidFill>
+                  <a:srgbClr val="E5C07B"/>
+                </a:solidFill>
+                <a:effectLst/>
+                <a:latin typeface="JetBrains Mono"/>
+              </a:rPr>
+              <a:t>"</a:t>
+            </a:r>
+            <a:r>
+              <a:rPr kumimoji="0" lang="de-DE" altLang="de-DE" sz="2400" b="0" i="0" u="none" strike="noStrike" cap="none" normalizeH="0" baseline="0" dirty="0" smtClean="0">
+                <a:ln>
+                  <a:noFill/>
+                </a:ln>
+                <a:solidFill>
+                  <a:srgbClr val="BBBBBB"/>
+                </a:solidFill>
+                <a:effectLst/>
+                <a:latin typeface="JetBrains Mono"/>
+              </a:rPr>
+              <a:t>{</a:t>
+            </a:r>
+            <a:br>
+              <a:rPr kumimoji="0" lang="de-DE" altLang="de-DE" sz="2400" b="0" i="0" u="none" strike="noStrike" cap="none" normalizeH="0" baseline="0" dirty="0" smtClean="0">
+                <a:ln>
+                  <a:noFill/>
+                </a:ln>
+                <a:solidFill>
+                  <a:srgbClr val="BBBBBB"/>
+                </a:solidFill>
+                <a:effectLst/>
+                <a:latin typeface="JetBrains Mono"/>
+              </a:rPr>
+            </a:br>
+            <a:r>
+              <a:rPr kumimoji="0" lang="de-DE" altLang="de-DE" sz="2400" b="0" i="0" u="none" strike="noStrike" cap="none" normalizeH="0" baseline="0" dirty="0" smtClean="0">
+                <a:ln>
+                  <a:noFill/>
+                </a:ln>
+                <a:solidFill>
+                  <a:srgbClr val="BBBBBB"/>
+                </a:solidFill>
+                <a:effectLst/>
+                <a:latin typeface="JetBrains Mono"/>
+              </a:rPr>
+              <a:t>  </a:t>
+            </a:r>
+            <a:r>
+              <a:rPr kumimoji="0" lang="de-DE" altLang="de-DE" sz="2400" b="0" i="0" u="none" strike="noStrike" cap="none" normalizeH="0" baseline="0" dirty="0" err="1" smtClean="0">
+                <a:ln>
+                  <a:noFill/>
+                </a:ln>
+                <a:solidFill>
+                  <a:srgbClr val="EF596F"/>
+                </a:solidFill>
+                <a:effectLst/>
+                <a:latin typeface="JetBrains Mono"/>
+              </a:rPr>
+              <a:t>ami</a:t>
+            </a:r>
+            <a:r>
+              <a:rPr kumimoji="0" lang="de-DE" altLang="de-DE" sz="2400" b="0" i="0" u="none" strike="noStrike" cap="none" normalizeH="0" baseline="0" dirty="0" smtClean="0">
+                <a:ln>
+                  <a:noFill/>
+                </a:ln>
+                <a:solidFill>
+                  <a:srgbClr val="EF596F"/>
+                </a:solidFill>
+                <a:effectLst/>
+                <a:latin typeface="JetBrains Mono"/>
+              </a:rPr>
+              <a:t> </a:t>
+            </a:r>
+            <a:r>
+              <a:rPr kumimoji="0" lang="de-DE" altLang="de-DE" sz="2400" b="0" i="0" u="none" strike="noStrike" cap="none" normalizeH="0" baseline="0" dirty="0" smtClean="0">
+                <a:ln>
+                  <a:noFill/>
+                </a:ln>
+                <a:solidFill>
+                  <a:srgbClr val="BBBBBB"/>
+                </a:solidFill>
+                <a:effectLst/>
+                <a:latin typeface="JetBrains Mono"/>
+              </a:rPr>
+              <a:t>= ami-68dae275</a:t>
+            </a:r>
+            <a:br>
+              <a:rPr kumimoji="0" lang="de-DE" altLang="de-DE" sz="2400" b="0" i="0" u="none" strike="noStrike" cap="none" normalizeH="0" baseline="0" dirty="0" smtClean="0">
+                <a:ln>
+                  <a:noFill/>
+                </a:ln>
+                <a:solidFill>
+                  <a:srgbClr val="BBBBBB"/>
+                </a:solidFill>
+                <a:effectLst/>
+                <a:latin typeface="JetBrains Mono"/>
+              </a:rPr>
+            </a:br>
+            <a:r>
+              <a:rPr kumimoji="0" lang="de-DE" altLang="de-DE" sz="2400" b="0" i="0" u="none" strike="noStrike" cap="none" normalizeH="0" baseline="0" dirty="0" smtClean="0">
+                <a:ln>
+                  <a:noFill/>
+                </a:ln>
+                <a:solidFill>
+                  <a:srgbClr val="BBBBBB"/>
+                </a:solidFill>
+                <a:effectLst/>
+                <a:latin typeface="JetBrains Mono"/>
+              </a:rPr>
+              <a:t>  </a:t>
+            </a:r>
+            <a:r>
+              <a:rPr kumimoji="0" lang="de-DE" altLang="de-DE" sz="2400" b="0" i="0" u="none" strike="noStrike" cap="none" normalizeH="0" baseline="0" dirty="0" err="1" smtClean="0">
+                <a:ln>
+                  <a:noFill/>
+                </a:ln>
+                <a:solidFill>
+                  <a:srgbClr val="EF596F"/>
+                </a:solidFill>
+                <a:effectLst/>
+                <a:latin typeface="JetBrains Mono"/>
+              </a:rPr>
+              <a:t>instance_type</a:t>
+            </a:r>
+            <a:r>
+              <a:rPr kumimoji="0" lang="de-DE" altLang="de-DE" sz="2400" b="0" i="0" u="none" strike="noStrike" cap="none" normalizeH="0" baseline="0" dirty="0" smtClean="0">
+                <a:ln>
+                  <a:noFill/>
+                </a:ln>
+                <a:solidFill>
+                  <a:srgbClr val="EF596F"/>
+                </a:solidFill>
+                <a:effectLst/>
+                <a:latin typeface="JetBrains Mono"/>
+              </a:rPr>
+              <a:t> </a:t>
+            </a:r>
+            <a:r>
+              <a:rPr kumimoji="0" lang="de-DE" altLang="de-DE" sz="2400" b="0" i="0" u="none" strike="noStrike" cap="none" normalizeH="0" baseline="0" dirty="0" smtClean="0">
+                <a:ln>
+                  <a:noFill/>
+                </a:ln>
+                <a:solidFill>
+                  <a:srgbClr val="BBBBBB"/>
+                </a:solidFill>
+                <a:effectLst/>
+                <a:latin typeface="JetBrains Mono"/>
+              </a:rPr>
+              <a:t>= </a:t>
+            </a:r>
+            <a:r>
+              <a:rPr kumimoji="0" lang="de-DE" altLang="de-DE" sz="2400" b="0" i="0" u="none" strike="noStrike" cap="none" normalizeH="0" baseline="0" dirty="0" smtClean="0">
+                <a:ln>
+                  <a:noFill/>
+                </a:ln>
+                <a:solidFill>
+                  <a:srgbClr val="89CA78"/>
+                </a:solidFill>
+                <a:effectLst/>
+                <a:latin typeface="JetBrains Mono"/>
+              </a:rPr>
+              <a:t>"t2.micro"</a:t>
+            </a:r>
+            <a:br>
+              <a:rPr kumimoji="0" lang="de-DE" altLang="de-DE" sz="2400" b="0" i="0" u="none" strike="noStrike" cap="none" normalizeH="0" baseline="0" dirty="0" smtClean="0">
+                <a:ln>
+                  <a:noFill/>
+                </a:ln>
+                <a:solidFill>
+                  <a:srgbClr val="89CA78"/>
+                </a:solidFill>
+                <a:effectLst/>
+                <a:latin typeface="JetBrains Mono"/>
+              </a:rPr>
+            </a:br>
+            <a:r>
+              <a:rPr kumimoji="0" lang="de-DE" altLang="de-DE" sz="2400" b="0" i="0" u="none" strike="noStrike" cap="none" normalizeH="0" baseline="0" dirty="0" smtClean="0">
+                <a:ln>
+                  <a:noFill/>
+                </a:ln>
+                <a:solidFill>
+                  <a:srgbClr val="89CA78"/>
+                </a:solidFill>
+                <a:effectLst/>
+                <a:latin typeface="JetBrains Mono"/>
+              </a:rPr>
+              <a:t>  </a:t>
+            </a:r>
+            <a:r>
+              <a:rPr kumimoji="0" lang="de-DE" altLang="de-DE" sz="2400" b="0" i="1" u="none" strike="noStrike" cap="none" normalizeH="0" baseline="0" dirty="0" err="1" smtClean="0">
+                <a:ln>
+                  <a:noFill/>
+                </a:ln>
+                <a:solidFill>
+                  <a:srgbClr val="D55FDE"/>
+                </a:solidFill>
+                <a:effectLst/>
+                <a:latin typeface="JetBrains Mono"/>
+              </a:rPr>
+              <a:t>timeouts</a:t>
+            </a:r>
+            <a:r>
+              <a:rPr kumimoji="0" lang="de-DE" altLang="de-DE" sz="2400" b="0" i="1" u="none" strike="noStrike" cap="none" normalizeH="0" baseline="0" dirty="0" smtClean="0">
+                <a:ln>
+                  <a:noFill/>
+                </a:ln>
+                <a:solidFill>
+                  <a:srgbClr val="D55FDE"/>
+                </a:solidFill>
+                <a:effectLst/>
+                <a:latin typeface="JetBrains Mono"/>
+              </a:rPr>
+              <a:t> </a:t>
+            </a:r>
+            <a:r>
+              <a:rPr kumimoji="0" lang="de-DE" altLang="de-DE" sz="2400" b="0" i="0" u="none" strike="noStrike" cap="none" normalizeH="0" baseline="0" dirty="0" smtClean="0">
+                <a:ln>
+                  <a:noFill/>
+                </a:ln>
+                <a:solidFill>
+                  <a:srgbClr val="BBBBBB"/>
+                </a:solidFill>
+                <a:effectLst/>
+                <a:latin typeface="JetBrains Mono"/>
+              </a:rPr>
+              <a:t>{</a:t>
+            </a:r>
+            <a:br>
+              <a:rPr kumimoji="0" lang="de-DE" altLang="de-DE" sz="2400" b="0" i="0" u="none" strike="noStrike" cap="none" normalizeH="0" baseline="0" dirty="0" smtClean="0">
+                <a:ln>
+                  <a:noFill/>
+                </a:ln>
+                <a:solidFill>
+                  <a:srgbClr val="BBBBBB"/>
+                </a:solidFill>
+                <a:effectLst/>
+                <a:latin typeface="JetBrains Mono"/>
+              </a:rPr>
+            </a:br>
+            <a:r>
+              <a:rPr kumimoji="0" lang="de-DE" altLang="de-DE" sz="2400" b="0" i="0" u="none" strike="noStrike" cap="none" normalizeH="0" baseline="0" dirty="0" smtClean="0">
+                <a:ln>
+                  <a:noFill/>
+                </a:ln>
+                <a:solidFill>
+                  <a:srgbClr val="BBBBBB"/>
+                </a:solidFill>
+                <a:effectLst/>
+                <a:latin typeface="JetBrains Mono"/>
+              </a:rPr>
+              <a:t>    </a:t>
+            </a:r>
+            <a:r>
+              <a:rPr kumimoji="0" lang="de-DE" altLang="de-DE" sz="2400" b="0" i="0" u="none" strike="noStrike" cap="none" normalizeH="0" baseline="0" dirty="0" err="1" smtClean="0">
+                <a:ln>
+                  <a:noFill/>
+                </a:ln>
+                <a:solidFill>
+                  <a:srgbClr val="EF596F"/>
+                </a:solidFill>
+                <a:effectLst/>
+                <a:latin typeface="JetBrains Mono"/>
+              </a:rPr>
+              <a:t>create</a:t>
+            </a:r>
+            <a:r>
+              <a:rPr kumimoji="0" lang="de-DE" altLang="de-DE" sz="2400" b="0" i="0" u="none" strike="noStrike" cap="none" normalizeH="0" baseline="0" dirty="0" smtClean="0">
+                <a:ln>
+                  <a:noFill/>
+                </a:ln>
+                <a:solidFill>
+                  <a:srgbClr val="EF596F"/>
+                </a:solidFill>
+                <a:effectLst/>
+                <a:latin typeface="JetBrains Mono"/>
+              </a:rPr>
+              <a:t> </a:t>
+            </a:r>
+            <a:r>
+              <a:rPr kumimoji="0" lang="de-DE" altLang="de-DE" sz="2400" b="0" i="0" u="none" strike="noStrike" cap="none" normalizeH="0" baseline="0" dirty="0" smtClean="0">
+                <a:ln>
+                  <a:noFill/>
+                </a:ln>
+                <a:solidFill>
+                  <a:srgbClr val="BBBBBB"/>
+                </a:solidFill>
+                <a:effectLst/>
+                <a:latin typeface="JetBrains Mono"/>
+              </a:rPr>
+              <a:t>= </a:t>
+            </a:r>
+            <a:r>
+              <a:rPr kumimoji="0" lang="de-DE" altLang="de-DE" sz="2400" b="0" i="0" u="none" strike="noStrike" cap="none" normalizeH="0" baseline="0" dirty="0" smtClean="0">
+                <a:ln>
+                  <a:noFill/>
+                </a:ln>
+                <a:solidFill>
+                  <a:srgbClr val="89CA78"/>
+                </a:solidFill>
+                <a:effectLst/>
+                <a:latin typeface="JetBrains Mono"/>
+              </a:rPr>
+              <a:t>"5m"</a:t>
+            </a:r>
+            <a:br>
+              <a:rPr kumimoji="0" lang="de-DE" altLang="de-DE" sz="2400" b="0" i="0" u="none" strike="noStrike" cap="none" normalizeH="0" baseline="0" dirty="0" smtClean="0">
+                <a:ln>
+                  <a:noFill/>
+                </a:ln>
+                <a:solidFill>
+                  <a:srgbClr val="89CA78"/>
+                </a:solidFill>
+                <a:effectLst/>
+                <a:latin typeface="JetBrains Mono"/>
+              </a:rPr>
+            </a:br>
+            <a:r>
+              <a:rPr kumimoji="0" lang="de-DE" altLang="de-DE" sz="2400" b="0" i="0" u="none" strike="noStrike" cap="none" normalizeH="0" baseline="0" dirty="0" smtClean="0">
+                <a:ln>
+                  <a:noFill/>
+                </a:ln>
+                <a:solidFill>
+                  <a:srgbClr val="89CA78"/>
+                </a:solidFill>
+                <a:effectLst/>
+                <a:latin typeface="JetBrains Mono"/>
+              </a:rPr>
+              <a:t>    </a:t>
+            </a:r>
+            <a:r>
+              <a:rPr kumimoji="0" lang="de-DE" altLang="de-DE" sz="2400" b="0" i="0" u="none" strike="noStrike" cap="none" normalizeH="0" baseline="0" dirty="0" smtClean="0">
+                <a:ln>
+                  <a:noFill/>
+                </a:ln>
+                <a:solidFill>
+                  <a:srgbClr val="EF596F"/>
+                </a:solidFill>
+                <a:effectLst/>
+                <a:latin typeface="JetBrains Mono"/>
+              </a:rPr>
+              <a:t>update </a:t>
+            </a:r>
+            <a:r>
+              <a:rPr kumimoji="0" lang="de-DE" altLang="de-DE" sz="2400" b="0" i="0" u="none" strike="noStrike" cap="none" normalizeH="0" baseline="0" dirty="0" smtClean="0">
+                <a:ln>
+                  <a:noFill/>
+                </a:ln>
+                <a:solidFill>
+                  <a:srgbClr val="BBBBBB"/>
+                </a:solidFill>
+                <a:effectLst/>
+                <a:latin typeface="JetBrains Mono"/>
+              </a:rPr>
+              <a:t>= </a:t>
+            </a:r>
+            <a:r>
+              <a:rPr kumimoji="0" lang="de-DE" altLang="de-DE" sz="2400" b="0" i="0" u="none" strike="noStrike" cap="none" normalizeH="0" baseline="0" dirty="0" smtClean="0">
+                <a:ln>
+                  <a:noFill/>
+                </a:ln>
+                <a:solidFill>
+                  <a:srgbClr val="89CA78"/>
+                </a:solidFill>
+                <a:effectLst/>
+                <a:latin typeface="JetBrains Mono"/>
+              </a:rPr>
+              <a:t>"60s"</a:t>
+            </a:r>
+            <a:br>
+              <a:rPr kumimoji="0" lang="de-DE" altLang="de-DE" sz="2400" b="0" i="0" u="none" strike="noStrike" cap="none" normalizeH="0" baseline="0" dirty="0" smtClean="0">
+                <a:ln>
+                  <a:noFill/>
+                </a:ln>
+                <a:solidFill>
+                  <a:srgbClr val="89CA78"/>
+                </a:solidFill>
+                <a:effectLst/>
+                <a:latin typeface="JetBrains Mono"/>
+              </a:rPr>
+            </a:br>
+            <a:r>
+              <a:rPr kumimoji="0" lang="de-DE" altLang="de-DE" sz="2400" b="0" i="0" u="none" strike="noStrike" cap="none" normalizeH="0" baseline="0" dirty="0" smtClean="0">
+                <a:ln>
+                  <a:noFill/>
+                </a:ln>
+                <a:solidFill>
+                  <a:srgbClr val="89CA78"/>
+                </a:solidFill>
+                <a:effectLst/>
+                <a:latin typeface="JetBrains Mono"/>
+              </a:rPr>
+              <a:t>    </a:t>
+            </a:r>
+            <a:r>
+              <a:rPr kumimoji="0" lang="de-DE" altLang="de-DE" sz="2400" b="0" i="0" u="none" strike="noStrike" cap="none" normalizeH="0" baseline="0" dirty="0" err="1" smtClean="0">
+                <a:ln>
+                  <a:noFill/>
+                </a:ln>
+                <a:solidFill>
+                  <a:srgbClr val="EF596F"/>
+                </a:solidFill>
+                <a:effectLst/>
+                <a:latin typeface="JetBrains Mono"/>
+              </a:rPr>
+              <a:t>delete</a:t>
+            </a:r>
+            <a:r>
+              <a:rPr kumimoji="0" lang="de-DE" altLang="de-DE" sz="2400" b="0" i="0" u="none" strike="noStrike" cap="none" normalizeH="0" baseline="0" dirty="0" smtClean="0">
+                <a:ln>
+                  <a:noFill/>
+                </a:ln>
+                <a:solidFill>
+                  <a:srgbClr val="EF596F"/>
+                </a:solidFill>
+                <a:effectLst/>
+                <a:latin typeface="JetBrains Mono"/>
+              </a:rPr>
+              <a:t> </a:t>
+            </a:r>
+            <a:r>
+              <a:rPr kumimoji="0" lang="de-DE" altLang="de-DE" sz="2400" b="0" i="0" u="none" strike="noStrike" cap="none" normalizeH="0" baseline="0" dirty="0" smtClean="0">
+                <a:ln>
+                  <a:noFill/>
+                </a:ln>
+                <a:solidFill>
+                  <a:srgbClr val="BBBBBB"/>
+                </a:solidFill>
+                <a:effectLst/>
+                <a:latin typeface="JetBrains Mono"/>
+              </a:rPr>
+              <a:t>= </a:t>
+            </a:r>
+            <a:r>
+              <a:rPr kumimoji="0" lang="de-DE" altLang="de-DE" sz="2400" b="0" i="0" u="none" strike="noStrike" cap="none" normalizeH="0" baseline="0" dirty="0" smtClean="0">
+                <a:ln>
+                  <a:noFill/>
+                </a:ln>
+                <a:solidFill>
+                  <a:srgbClr val="89CA78"/>
+                </a:solidFill>
+                <a:effectLst/>
+                <a:latin typeface="JetBrains Mono"/>
+              </a:rPr>
+              <a:t>"1h"</a:t>
+            </a:r>
+            <a:br>
+              <a:rPr kumimoji="0" lang="de-DE" altLang="de-DE" sz="2400" b="0" i="0" u="none" strike="noStrike" cap="none" normalizeH="0" baseline="0" dirty="0" smtClean="0">
+                <a:ln>
+                  <a:noFill/>
+                </a:ln>
+                <a:solidFill>
+                  <a:srgbClr val="89CA78"/>
+                </a:solidFill>
+                <a:effectLst/>
+                <a:latin typeface="JetBrains Mono"/>
+              </a:rPr>
+            </a:br>
+            <a:r>
+              <a:rPr kumimoji="0" lang="de-DE" altLang="de-DE" sz="2400" b="0" i="0" u="none" strike="noStrike" cap="none" normalizeH="0" baseline="0" dirty="0" smtClean="0">
+                <a:ln>
+                  <a:noFill/>
+                </a:ln>
+                <a:solidFill>
+                  <a:srgbClr val="89CA78"/>
+                </a:solidFill>
+                <a:effectLst/>
+                <a:latin typeface="JetBrains Mono"/>
+              </a:rPr>
+              <a:t>  </a:t>
+            </a:r>
+            <a:r>
+              <a:rPr kumimoji="0" lang="de-DE" altLang="de-DE" sz="2400" b="0" i="0" u="none" strike="noStrike" cap="none" normalizeH="0" baseline="0" dirty="0" smtClean="0">
+                <a:ln>
+                  <a:noFill/>
+                </a:ln>
+                <a:solidFill>
+                  <a:srgbClr val="BBBBBB"/>
+                </a:solidFill>
+                <a:effectLst/>
+                <a:latin typeface="JetBrains Mono"/>
+              </a:rPr>
+              <a:t>}</a:t>
+            </a:r>
+            <a:br>
+              <a:rPr kumimoji="0" lang="de-DE" altLang="de-DE" sz="2400" b="0" i="0" u="none" strike="noStrike" cap="none" normalizeH="0" baseline="0" dirty="0" smtClean="0">
+                <a:ln>
+                  <a:noFill/>
+                </a:ln>
+                <a:solidFill>
+                  <a:srgbClr val="BBBBBB"/>
+                </a:solidFill>
+                <a:effectLst/>
+                <a:latin typeface="JetBrains Mono"/>
+              </a:rPr>
+            </a:br>
+            <a:r>
+              <a:rPr kumimoji="0" lang="de-DE" altLang="de-DE" sz="2400" b="0" i="0" u="none" strike="noStrike" cap="none" normalizeH="0" baseline="0" dirty="0" smtClean="0">
+                <a:ln>
+                  <a:noFill/>
+                </a:ln>
+                <a:solidFill>
+                  <a:srgbClr val="BBBBBB"/>
+                </a:solidFill>
+                <a:effectLst/>
+                <a:latin typeface="JetBrains Mono"/>
+              </a:rPr>
+              <a:t>}</a:t>
+            </a:r>
+            <a:endParaRPr kumimoji="0" lang="de-DE" altLang="de-DE" sz="4800" b="0" i="0" u="none" strike="noStrike" cap="none" normalizeH="0" baseline="0" dirty="0" smtClean="0">
+              <a:ln>
+                <a:noFill/>
+              </a:ln>
+              <a:solidFill>
+                <a:schemeClr val="tx1"/>
+              </a:solidFill>
+              <a:effectLst/>
+              <a:latin typeface="Arial" panose="020B0604020202020204" pitchFamily="34" charset="0"/>
+            </a:endParaRPr>
+          </a:p>
+        </p:txBody>
+      </p:sp>
+    </p:spTree>
+    <p:extLst>
+      <p:ext uri="{BB962C8B-B14F-4D97-AF65-F5344CB8AC3E}">
+        <p14:creationId xmlns:p14="http://schemas.microsoft.com/office/powerpoint/2010/main" val="4176639223"/>
+      </p:ext>
+    </p:extLst>
+  </p:cSld>
+  <p:clrMapOvr>
+    <a:masterClrMapping/>
+  </p:clrMapOvr>
+  <p:timing>
+    <p:tnLst>
+      <p:par>
+        <p:cTn id="1" dur="indefinite" restart="never" nodeType="tmRoot"/>
+      </p:par>
+    </p:tnLst>
+  </p:timing>
+</p:sld>
+</file>
+
+<file path=ppt/slides/slide21.xml><?xml version="1.0" encoding="utf-8"?>
 <p:sld xmlns:a="http://schemas.openxmlformats.org/drawingml/2006/main" xmlns:r="http://schemas.openxmlformats.org/officeDocument/2006/relationships" xmlns:p="http://schemas.openxmlformats.org/presentationml/2006/main">
   <p:cSld>
     <p:spTree>
@@ -18473,25 +19035,7 @@
                 </a:solidFill>
                 <a:latin typeface="JetBrains Mono"/>
               </a:rPr>
-              <a:t>"</a:t>
-            </a:r>
-            <a:r>
-              <a:rPr lang="de-DE" altLang="de-DE" sz="2400" dirty="0">
-                <a:solidFill>
-                  <a:srgbClr val="E5C07B"/>
-                </a:solidFill>
-                <a:latin typeface="JetBrains Mono"/>
-              </a:rPr>
-              <a:t>0815</a:t>
-            </a:r>
-            <a:r>
-              <a:rPr lang="de-DE" altLang="de-DE" sz="2400" dirty="0">
-                <a:solidFill>
-                  <a:srgbClr val="E5C07B"/>
-                </a:solidFill>
-                <a:latin typeface="JetBrains Mono"/>
-              </a:rPr>
-              <a:t>"</a:t>
+              <a:t>"0815"</a:t>
             </a:r>
             <a:r>
               <a:rPr lang="de-DE" altLang="de-DE" sz="2400" dirty="0" smtClean="0">

</xml_diff>